<commit_message>
Update modelisation.pptx et Ajout ecrans
</commit_message>
<xml_diff>
--- a/modélisation/mercure-galant-thésaurus-ancien-régime/Modélisation.pptx
+++ b/modélisation/mercure-galant-thésaurus-ancien-régime/Modélisation.pptx
@@ -243,7 +243,7 @@
           <a:p>
             <a:fld id="{F96D367F-7370-4214-86FB-91D90BAC4FAD}" type="datetimeFigureOut">
               <a:rPr lang="fr-FR" smtClean="0"/>
-              <a:t>09/11/2020</a:t>
+              <a:t>10/11/2020</a:t>
             </a:fld>
             <a:endParaRPr lang="fr-FR"/>
           </a:p>
@@ -413,7 +413,7 @@
           <a:p>
             <a:fld id="{F96D367F-7370-4214-86FB-91D90BAC4FAD}" type="datetimeFigureOut">
               <a:rPr lang="fr-FR" smtClean="0"/>
-              <a:t>09/11/2020</a:t>
+              <a:t>10/11/2020</a:t>
             </a:fld>
             <a:endParaRPr lang="fr-FR"/>
           </a:p>
@@ -593,7 +593,7 @@
           <a:p>
             <a:fld id="{F96D367F-7370-4214-86FB-91D90BAC4FAD}" type="datetimeFigureOut">
               <a:rPr lang="fr-FR" smtClean="0"/>
-              <a:t>09/11/2020</a:t>
+              <a:t>10/11/2020</a:t>
             </a:fld>
             <a:endParaRPr lang="fr-FR"/>
           </a:p>
@@ -763,7 +763,7 @@
           <a:p>
             <a:fld id="{F96D367F-7370-4214-86FB-91D90BAC4FAD}" type="datetimeFigureOut">
               <a:rPr lang="fr-FR" smtClean="0"/>
-              <a:t>09/11/2020</a:t>
+              <a:t>10/11/2020</a:t>
             </a:fld>
             <a:endParaRPr lang="fr-FR"/>
           </a:p>
@@ -1007,7 +1007,7 @@
           <a:p>
             <a:fld id="{F96D367F-7370-4214-86FB-91D90BAC4FAD}" type="datetimeFigureOut">
               <a:rPr lang="fr-FR" smtClean="0"/>
-              <a:t>09/11/2020</a:t>
+              <a:t>10/11/2020</a:t>
             </a:fld>
             <a:endParaRPr lang="fr-FR"/>
           </a:p>
@@ -1239,7 +1239,7 @@
           <a:p>
             <a:fld id="{F96D367F-7370-4214-86FB-91D90BAC4FAD}" type="datetimeFigureOut">
               <a:rPr lang="fr-FR" smtClean="0"/>
-              <a:t>09/11/2020</a:t>
+              <a:t>10/11/2020</a:t>
             </a:fld>
             <a:endParaRPr lang="fr-FR"/>
           </a:p>
@@ -1606,7 +1606,7 @@
           <a:p>
             <a:fld id="{F96D367F-7370-4214-86FB-91D90BAC4FAD}" type="datetimeFigureOut">
               <a:rPr lang="fr-FR" smtClean="0"/>
-              <a:t>09/11/2020</a:t>
+              <a:t>10/11/2020</a:t>
             </a:fld>
             <a:endParaRPr lang="fr-FR"/>
           </a:p>
@@ -1724,7 +1724,7 @@
           <a:p>
             <a:fld id="{F96D367F-7370-4214-86FB-91D90BAC4FAD}" type="datetimeFigureOut">
               <a:rPr lang="fr-FR" smtClean="0"/>
-              <a:t>09/11/2020</a:t>
+              <a:t>10/11/2020</a:t>
             </a:fld>
             <a:endParaRPr lang="fr-FR"/>
           </a:p>
@@ -1819,7 +1819,7 @@
           <a:p>
             <a:fld id="{F96D367F-7370-4214-86FB-91D90BAC4FAD}" type="datetimeFigureOut">
               <a:rPr lang="fr-FR" smtClean="0"/>
-              <a:t>09/11/2020</a:t>
+              <a:t>10/11/2020</a:t>
             </a:fld>
             <a:endParaRPr lang="fr-FR"/>
           </a:p>
@@ -2096,7 +2096,7 @@
           <a:p>
             <a:fld id="{F96D367F-7370-4214-86FB-91D90BAC4FAD}" type="datetimeFigureOut">
               <a:rPr lang="fr-FR" smtClean="0"/>
-              <a:t>09/11/2020</a:t>
+              <a:t>10/11/2020</a:t>
             </a:fld>
             <a:endParaRPr lang="fr-FR"/>
           </a:p>
@@ -2353,7 +2353,7 @@
           <a:p>
             <a:fld id="{F96D367F-7370-4214-86FB-91D90BAC4FAD}" type="datetimeFigureOut">
               <a:rPr lang="fr-FR" smtClean="0"/>
-              <a:t>09/11/2020</a:t>
+              <a:t>10/11/2020</a:t>
             </a:fld>
             <a:endParaRPr lang="fr-FR"/>
           </a:p>
@@ -2566,7 +2566,7 @@
           <a:p>
             <a:fld id="{F96D367F-7370-4214-86FB-91D90BAC4FAD}" type="datetimeFigureOut">
               <a:rPr lang="fr-FR" smtClean="0"/>
-              <a:t>09/11/2020</a:t>
+              <a:t>10/11/2020</a:t>
             </a:fld>
             <a:endParaRPr lang="fr-FR"/>
           </a:p>
@@ -3232,7 +3232,7 @@
         </p:nvSpPr>
         <p:spPr>
           <a:xfrm>
-            <a:off x="23814584" y="2185979"/>
+            <a:off x="23225355" y="2643140"/>
             <a:ext cx="16470323" cy="13265008"/>
           </a:xfrm>
           <a:prstGeom prst="roundRect">
@@ -15640,7 +15640,7 @@
                 </a:solidFill>
                 <a:latin typeface="Gill Sans Nova" panose="020B0602020104020203" pitchFamily="34" charset="0"/>
               </a:rPr>
-              <a:t>« </a:t>
+              <a:t>« Gouvernement d’</a:t>
             </a:r>
             <a:r>
               <a:rPr lang="fr-FR" sz="900" i="1" dirty="0" err="1">
@@ -15715,6 +15715,7 @@
             </a:extLst>
           </p:cNvPr>
           <p:cNvCxnSpPr>
+            <a:cxnSpLocks/>
             <a:stCxn id="232" idx="2"/>
             <a:endCxn id="43" idx="2"/>
           </p:cNvCxnSpPr>
@@ -15818,6 +15819,7 @@
             </a:extLst>
           </p:cNvPr>
           <p:cNvCxnSpPr>
+            <a:cxnSpLocks/>
             <a:stCxn id="18" idx="2"/>
             <a:endCxn id="232" idx="0"/>
           </p:cNvCxnSpPr>
@@ -15922,6 +15924,7 @@
             </a:extLst>
           </p:cNvPr>
           <p:cNvCxnSpPr>
+            <a:cxnSpLocks/>
             <a:stCxn id="232" idx="2"/>
             <a:endCxn id="1376" idx="1"/>
           </p:cNvCxnSpPr>

</xml_diff>

<commit_message>
Update modelisations et scripts
</commit_message>
<xml_diff>
--- a/modélisation/mercure-galant-thésaurus-ancien-régime/Modélisation.pptx
+++ b/modélisation/mercure-galant-thésaurus-ancien-régime/Modélisation.pptx
@@ -243,7 +243,7 @@
           <a:p>
             <a:fld id="{F96D367F-7370-4214-86FB-91D90BAC4FAD}" type="datetimeFigureOut">
               <a:rPr lang="fr-FR" smtClean="0"/>
-              <a:t>21/12/2020</a:t>
+              <a:t>08/01/2021</a:t>
             </a:fld>
             <a:endParaRPr lang="fr-FR"/>
           </a:p>
@@ -413,7 +413,7 @@
           <a:p>
             <a:fld id="{F96D367F-7370-4214-86FB-91D90BAC4FAD}" type="datetimeFigureOut">
               <a:rPr lang="fr-FR" smtClean="0"/>
-              <a:t>21/12/2020</a:t>
+              <a:t>08/01/2021</a:t>
             </a:fld>
             <a:endParaRPr lang="fr-FR"/>
           </a:p>
@@ -593,7 +593,7 @@
           <a:p>
             <a:fld id="{F96D367F-7370-4214-86FB-91D90BAC4FAD}" type="datetimeFigureOut">
               <a:rPr lang="fr-FR" smtClean="0"/>
-              <a:t>21/12/2020</a:t>
+              <a:t>08/01/2021</a:t>
             </a:fld>
             <a:endParaRPr lang="fr-FR"/>
           </a:p>
@@ -763,7 +763,7 @@
           <a:p>
             <a:fld id="{F96D367F-7370-4214-86FB-91D90BAC4FAD}" type="datetimeFigureOut">
               <a:rPr lang="fr-FR" smtClean="0"/>
-              <a:t>21/12/2020</a:t>
+              <a:t>08/01/2021</a:t>
             </a:fld>
             <a:endParaRPr lang="fr-FR"/>
           </a:p>
@@ -1007,7 +1007,7 @@
           <a:p>
             <a:fld id="{F96D367F-7370-4214-86FB-91D90BAC4FAD}" type="datetimeFigureOut">
               <a:rPr lang="fr-FR" smtClean="0"/>
-              <a:t>21/12/2020</a:t>
+              <a:t>08/01/2021</a:t>
             </a:fld>
             <a:endParaRPr lang="fr-FR"/>
           </a:p>
@@ -1239,7 +1239,7 @@
           <a:p>
             <a:fld id="{F96D367F-7370-4214-86FB-91D90BAC4FAD}" type="datetimeFigureOut">
               <a:rPr lang="fr-FR" smtClean="0"/>
-              <a:t>21/12/2020</a:t>
+              <a:t>08/01/2021</a:t>
             </a:fld>
             <a:endParaRPr lang="fr-FR"/>
           </a:p>
@@ -1606,7 +1606,7 @@
           <a:p>
             <a:fld id="{F96D367F-7370-4214-86FB-91D90BAC4FAD}" type="datetimeFigureOut">
               <a:rPr lang="fr-FR" smtClean="0"/>
-              <a:t>21/12/2020</a:t>
+              <a:t>08/01/2021</a:t>
             </a:fld>
             <a:endParaRPr lang="fr-FR"/>
           </a:p>
@@ -1724,7 +1724,7 @@
           <a:p>
             <a:fld id="{F96D367F-7370-4214-86FB-91D90BAC4FAD}" type="datetimeFigureOut">
               <a:rPr lang="fr-FR" smtClean="0"/>
-              <a:t>21/12/2020</a:t>
+              <a:t>08/01/2021</a:t>
             </a:fld>
             <a:endParaRPr lang="fr-FR"/>
           </a:p>
@@ -1819,7 +1819,7 @@
           <a:p>
             <a:fld id="{F96D367F-7370-4214-86FB-91D90BAC4FAD}" type="datetimeFigureOut">
               <a:rPr lang="fr-FR" smtClean="0"/>
-              <a:t>21/12/2020</a:t>
+              <a:t>08/01/2021</a:t>
             </a:fld>
             <a:endParaRPr lang="fr-FR"/>
           </a:p>
@@ -2096,7 +2096,7 @@
           <a:p>
             <a:fld id="{F96D367F-7370-4214-86FB-91D90BAC4FAD}" type="datetimeFigureOut">
               <a:rPr lang="fr-FR" smtClean="0"/>
-              <a:t>21/12/2020</a:t>
+              <a:t>08/01/2021</a:t>
             </a:fld>
             <a:endParaRPr lang="fr-FR"/>
           </a:p>
@@ -2353,7 +2353,7 @@
           <a:p>
             <a:fld id="{F96D367F-7370-4214-86FB-91D90BAC4FAD}" type="datetimeFigureOut">
               <a:rPr lang="fr-FR" smtClean="0"/>
-              <a:t>21/12/2020</a:t>
+              <a:t>08/01/2021</a:t>
             </a:fld>
             <a:endParaRPr lang="fr-FR"/>
           </a:p>
@@ -2566,7 +2566,7 @@
           <a:p>
             <a:fld id="{F96D367F-7370-4214-86FB-91D90BAC4FAD}" type="datetimeFigureOut">
               <a:rPr lang="fr-FR" smtClean="0"/>
-              <a:t>21/12/2020</a:t>
+              <a:t>08/01/2021</a:t>
             </a:fld>
             <a:endParaRPr lang="fr-FR"/>
           </a:p>
@@ -8572,11 +8572,8 @@
             <a:schemeClr val="bg1"/>
           </a:solidFill>
           <a:ln>
-            <a:solidFill>
-              <a:srgbClr val="FFF2CC">
-                <a:alpha val="7843"/>
-              </a:srgbClr>
-            </a:solidFill>
+            <a:noFill/>
+            <a:prstDash val="sysDot"/>
           </a:ln>
         </p:spPr>
         <p:style>
@@ -10822,7 +10819,11 @@
           <a:prstGeom prst="straightConnector1">
             <a:avLst/>
           </a:prstGeom>
-          <a:ln>
+          <a:ln w="12700">
+            <a:solidFill>
+              <a:srgbClr val="8A6868"/>
+            </a:solidFill>
+            <a:prstDash val="sysDot"/>
             <a:tailEnd type="triangle"/>
           </a:ln>
         </p:spPr>
@@ -10872,29 +10873,44 @@
             <a:pPr algn="ctr"/>
             <a:r>
               <a:rPr lang="fr-FR" sz="900" i="1" dirty="0">
+                <a:solidFill>
+                  <a:srgbClr val="8A6868"/>
+                </a:solidFill>
                 <a:latin typeface="Gill Sans Nova" panose="020B0602020104020203" pitchFamily="34" charset="0"/>
               </a:rPr>
               <a:t>P89 </a:t>
             </a:r>
             <a:r>
               <a:rPr lang="fr-FR" sz="900" i="1" dirty="0" err="1">
+                <a:solidFill>
+                  <a:srgbClr val="8A6868"/>
+                </a:solidFill>
                 <a:latin typeface="Gill Sans Nova" panose="020B0602020104020203" pitchFamily="34" charset="0"/>
               </a:rPr>
               <a:t>falls</a:t>
             </a:r>
             <a:r>
               <a:rPr lang="fr-FR" sz="900" i="1" dirty="0">
+                <a:solidFill>
+                  <a:srgbClr val="8A6868"/>
+                </a:solidFill>
                 <a:latin typeface="Gill Sans Nova" panose="020B0602020104020203" pitchFamily="34" charset="0"/>
               </a:rPr>
               <a:t> </a:t>
             </a:r>
             <a:r>
               <a:rPr lang="fr-FR" sz="900" i="1" dirty="0" err="1">
+                <a:solidFill>
+                  <a:srgbClr val="8A6868"/>
+                </a:solidFill>
                 <a:latin typeface="Gill Sans Nova" panose="020B0602020104020203" pitchFamily="34" charset="0"/>
               </a:rPr>
               <a:t>within</a:t>
             </a:r>
             <a:endParaRPr lang="fr-FR" sz="900" i="1" dirty="0">
+              <a:solidFill>
+                <a:srgbClr val="8A6868"/>
+              </a:solidFill>
               <a:latin typeface="Gill Sans Nova" panose="020B0602020104020203" pitchFamily="34" charset="0"/>
             </a:endParaRPr>
           </a:p>
@@ -11014,7 +11030,11 @@
           <a:prstGeom prst="straightConnector1">
             <a:avLst/>
           </a:prstGeom>
-          <a:ln>
+          <a:ln w="12700">
+            <a:solidFill>
+              <a:srgbClr val="8A6868"/>
+            </a:solidFill>
+            <a:prstDash val="sysDot"/>
             <a:tailEnd type="triangle"/>
           </a:ln>
         </p:spPr>
@@ -11064,29 +11084,44 @@
             <a:pPr algn="ctr"/>
             <a:r>
               <a:rPr lang="fr-FR" sz="900" i="1" dirty="0">
+                <a:solidFill>
+                  <a:srgbClr val="8A6868"/>
+                </a:solidFill>
                 <a:latin typeface="Gill Sans Nova" panose="020B0602020104020203" pitchFamily="34" charset="0"/>
               </a:rPr>
               <a:t>P89 </a:t>
             </a:r>
             <a:r>
               <a:rPr lang="fr-FR" sz="900" i="1" dirty="0" err="1">
+                <a:solidFill>
+                  <a:srgbClr val="8A6868"/>
+                </a:solidFill>
                 <a:latin typeface="Gill Sans Nova" panose="020B0602020104020203" pitchFamily="34" charset="0"/>
               </a:rPr>
               <a:t>falls</a:t>
             </a:r>
             <a:r>
               <a:rPr lang="fr-FR" sz="900" i="1" dirty="0">
+                <a:solidFill>
+                  <a:srgbClr val="8A6868"/>
+                </a:solidFill>
                 <a:latin typeface="Gill Sans Nova" panose="020B0602020104020203" pitchFamily="34" charset="0"/>
               </a:rPr>
               <a:t> </a:t>
             </a:r>
             <a:r>
               <a:rPr lang="fr-FR" sz="900" i="1" dirty="0" err="1">
+                <a:solidFill>
+                  <a:srgbClr val="8A6868"/>
+                </a:solidFill>
                 <a:latin typeface="Gill Sans Nova" panose="020B0602020104020203" pitchFamily="34" charset="0"/>
               </a:rPr>
               <a:t>within</a:t>
             </a:r>
             <a:endParaRPr lang="fr-FR" sz="900" i="1" dirty="0">
+              <a:solidFill>
+                <a:srgbClr val="8A6868"/>
+              </a:solidFill>
               <a:latin typeface="Gill Sans Nova" panose="020B0602020104020203" pitchFamily="34" charset="0"/>
             </a:endParaRPr>
           </a:p>
@@ -11201,7 +11236,11 @@
           <a:prstGeom prst="curvedConnector2">
             <a:avLst/>
           </a:prstGeom>
-          <a:ln>
+          <a:ln w="12700">
+            <a:solidFill>
+              <a:srgbClr val="8A6868"/>
+            </a:solidFill>
+            <a:prstDash val="sysDot"/>
             <a:tailEnd type="triangle"/>
           </a:ln>
         </p:spPr>
@@ -11234,7 +11273,7 @@
         </p:nvSpPr>
         <p:spPr>
           <a:xfrm>
-            <a:off x="11959067" y="21346488"/>
+            <a:off x="11362272" y="21720856"/>
             <a:ext cx="1242988" cy="369332"/>
           </a:xfrm>
           <a:prstGeom prst="rect">
@@ -11248,9 +11287,11 @@
           </a:bodyPr>
           <a:lstStyle/>
           <a:p>
-            <a:pPr algn="ctr"/>
             <a:r>
               <a:rPr lang="fr-FR" sz="900" i="1" dirty="0">
+                <a:solidFill>
+                  <a:srgbClr val="8A6868"/>
+                </a:solidFill>
                 <a:latin typeface="Gill Sans Nova" panose="020B0602020104020203" pitchFamily="34" charset="0"/>
               </a:rPr>
               <a:t>P161 has spatial projection </a:t>
@@ -11356,7 +11397,11 @@
               <a:gd name="adj1" fmla="val 50000"/>
             </a:avLst>
           </a:prstGeom>
-          <a:ln>
+          <a:ln w="12700">
+            <a:solidFill>
+              <a:srgbClr val="8A6868"/>
+            </a:solidFill>
+            <a:prstDash val="sysDot"/>
             <a:tailEnd type="triangle"/>
           </a:ln>
         </p:spPr>
@@ -11389,7 +11434,7 @@
         </p:nvSpPr>
         <p:spPr>
           <a:xfrm>
-            <a:off x="11088008" y="24579955"/>
+            <a:off x="11337455" y="24629851"/>
             <a:ext cx="1045625" cy="369332"/>
           </a:xfrm>
           <a:prstGeom prst="rect">
@@ -11406,6 +11451,9 @@
             <a:pPr algn="ctr"/>
             <a:r>
               <a:rPr lang="fr-FR" sz="900" i="1" dirty="0">
+                <a:solidFill>
+                  <a:srgbClr val="8A6868"/>
+                </a:solidFill>
                 <a:latin typeface="Gill Sans Nova" panose="020B0602020104020203" pitchFamily="34" charset="0"/>
               </a:rPr>
               <a:t>P161 has spatial projection</a:t>
@@ -15193,7 +15241,11 @@
               <a:gd name="adj2" fmla="val 92486"/>
             </a:avLst>
           </a:prstGeom>
-          <a:ln>
+          <a:ln w="12700">
+            <a:solidFill>
+              <a:srgbClr val="8A6868"/>
+            </a:solidFill>
+            <a:prstDash val="sysDot"/>
             <a:tailEnd type="triangle"/>
           </a:ln>
         </p:spPr>
@@ -15243,6 +15295,9 @@
             <a:pPr algn="ctr"/>
             <a:r>
               <a:rPr lang="fr-FR" sz="1050" i="1" dirty="0">
+                <a:solidFill>
+                  <a:srgbClr val="8A6868"/>
+                </a:solidFill>
                 <a:latin typeface="Gill Sans Nova" panose="020B0602020104020203" pitchFamily="34" charset="0"/>
               </a:rPr>
               <a:t>P161 has spatial projection </a:t>
@@ -16036,7 +16091,11 @@
           <a:prstGeom prst="curvedConnector2">
             <a:avLst/>
           </a:prstGeom>
-          <a:ln>
+          <a:ln w="12700">
+            <a:solidFill>
+              <a:srgbClr val="8A6868"/>
+            </a:solidFill>
+            <a:prstDash val="sysDot"/>
             <a:tailEnd type="triangle"/>
           </a:ln>
         </p:spPr>
@@ -16069,7 +16128,7 @@
         </p:nvSpPr>
         <p:spPr>
           <a:xfrm>
-            <a:off x="12205552" y="22903924"/>
+            <a:off x="12115300" y="22979637"/>
             <a:ext cx="1242988" cy="230832"/>
           </a:xfrm>
           <a:prstGeom prst="rect">
@@ -16086,29 +16145,44 @@
             <a:pPr algn="ctr"/>
             <a:r>
               <a:rPr lang="fr-FR" sz="900" i="1" dirty="0">
+                <a:solidFill>
+                  <a:srgbClr val="8A6868"/>
+                </a:solidFill>
                 <a:latin typeface="Gill Sans Nova" panose="020B0602020104020203" pitchFamily="34" charset="0"/>
               </a:rPr>
               <a:t>P121 </a:t>
             </a:r>
             <a:r>
               <a:rPr lang="fr-FR" sz="900" i="1" dirty="0" err="1">
+                <a:solidFill>
+                  <a:srgbClr val="8A6868"/>
+                </a:solidFill>
                 <a:latin typeface="Gill Sans Nova" panose="020B0602020104020203" pitchFamily="34" charset="0"/>
               </a:rPr>
               <a:t>overlaps</a:t>
             </a:r>
             <a:r>
               <a:rPr lang="fr-FR" sz="900" i="1" dirty="0">
+                <a:solidFill>
+                  <a:srgbClr val="8A6868"/>
+                </a:solidFill>
                 <a:latin typeface="Gill Sans Nova" panose="020B0602020104020203" pitchFamily="34" charset="0"/>
               </a:rPr>
               <a:t> </a:t>
             </a:r>
             <a:r>
               <a:rPr lang="fr-FR" sz="900" i="1" dirty="0" err="1">
+                <a:solidFill>
+                  <a:srgbClr val="8A6868"/>
+                </a:solidFill>
                 <a:latin typeface="Gill Sans Nova" panose="020B0602020104020203" pitchFamily="34" charset="0"/>
               </a:rPr>
               <a:t>with</a:t>
             </a:r>
             <a:endParaRPr lang="fr-FR" sz="900" i="1" dirty="0">
+              <a:solidFill>
+                <a:srgbClr val="8A6868"/>
+              </a:solidFill>
               <a:latin typeface="Gill Sans Nova" panose="020B0602020104020203" pitchFamily="34" charset="0"/>
             </a:endParaRPr>
           </a:p>

</xml_diff>

<commit_message>
Update modelisation, requetes SPARQL
</commit_message>
<xml_diff>
--- a/modélisation/mercure-galant-thésaurus-ancien-régime/Modélisation.pptx
+++ b/modélisation/mercure-galant-thésaurus-ancien-régime/Modélisation.pptx
@@ -243,7 +243,7 @@
           <a:p>
             <a:fld id="{F96D367F-7370-4214-86FB-91D90BAC4FAD}" type="datetimeFigureOut">
               <a:rPr lang="fr-FR" smtClean="0"/>
-              <a:t>08/01/2021</a:t>
+              <a:t>20/01/2021</a:t>
             </a:fld>
             <a:endParaRPr lang="fr-FR"/>
           </a:p>
@@ -413,7 +413,7 @@
           <a:p>
             <a:fld id="{F96D367F-7370-4214-86FB-91D90BAC4FAD}" type="datetimeFigureOut">
               <a:rPr lang="fr-FR" smtClean="0"/>
-              <a:t>08/01/2021</a:t>
+              <a:t>20/01/2021</a:t>
             </a:fld>
             <a:endParaRPr lang="fr-FR"/>
           </a:p>
@@ -593,7 +593,7 @@
           <a:p>
             <a:fld id="{F96D367F-7370-4214-86FB-91D90BAC4FAD}" type="datetimeFigureOut">
               <a:rPr lang="fr-FR" smtClean="0"/>
-              <a:t>08/01/2021</a:t>
+              <a:t>20/01/2021</a:t>
             </a:fld>
             <a:endParaRPr lang="fr-FR"/>
           </a:p>
@@ -763,7 +763,7 @@
           <a:p>
             <a:fld id="{F96D367F-7370-4214-86FB-91D90BAC4FAD}" type="datetimeFigureOut">
               <a:rPr lang="fr-FR" smtClean="0"/>
-              <a:t>08/01/2021</a:t>
+              <a:t>20/01/2021</a:t>
             </a:fld>
             <a:endParaRPr lang="fr-FR"/>
           </a:p>
@@ -1007,7 +1007,7 @@
           <a:p>
             <a:fld id="{F96D367F-7370-4214-86FB-91D90BAC4FAD}" type="datetimeFigureOut">
               <a:rPr lang="fr-FR" smtClean="0"/>
-              <a:t>08/01/2021</a:t>
+              <a:t>20/01/2021</a:t>
             </a:fld>
             <a:endParaRPr lang="fr-FR"/>
           </a:p>
@@ -1239,7 +1239,7 @@
           <a:p>
             <a:fld id="{F96D367F-7370-4214-86FB-91D90BAC4FAD}" type="datetimeFigureOut">
               <a:rPr lang="fr-FR" smtClean="0"/>
-              <a:t>08/01/2021</a:t>
+              <a:t>20/01/2021</a:t>
             </a:fld>
             <a:endParaRPr lang="fr-FR"/>
           </a:p>
@@ -1606,7 +1606,7 @@
           <a:p>
             <a:fld id="{F96D367F-7370-4214-86FB-91D90BAC4FAD}" type="datetimeFigureOut">
               <a:rPr lang="fr-FR" smtClean="0"/>
-              <a:t>08/01/2021</a:t>
+              <a:t>20/01/2021</a:t>
             </a:fld>
             <a:endParaRPr lang="fr-FR"/>
           </a:p>
@@ -1724,7 +1724,7 @@
           <a:p>
             <a:fld id="{F96D367F-7370-4214-86FB-91D90BAC4FAD}" type="datetimeFigureOut">
               <a:rPr lang="fr-FR" smtClean="0"/>
-              <a:t>08/01/2021</a:t>
+              <a:t>20/01/2021</a:t>
             </a:fld>
             <a:endParaRPr lang="fr-FR"/>
           </a:p>
@@ -1819,7 +1819,7 @@
           <a:p>
             <a:fld id="{F96D367F-7370-4214-86FB-91D90BAC4FAD}" type="datetimeFigureOut">
               <a:rPr lang="fr-FR" smtClean="0"/>
-              <a:t>08/01/2021</a:t>
+              <a:t>20/01/2021</a:t>
             </a:fld>
             <a:endParaRPr lang="fr-FR"/>
           </a:p>
@@ -2096,7 +2096,7 @@
           <a:p>
             <a:fld id="{F96D367F-7370-4214-86FB-91D90BAC4FAD}" type="datetimeFigureOut">
               <a:rPr lang="fr-FR" smtClean="0"/>
-              <a:t>08/01/2021</a:t>
+              <a:t>20/01/2021</a:t>
             </a:fld>
             <a:endParaRPr lang="fr-FR"/>
           </a:p>
@@ -2353,7 +2353,7 @@
           <a:p>
             <a:fld id="{F96D367F-7370-4214-86FB-91D90BAC4FAD}" type="datetimeFigureOut">
               <a:rPr lang="fr-FR" smtClean="0"/>
-              <a:t>08/01/2021</a:t>
+              <a:t>20/01/2021</a:t>
             </a:fld>
             <a:endParaRPr lang="fr-FR"/>
           </a:p>
@@ -2566,7 +2566,7 @@
           <a:p>
             <a:fld id="{F96D367F-7370-4214-86FB-91D90BAC4FAD}" type="datetimeFigureOut">
               <a:rPr lang="fr-FR" smtClean="0"/>
-              <a:t>08/01/2021</a:t>
+              <a:t>20/01/2021</a:t>
             </a:fld>
             <a:endParaRPr lang="fr-FR"/>
           </a:p>
@@ -9174,7 +9174,7 @@
         </p:nvSpPr>
         <p:spPr>
           <a:xfrm>
-            <a:off x="28903175" y="20455931"/>
+            <a:off x="30344616" y="20544411"/>
             <a:ext cx="1311925" cy="856482"/>
           </a:xfrm>
           <a:prstGeom prst="roundRect">
@@ -9227,7 +9227,7 @@
                 </a:solidFill>
                 <a:latin typeface="Gill Sans Nova" panose="020B0602020104020203" pitchFamily="34" charset="0"/>
               </a:rPr>
-              <a:t>(« Marchands du Pont Neuf »)</a:t>
+              <a:t>(« Marchands et artisans privilégiés selon la cour »)</a:t>
             </a:r>
           </a:p>
         </p:txBody>
@@ -9827,49 +9827,6 @@
           </a:p>
         </p:txBody>
       </p:sp>
-      <p:cxnSp>
-        <p:nvCxnSpPr>
-          <p:cNvPr id="1275" name="Connecteur droit avec flèche 1274">
-            <a:extLst>
-              <a:ext uri="{FF2B5EF4-FFF2-40B4-BE49-F238E27FC236}">
-                <a16:creationId xmlns:a16="http://schemas.microsoft.com/office/drawing/2014/main" id="{39CF7ED8-3163-4F7C-92E3-C369C4AB00EA}"/>
-              </a:ext>
-            </a:extLst>
-          </p:cNvPr>
-          <p:cNvCxnSpPr>
-            <a:cxnSpLocks/>
-            <a:stCxn id="1292" idx="0"/>
-            <a:endCxn id="1203" idx="2"/>
-          </p:cNvCxnSpPr>
-          <p:nvPr/>
-        </p:nvCxnSpPr>
-        <p:spPr>
-          <a:xfrm flipV="1">
-            <a:off x="29553558" y="21312415"/>
-            <a:ext cx="5578" cy="2593227"/>
-          </a:xfrm>
-          <a:prstGeom prst="straightConnector1">
-            <a:avLst/>
-          </a:prstGeom>
-          <a:ln>
-            <a:tailEnd type="triangle"/>
-          </a:ln>
-        </p:spPr>
-        <p:style>
-          <a:lnRef idx="1">
-            <a:schemeClr val="dk1"/>
-          </a:lnRef>
-          <a:fillRef idx="0">
-            <a:schemeClr val="dk1"/>
-          </a:fillRef>
-          <a:effectRef idx="0">
-            <a:schemeClr val="dk1"/>
-          </a:effectRef>
-          <a:fontRef idx="minor">
-            <a:schemeClr val="tx1"/>
-          </a:fontRef>
-        </p:style>
-      </p:cxnSp>
       <p:sp>
         <p:nvSpPr>
           <p:cNvPr id="1279" name="Rectangle : coins arrondis 1278">
@@ -9884,8 +9841,8 @@
         </p:nvSpPr>
         <p:spPr>
           <a:xfrm>
-            <a:off x="33261830" y="20687506"/>
-            <a:ext cx="856380" cy="433699"/>
+            <a:off x="34161647" y="20561948"/>
+            <a:ext cx="1094908" cy="821407"/>
           </a:xfrm>
           <a:prstGeom prst="roundRect">
             <a:avLst/>
@@ -9926,6 +9883,18 @@
               <a:t>E7 Activity</a:t>
             </a:r>
           </a:p>
+          <a:p>
+            <a:pPr algn="ctr"/>
+            <a:r>
+              <a:rPr lang="fr-FR" sz="900" dirty="0">
+                <a:solidFill>
+                  <a:schemeClr val="bg1"/>
+                </a:solidFill>
+                <a:latin typeface="Gill Sans Nova" panose="020B0602020104020203" pitchFamily="34" charset="0"/>
+              </a:rPr>
+              <a:t>(« Marchand de vin du roi »)</a:t>
+            </a:r>
+          </a:p>
         </p:txBody>
       </p:sp>
       <p:cxnSp>
@@ -9945,9 +9914,9 @@
           <p:nvPr/>
         </p:nvCxnSpPr>
         <p:spPr>
-          <a:xfrm flipH="1" flipV="1">
-            <a:off x="30215098" y="20884172"/>
-            <a:ext cx="3046732" cy="20182"/>
+          <a:xfrm flipH="1">
+            <a:off x="31656541" y="20972652"/>
+            <a:ext cx="2505106" cy="0"/>
           </a:xfrm>
           <a:prstGeom prst="straightConnector1">
             <a:avLst/>
@@ -9985,7 +9954,7 @@
         </p:nvSpPr>
         <p:spPr>
           <a:xfrm>
-            <a:off x="30489082" y="20656448"/>
+            <a:off x="31930523" y="20744928"/>
             <a:ext cx="1484002" cy="230832"/>
           </a:xfrm>
           <a:prstGeom prst="rect">
@@ -10021,82 +9990,6 @@
           </a:p>
         </p:txBody>
       </p:sp>
-      <p:sp>
-        <p:nvSpPr>
-          <p:cNvPr id="1292" name="Rectangle : coins arrondis 1291">
-            <a:extLst>
-              <a:ext uri="{FF2B5EF4-FFF2-40B4-BE49-F238E27FC236}">
-                <a16:creationId xmlns:a16="http://schemas.microsoft.com/office/drawing/2014/main" id="{0F09B883-DF28-4074-96F1-E2F16E68559B}"/>
-              </a:ext>
-            </a:extLst>
-          </p:cNvPr>
-          <p:cNvSpPr/>
-          <p:nvPr/>
-        </p:nvSpPr>
-        <p:spPr>
-          <a:xfrm>
-            <a:off x="28966602" y="23905642"/>
-            <a:ext cx="1173915" cy="623617"/>
-          </a:xfrm>
-          <a:prstGeom prst="roundRect">
-            <a:avLst/>
-          </a:prstGeom>
-          <a:solidFill>
-            <a:srgbClr val="ED9797"/>
-          </a:solidFill>
-          <a:ln w="28575">
-            <a:noFill/>
-          </a:ln>
-        </p:spPr>
-        <p:style>
-          <a:lnRef idx="2">
-            <a:schemeClr val="accent6"/>
-          </a:lnRef>
-          <a:fillRef idx="1">
-            <a:schemeClr val="lt1"/>
-          </a:fillRef>
-          <a:effectRef idx="0">
-            <a:schemeClr val="accent6"/>
-          </a:effectRef>
-          <a:fontRef idx="minor">
-            <a:schemeClr val="dk1"/>
-          </a:fontRef>
-        </p:style>
-        <p:txBody>
-          <a:bodyPr rtlCol="0" anchor="ctr"/>
-          <a:lstStyle/>
-          <a:p>
-            <a:pPr algn="ctr"/>
-            <a:r>
-              <a:rPr lang="fr-FR" sz="900" dirty="0">
-                <a:solidFill>
-                  <a:schemeClr val="bg1"/>
-                </a:solidFill>
-                <a:latin typeface="Gill Sans Nova" panose="020B0602020104020203" pitchFamily="34" charset="0"/>
-              </a:rPr>
-              <a:t>E32 </a:t>
-            </a:r>
-            <a:r>
-              <a:rPr lang="fr-FR" sz="900" dirty="0" err="1">
-                <a:solidFill>
-                  <a:schemeClr val="bg1"/>
-                </a:solidFill>
-                <a:latin typeface="Gill Sans Nova" panose="020B0602020104020203" pitchFamily="34" charset="0"/>
-              </a:rPr>
-              <a:t>Authority</a:t>
-            </a:r>
-            <a:r>
-              <a:rPr lang="fr-FR" sz="900" dirty="0">
-                <a:solidFill>
-                  <a:schemeClr val="bg1"/>
-                </a:solidFill>
-                <a:latin typeface="Gill Sans Nova" panose="020B0602020104020203" pitchFamily="34" charset="0"/>
-              </a:rPr>
-              <a:t> Document</a:t>
-            </a:r>
-          </a:p>
-        </p:txBody>
-      </p:sp>
       <p:cxnSp>
         <p:nvCxnSpPr>
           <p:cNvPr id="1295" name="Connecteur droit avec flèche 1294">
@@ -10109,14 +10002,14 @@
           <p:cNvCxnSpPr>
             <a:cxnSpLocks/>
             <a:stCxn id="1261" idx="0"/>
-            <a:endCxn id="1292" idx="2"/>
+            <a:endCxn id="256" idx="2"/>
           </p:cNvCxnSpPr>
           <p:nvPr/>
         </p:nvCxnSpPr>
         <p:spPr>
           <a:xfrm flipV="1">
-            <a:off x="29553558" y="24529259"/>
-            <a:ext cx="0" cy="1276773"/>
+            <a:off x="29553558" y="23309221"/>
+            <a:ext cx="27995" cy="2496809"/>
           </a:xfrm>
           <a:prstGeom prst="straightConnector1">
             <a:avLst/>
@@ -10192,53 +10085,6 @@
       </p:sp>
       <p:sp>
         <p:nvSpPr>
-          <p:cNvPr id="1301" name="ZoneTexte 1300">
-            <a:extLst>
-              <a:ext uri="{FF2B5EF4-FFF2-40B4-BE49-F238E27FC236}">
-                <a16:creationId xmlns:a16="http://schemas.microsoft.com/office/drawing/2014/main" id="{6A0F3D55-582D-42B3-AFB6-93EDC2645C4B}"/>
-              </a:ext>
-            </a:extLst>
-          </p:cNvPr>
-          <p:cNvSpPr txBox="1"/>
-          <p:nvPr/>
-        </p:nvSpPr>
-        <p:spPr>
-          <a:xfrm>
-            <a:off x="29123809" y="23437908"/>
-            <a:ext cx="1484002" cy="230832"/>
-          </a:xfrm>
-          <a:prstGeom prst="rect">
-            <a:avLst/>
-          </a:prstGeom>
-          <a:noFill/>
-        </p:spPr>
-        <p:txBody>
-          <a:bodyPr wrap="square" rtlCol="0">
-            <a:spAutoFit/>
-          </a:bodyPr>
-          <a:lstStyle/>
-          <a:p>
-            <a:pPr algn="ctr"/>
-            <a:r>
-              <a:rPr lang="fr-FR" sz="900" i="1" dirty="0">
-                <a:latin typeface="Gill Sans Nova" panose="020B0602020104020203" pitchFamily="34" charset="0"/>
-              </a:rPr>
-              <a:t>P71 </a:t>
-            </a:r>
-            <a:r>
-              <a:rPr lang="fr-FR" sz="900" i="1" dirty="0" err="1">
-                <a:latin typeface="Gill Sans Nova" panose="020B0602020104020203" pitchFamily="34" charset="0"/>
-              </a:rPr>
-              <a:t>lists</a:t>
-            </a:r>
-            <a:endParaRPr lang="fr-FR" sz="900" i="1" dirty="0">
-              <a:latin typeface="Gill Sans Nova" panose="020B0602020104020203" pitchFamily="34" charset="0"/>
-            </a:endParaRPr>
-          </a:p>
-        </p:txBody>
-      </p:sp>
-      <p:sp>
-        <p:nvSpPr>
           <p:cNvPr id="1317" name="Rectangle : coins arrondis 1316">
             <a:extLst>
               <a:ext uri="{FF2B5EF4-FFF2-40B4-BE49-F238E27FC236}">
@@ -10251,7 +10097,7 @@
         </p:nvSpPr>
         <p:spPr>
           <a:xfrm>
-            <a:off x="35190945" y="23408737"/>
+            <a:off x="35564204" y="22562026"/>
             <a:ext cx="976814" cy="458655"/>
           </a:xfrm>
           <a:prstGeom prst="roundRect">
@@ -10312,7 +10158,7 @@
         </p:nvSpPr>
         <p:spPr>
           <a:xfrm>
-            <a:off x="34169928" y="22034136"/>
+            <a:off x="34902440" y="21709148"/>
             <a:ext cx="1484002" cy="230832"/>
           </a:xfrm>
           <a:prstGeom prst="rect">
@@ -10363,8 +10209,8 @@
         </p:nvCxnSpPr>
         <p:spPr>
           <a:xfrm rot="16200000" flipH="1">
-            <a:off x="33540920" y="21270303"/>
-            <a:ext cx="2287532" cy="1989332"/>
+            <a:off x="34791521" y="21300935"/>
+            <a:ext cx="1178671" cy="1343510"/>
           </a:xfrm>
           <a:prstGeom prst="curvedConnector3">
             <a:avLst>
@@ -12998,7 +12844,7 @@
         </p:nvSpPr>
         <p:spPr>
           <a:xfrm>
-            <a:off x="27098135" y="20709275"/>
+            <a:off x="27571868" y="20720402"/>
             <a:ext cx="1484002" cy="230832"/>
           </a:xfrm>
           <a:prstGeom prst="rect">
@@ -13057,7 +12903,7 @@
         </p:nvSpPr>
         <p:spPr>
           <a:xfrm>
-            <a:off x="27262943" y="21493189"/>
+            <a:off x="27640010" y="21677351"/>
             <a:ext cx="1484002" cy="230832"/>
           </a:xfrm>
           <a:prstGeom prst="rect">
@@ -13289,48 +13135,6 @@
       </p:cxnSp>
       <p:cxnSp>
         <p:nvCxnSpPr>
-          <p:cNvPr id="1766" name="Connecteur droit avec flèche 1765">
-            <a:extLst>
-              <a:ext uri="{FF2B5EF4-FFF2-40B4-BE49-F238E27FC236}">
-                <a16:creationId xmlns:a16="http://schemas.microsoft.com/office/drawing/2014/main" id="{904CF09C-AFA1-411E-82EA-94F0EC5666D6}"/>
-              </a:ext>
-            </a:extLst>
-          </p:cNvPr>
-          <p:cNvCxnSpPr>
-            <a:stCxn id="1726" idx="3"/>
-            <a:endCxn id="1203" idx="1"/>
-          </p:cNvCxnSpPr>
-          <p:nvPr/>
-        </p:nvCxnSpPr>
-        <p:spPr>
-          <a:xfrm flipV="1">
-            <a:off x="26774101" y="20884172"/>
-            <a:ext cx="2129072" cy="160840"/>
-          </a:xfrm>
-          <a:prstGeom prst="straightConnector1">
-            <a:avLst/>
-          </a:prstGeom>
-          <a:ln>
-            <a:tailEnd type="triangle"/>
-          </a:ln>
-        </p:spPr>
-        <p:style>
-          <a:lnRef idx="1">
-            <a:schemeClr val="dk1"/>
-          </a:lnRef>
-          <a:fillRef idx="0">
-            <a:schemeClr val="dk1"/>
-          </a:fillRef>
-          <a:effectRef idx="0">
-            <a:schemeClr val="dk1"/>
-          </a:effectRef>
-          <a:fontRef idx="minor">
-            <a:schemeClr val="tx1"/>
-          </a:fontRef>
-        </p:style>
-      </p:cxnSp>
-      <p:cxnSp>
-        <p:nvCxnSpPr>
           <p:cNvPr id="1768" name="Connecteur droit avec flèche 1767">
             <a:extLst>
               <a:ext uri="{FF2B5EF4-FFF2-40B4-BE49-F238E27FC236}">
@@ -13349,48 +13153,6 @@
           <a:xfrm flipH="1" flipV="1">
             <a:off x="23995762" y="20884175"/>
             <a:ext cx="1857952" cy="831648"/>
-          </a:xfrm>
-          <a:prstGeom prst="straightConnector1">
-            <a:avLst/>
-          </a:prstGeom>
-          <a:ln>
-            <a:tailEnd type="triangle"/>
-          </a:ln>
-        </p:spPr>
-        <p:style>
-          <a:lnRef idx="1">
-            <a:schemeClr val="dk1"/>
-          </a:lnRef>
-          <a:fillRef idx="0">
-            <a:schemeClr val="dk1"/>
-          </a:fillRef>
-          <a:effectRef idx="0">
-            <a:schemeClr val="dk1"/>
-          </a:effectRef>
-          <a:fontRef idx="minor">
-            <a:schemeClr val="tx1"/>
-          </a:fontRef>
-        </p:style>
-      </p:cxnSp>
-      <p:cxnSp>
-        <p:nvCxnSpPr>
-          <p:cNvPr id="1770" name="Connecteur droit avec flèche 1769">
-            <a:extLst>
-              <a:ext uri="{FF2B5EF4-FFF2-40B4-BE49-F238E27FC236}">
-                <a16:creationId xmlns:a16="http://schemas.microsoft.com/office/drawing/2014/main" id="{A7C6861D-4A46-45F0-9707-06C08ED409FA}"/>
-              </a:ext>
-            </a:extLst>
-          </p:cNvPr>
-          <p:cNvCxnSpPr>
-            <a:stCxn id="1728" idx="3"/>
-            <a:endCxn id="1203" idx="1"/>
-          </p:cNvCxnSpPr>
-          <p:nvPr/>
-        </p:nvCxnSpPr>
-        <p:spPr>
-          <a:xfrm flipV="1">
-            <a:off x="26782734" y="20884174"/>
-            <a:ext cx="2120441" cy="831649"/>
           </a:xfrm>
           <a:prstGeom prst="straightConnector1">
             <a:avLst/>
@@ -13972,12 +13734,99 @@
           </a:fontRef>
         </p:style>
       </p:cxnSp>
-      <p:sp>
-        <p:nvSpPr>
-          <p:cNvPr id="30" name="Rectangle : coins arrondis 29">
-            <a:extLst>
-              <a:ext uri="{FF2B5EF4-FFF2-40B4-BE49-F238E27FC236}">
-                <a16:creationId xmlns:a16="http://schemas.microsoft.com/office/drawing/2014/main" id="{E1108952-A148-4B6F-980E-3BDBA44CA185}"/>
+      <p:cxnSp>
+        <p:nvCxnSpPr>
+          <p:cNvPr id="55" name="Connecteur : en arc 54">
+            <a:extLst>
+              <a:ext uri="{FF2B5EF4-FFF2-40B4-BE49-F238E27FC236}">
+                <a16:creationId xmlns:a16="http://schemas.microsoft.com/office/drawing/2014/main" id="{156CBF43-9AB9-480C-A4D8-8FD85A1EA9A4}"/>
+              </a:ext>
+            </a:extLst>
+          </p:cNvPr>
+          <p:cNvCxnSpPr>
+            <a:cxnSpLocks/>
+            <a:stCxn id="1279" idx="2"/>
+            <a:endCxn id="1374" idx="3"/>
+          </p:cNvCxnSpPr>
+          <p:nvPr/>
+        </p:nvCxnSpPr>
+        <p:spPr>
+          <a:xfrm rot="5400000">
+            <a:off x="26466768" y="20963640"/>
+            <a:ext cx="7822618" cy="8662049"/>
+          </a:xfrm>
+          <a:prstGeom prst="curvedConnector2">
+            <a:avLst/>
+          </a:prstGeom>
+        </p:spPr>
+        <p:style>
+          <a:lnRef idx="1">
+            <a:schemeClr val="dk1"/>
+          </a:lnRef>
+          <a:fillRef idx="0">
+            <a:schemeClr val="dk1"/>
+          </a:fillRef>
+          <a:effectRef idx="0">
+            <a:schemeClr val="dk1"/>
+          </a:effectRef>
+          <a:fontRef idx="minor">
+            <a:schemeClr val="tx1"/>
+          </a:fontRef>
+        </p:style>
+      </p:cxnSp>
+      <p:sp>
+        <p:nvSpPr>
+          <p:cNvPr id="63" name="ZoneTexte 62">
+            <a:extLst>
+              <a:ext uri="{FF2B5EF4-FFF2-40B4-BE49-F238E27FC236}">
+                <a16:creationId xmlns:a16="http://schemas.microsoft.com/office/drawing/2014/main" id="{04D98324-7737-4601-98E2-15E6BCD64BC4}"/>
+              </a:ext>
+            </a:extLst>
+          </p:cNvPr>
+          <p:cNvSpPr txBox="1"/>
+          <p:nvPr/>
+        </p:nvSpPr>
+        <p:spPr>
+          <a:xfrm>
+            <a:off x="23138760" y="27282839"/>
+            <a:ext cx="1484002" cy="230832"/>
+          </a:xfrm>
+          <a:prstGeom prst="rect">
+            <a:avLst/>
+          </a:prstGeom>
+          <a:noFill/>
+        </p:spPr>
+        <p:txBody>
+          <a:bodyPr wrap="square" rtlCol="0">
+            <a:spAutoFit/>
+          </a:bodyPr>
+          <a:lstStyle/>
+          <a:p>
+            <a:pPr algn="ctr"/>
+            <a:r>
+              <a:rPr lang="fr-FR" sz="900" i="1" dirty="0">
+                <a:latin typeface="Gill Sans Nova" panose="020B0602020104020203" pitchFamily="34" charset="0"/>
+              </a:rPr>
+              <a:t>P71 </a:t>
+            </a:r>
+            <a:r>
+              <a:rPr lang="fr-FR" sz="900" i="1" dirty="0" err="1">
+                <a:latin typeface="Gill Sans Nova" panose="020B0602020104020203" pitchFamily="34" charset="0"/>
+              </a:rPr>
+              <a:t>lists</a:t>
+            </a:r>
+            <a:endParaRPr lang="fr-FR" sz="900" i="1" dirty="0">
+              <a:latin typeface="Gill Sans Nova" panose="020B0602020104020203" pitchFamily="34" charset="0"/>
+            </a:endParaRPr>
+          </a:p>
+        </p:txBody>
+      </p:sp>
+      <p:sp>
+        <p:nvSpPr>
+          <p:cNvPr id="10" name="Rectangle : coins arrondis 9">
+            <a:extLst>
+              <a:ext uri="{FF2B5EF4-FFF2-40B4-BE49-F238E27FC236}">
+                <a16:creationId xmlns:a16="http://schemas.microsoft.com/office/drawing/2014/main" id="{AC78E822-F524-4111-9F04-3E69337C8308}"/>
               </a:ext>
             </a:extLst>
           </p:cNvPr>
@@ -13986,16 +13835,16 @@
         </p:nvSpPr>
         <p:spPr>
           <a:xfrm>
-            <a:off x="33201228" y="19814235"/>
-            <a:ext cx="960209" cy="437614"/>
+            <a:off x="9305199" y="20847046"/>
+            <a:ext cx="1062750" cy="508618"/>
           </a:xfrm>
           <a:prstGeom prst="roundRect">
             <a:avLst/>
           </a:prstGeom>
           <a:solidFill>
-            <a:srgbClr val="F6CACA"/>
+            <a:srgbClr val="9E96DA"/>
           </a:solidFill>
-          <a:ln w="12700">
+          <a:ln w="28575">
             <a:noFill/>
           </a:ln>
         </p:spPr>
@@ -14021,280 +13870,48 @@
             <a:r>
               <a:rPr lang="fr-FR" sz="900" dirty="0">
                 <a:solidFill>
-                  <a:schemeClr val="tx1"/>
-                </a:solidFill>
-                <a:latin typeface="Gill Sans Nova" panose="020B0602020104020203" pitchFamily="34" charset="0"/>
-              </a:rPr>
-              <a:t>E55 Type</a:t>
-            </a:r>
-          </a:p>
-          <a:p>
-            <a:pPr algn="ctr"/>
-            <a:r>
-              <a:rPr lang="fr-FR" sz="900" i="1" dirty="0">
-                <a:solidFill>
-                  <a:schemeClr val="tx1"/>
-                </a:solidFill>
-                <a:latin typeface="Gill Sans Nova" panose="020B0602020104020203" pitchFamily="34" charset="0"/>
-              </a:rPr>
-              <a:t>« Marchand »</a:t>
-            </a:r>
-          </a:p>
-        </p:txBody>
-      </p:sp>
-      <p:sp>
-        <p:nvSpPr>
-          <p:cNvPr id="31" name="ZoneTexte 30">
-            <a:extLst>
-              <a:ext uri="{FF2B5EF4-FFF2-40B4-BE49-F238E27FC236}">
-                <a16:creationId xmlns:a16="http://schemas.microsoft.com/office/drawing/2014/main" id="{E0A8A2CF-12CB-4426-BF31-2DB8F1593B69}"/>
-              </a:ext>
-            </a:extLst>
-          </p:cNvPr>
-          <p:cNvSpPr txBox="1"/>
-          <p:nvPr/>
-        </p:nvSpPr>
-        <p:spPr>
-          <a:xfrm>
-            <a:off x="33673436" y="20356961"/>
-            <a:ext cx="584724" cy="230832"/>
-          </a:xfrm>
-          <a:prstGeom prst="rect">
-            <a:avLst/>
-          </a:prstGeom>
-          <a:noFill/>
-        </p:spPr>
-        <p:txBody>
-          <a:bodyPr wrap="square" rtlCol="0">
-            <a:spAutoFit/>
-          </a:bodyPr>
-          <a:lstStyle/>
-          <a:p>
-            <a:pPr algn="ctr"/>
-            <a:r>
-              <a:rPr lang="fr-FR" sz="900" i="1" dirty="0">
-                <a:latin typeface="Gill Sans Nova" panose="020B0602020104020203" pitchFamily="34" charset="0"/>
-              </a:rPr>
-              <a:t>P14.1</a:t>
-            </a:r>
-          </a:p>
-        </p:txBody>
-      </p:sp>
-      <p:cxnSp>
-        <p:nvCxnSpPr>
-          <p:cNvPr id="33" name="Connecteur droit avec flèche 32">
-            <a:extLst>
-              <a:ext uri="{FF2B5EF4-FFF2-40B4-BE49-F238E27FC236}">
-                <a16:creationId xmlns:a16="http://schemas.microsoft.com/office/drawing/2014/main" id="{93556B79-91E7-4C5D-9780-8AD0A84809DC}"/>
-              </a:ext>
-            </a:extLst>
-          </p:cNvPr>
-          <p:cNvCxnSpPr>
-            <a:stCxn id="1279" idx="0"/>
-            <a:endCxn id="30" idx="2"/>
-          </p:cNvCxnSpPr>
-          <p:nvPr/>
-        </p:nvCxnSpPr>
-        <p:spPr>
-          <a:xfrm flipH="1" flipV="1">
-            <a:off x="33681333" y="20251851"/>
-            <a:ext cx="8689" cy="435655"/>
-          </a:xfrm>
-          <a:prstGeom prst="straightConnector1">
-            <a:avLst/>
-          </a:prstGeom>
-          <a:ln>
-            <a:tailEnd type="triangle"/>
-          </a:ln>
-        </p:spPr>
-        <p:style>
-          <a:lnRef idx="1">
-            <a:schemeClr val="dk1"/>
-          </a:lnRef>
-          <a:fillRef idx="0">
-            <a:schemeClr val="dk1"/>
-          </a:fillRef>
-          <a:effectRef idx="0">
-            <a:schemeClr val="dk1"/>
-          </a:effectRef>
-          <a:fontRef idx="minor">
-            <a:schemeClr val="tx1"/>
-          </a:fontRef>
-        </p:style>
-      </p:cxnSp>
-      <p:cxnSp>
-        <p:nvCxnSpPr>
-          <p:cNvPr id="48" name="Connecteur droit avec flèche 47">
-            <a:extLst>
-              <a:ext uri="{FF2B5EF4-FFF2-40B4-BE49-F238E27FC236}">
-                <a16:creationId xmlns:a16="http://schemas.microsoft.com/office/drawing/2014/main" id="{BEBBDA62-DE0E-4735-BE9C-EA71F7EAF73C}"/>
-              </a:ext>
-            </a:extLst>
-          </p:cNvPr>
-          <p:cNvCxnSpPr>
-            <a:cxnSpLocks/>
-            <a:stCxn id="1292" idx="3"/>
-            <a:endCxn id="200" idx="1"/>
-          </p:cNvCxnSpPr>
-          <p:nvPr/>
-        </p:nvCxnSpPr>
-        <p:spPr>
-          <a:xfrm flipV="1">
-            <a:off x="30140517" y="24217450"/>
-            <a:ext cx="877781" cy="1"/>
-          </a:xfrm>
-          <a:prstGeom prst="straightConnector1">
-            <a:avLst/>
-          </a:prstGeom>
-          <a:ln>
-            <a:tailEnd type="triangle"/>
-          </a:ln>
-        </p:spPr>
-        <p:style>
-          <a:lnRef idx="1">
-            <a:schemeClr val="dk1"/>
-          </a:lnRef>
-          <a:fillRef idx="0">
-            <a:schemeClr val="dk1"/>
-          </a:fillRef>
-          <a:effectRef idx="0">
-            <a:schemeClr val="dk1"/>
-          </a:effectRef>
-          <a:fontRef idx="minor">
-            <a:schemeClr val="tx1"/>
-          </a:fontRef>
-        </p:style>
-      </p:cxnSp>
-      <p:cxnSp>
-        <p:nvCxnSpPr>
-          <p:cNvPr id="55" name="Connecteur : en arc 54">
-            <a:extLst>
-              <a:ext uri="{FF2B5EF4-FFF2-40B4-BE49-F238E27FC236}">
-                <a16:creationId xmlns:a16="http://schemas.microsoft.com/office/drawing/2014/main" id="{156CBF43-9AB9-480C-A4D8-8FD85A1EA9A4}"/>
-              </a:ext>
-            </a:extLst>
-          </p:cNvPr>
-          <p:cNvCxnSpPr>
-            <a:stCxn id="1279" idx="2"/>
-            <a:endCxn id="1374" idx="3"/>
-          </p:cNvCxnSpPr>
-          <p:nvPr/>
-        </p:nvCxnSpPr>
-        <p:spPr>
-          <a:xfrm rot="5400000">
-            <a:off x="25826152" y="21342104"/>
-            <a:ext cx="8084768" cy="7642968"/>
-          </a:xfrm>
-          <a:prstGeom prst="curvedConnector2">
-            <a:avLst/>
-          </a:prstGeom>
-        </p:spPr>
-        <p:style>
-          <a:lnRef idx="1">
-            <a:schemeClr val="dk1"/>
-          </a:lnRef>
-          <a:fillRef idx="0">
-            <a:schemeClr val="dk1"/>
-          </a:fillRef>
-          <a:effectRef idx="0">
-            <a:schemeClr val="dk1"/>
-          </a:effectRef>
-          <a:fontRef idx="minor">
-            <a:schemeClr val="tx1"/>
-          </a:fontRef>
-        </p:style>
-      </p:cxnSp>
-      <p:sp>
-        <p:nvSpPr>
-          <p:cNvPr id="63" name="ZoneTexte 62">
-            <a:extLst>
-              <a:ext uri="{FF2B5EF4-FFF2-40B4-BE49-F238E27FC236}">
-                <a16:creationId xmlns:a16="http://schemas.microsoft.com/office/drawing/2014/main" id="{04D98324-7737-4601-98E2-15E6BCD64BC4}"/>
-              </a:ext>
-            </a:extLst>
-          </p:cNvPr>
-          <p:cNvSpPr txBox="1"/>
-          <p:nvPr/>
-        </p:nvSpPr>
-        <p:spPr>
-          <a:xfrm>
-            <a:off x="23138760" y="27282839"/>
-            <a:ext cx="1484002" cy="230832"/>
-          </a:xfrm>
-          <a:prstGeom prst="rect">
-            <a:avLst/>
-          </a:prstGeom>
-          <a:noFill/>
-        </p:spPr>
-        <p:txBody>
-          <a:bodyPr wrap="square" rtlCol="0">
-            <a:spAutoFit/>
-          </a:bodyPr>
-          <a:lstStyle/>
-          <a:p>
-            <a:pPr algn="ctr"/>
-            <a:r>
-              <a:rPr lang="fr-FR" sz="900" i="1" dirty="0">
-                <a:latin typeface="Gill Sans Nova" panose="020B0602020104020203" pitchFamily="34" charset="0"/>
-              </a:rPr>
-              <a:t>P71 </a:t>
-            </a:r>
-            <a:r>
-              <a:rPr lang="fr-FR" sz="900" i="1" dirty="0" err="1">
-                <a:latin typeface="Gill Sans Nova" panose="020B0602020104020203" pitchFamily="34" charset="0"/>
-              </a:rPr>
-              <a:t>lists</a:t>
-            </a:r>
-            <a:endParaRPr lang="fr-FR" sz="900" i="1" dirty="0">
+                  <a:schemeClr val="bg1"/>
+                </a:solidFill>
+                <a:latin typeface="Gill Sans Nova" panose="020B0602020104020203" pitchFamily="34" charset="0"/>
+              </a:rPr>
+              <a:t>E4 </a:t>
+            </a:r>
+            <a:r>
+              <a:rPr lang="fr-FR" sz="900" dirty="0" err="1">
+                <a:solidFill>
+                  <a:schemeClr val="bg1"/>
+                </a:solidFill>
+                <a:latin typeface="Gill Sans Nova" panose="020B0602020104020203" pitchFamily="34" charset="0"/>
+              </a:rPr>
+              <a:t>Period</a:t>
+            </a:r>
+            <a:endParaRPr lang="fr-FR" sz="900" dirty="0">
+              <a:solidFill>
+                <a:schemeClr val="bg1"/>
+              </a:solidFill>
               <a:latin typeface="Gill Sans Nova" panose="020B0602020104020203" pitchFamily="34" charset="0"/>
             </a:endParaRPr>
           </a:p>
-        </p:txBody>
-      </p:sp>
-      <p:sp>
-        <p:nvSpPr>
-          <p:cNvPr id="198" name="ZoneTexte 197">
-            <a:extLst>
-              <a:ext uri="{FF2B5EF4-FFF2-40B4-BE49-F238E27FC236}">
-                <a16:creationId xmlns:a16="http://schemas.microsoft.com/office/drawing/2014/main" id="{094D8B2A-BB77-4976-AFB5-B2C552ECF2E2}"/>
-              </a:ext>
-            </a:extLst>
-          </p:cNvPr>
-          <p:cNvSpPr txBox="1"/>
-          <p:nvPr/>
-        </p:nvSpPr>
-        <p:spPr>
-          <a:xfrm>
-            <a:off x="29809350" y="24234188"/>
-            <a:ext cx="1484002" cy="230832"/>
-          </a:xfrm>
-          <a:prstGeom prst="rect">
-            <a:avLst/>
-          </a:prstGeom>
-          <a:noFill/>
-        </p:spPr>
-        <p:txBody>
-          <a:bodyPr wrap="square" rtlCol="0">
-            <a:spAutoFit/>
-          </a:bodyPr>
-          <a:lstStyle/>
           <a:p>
             <a:pPr algn="ctr"/>
             <a:r>
               <a:rPr lang="fr-FR" sz="900" i="1" dirty="0">
-                <a:latin typeface="Gill Sans Nova" panose="020B0602020104020203" pitchFamily="34" charset="0"/>
-              </a:rPr>
-              <a:t>P1</a:t>
-            </a:r>
-          </a:p>
-        </p:txBody>
-      </p:sp>
-      <p:sp>
-        <p:nvSpPr>
-          <p:cNvPr id="200" name="Rectangle : coins arrondis 199">
-            <a:extLst>
-              <a:ext uri="{FF2B5EF4-FFF2-40B4-BE49-F238E27FC236}">
-                <a16:creationId xmlns:a16="http://schemas.microsoft.com/office/drawing/2014/main" id="{4D4EDFCB-E781-4137-842F-BAB2A811CECF}"/>
+                <a:solidFill>
+                  <a:schemeClr val="bg1"/>
+                </a:solidFill>
+                <a:latin typeface="Gill Sans Nova" panose="020B0602020104020203" pitchFamily="34" charset="0"/>
+              </a:rPr>
+              <a:t>« France »</a:t>
+            </a:r>
+          </a:p>
+        </p:txBody>
+      </p:sp>
+      <p:sp>
+        <p:nvSpPr>
+          <p:cNvPr id="18" name="Rectangle : coins arrondis 17">
+            <a:extLst>
+              <a:ext uri="{FF2B5EF4-FFF2-40B4-BE49-F238E27FC236}">
+                <a16:creationId xmlns:a16="http://schemas.microsoft.com/office/drawing/2014/main" id="{087D9C2C-3891-41C6-BBB9-D15E7A8B2B1A}"/>
               </a:ext>
             </a:extLst>
           </p:cNvPr>
@@ -14303,16 +13920,16 @@
         </p:nvSpPr>
         <p:spPr>
           <a:xfrm>
-            <a:off x="31018297" y="23855628"/>
-            <a:ext cx="1745658" cy="723643"/>
+            <a:off x="4380099" y="20854071"/>
+            <a:ext cx="1062750" cy="508618"/>
           </a:xfrm>
           <a:prstGeom prst="roundRect">
             <a:avLst/>
           </a:prstGeom>
           <a:solidFill>
-            <a:srgbClr val="F9C3E7"/>
+            <a:srgbClr val="9E96DA"/>
           </a:solidFill>
-          <a:ln w="38100">
+          <a:ln w="28575">
             <a:noFill/>
           </a:ln>
         </p:spPr>
@@ -14338,33 +13955,140 @@
             <a:r>
               <a:rPr lang="fr-FR" sz="900" dirty="0">
                 <a:solidFill>
-                  <a:schemeClr val="tx1"/>
-                </a:solidFill>
-                <a:latin typeface="Gill Sans Nova" panose="020B0602020104020203" pitchFamily="34" charset="0"/>
-              </a:rPr>
-              <a:t>E41 Appellation</a:t>
-            </a:r>
+                  <a:schemeClr val="bg1"/>
+                </a:solidFill>
+                <a:latin typeface="Gill Sans Nova" panose="020B0602020104020203" pitchFamily="34" charset="0"/>
+              </a:rPr>
+              <a:t>E4 </a:t>
+            </a:r>
+            <a:r>
+              <a:rPr lang="fr-FR" sz="900" dirty="0" err="1">
+                <a:solidFill>
+                  <a:schemeClr val="bg1"/>
+                </a:solidFill>
+                <a:latin typeface="Gill Sans Nova" panose="020B0602020104020203" pitchFamily="34" charset="0"/>
+              </a:rPr>
+              <a:t>Period</a:t>
+            </a:r>
+            <a:endParaRPr lang="fr-FR" sz="900" dirty="0">
+              <a:solidFill>
+                <a:schemeClr val="bg1"/>
+              </a:solidFill>
+              <a:latin typeface="Gill Sans Nova" panose="020B0602020104020203" pitchFamily="34" charset="0"/>
+            </a:endParaRPr>
           </a:p>
           <a:p>
             <a:pPr algn="ctr"/>
             <a:r>
               <a:rPr lang="fr-FR" sz="900" i="1" dirty="0">
                 <a:solidFill>
-                  <a:schemeClr val="tx1"/>
-                </a:solidFill>
-                <a:latin typeface="Gill Sans Nova" panose="020B0602020104020203" pitchFamily="34" charset="0"/>
-              </a:rPr>
-              <a:t>« Communautés de marchands et de bourgeois »</a:t>
-            </a:r>
-          </a:p>
-        </p:txBody>
-      </p:sp>
-      <p:sp>
-        <p:nvSpPr>
-          <p:cNvPr id="10" name="Rectangle : coins arrondis 9">
-            <a:extLst>
-              <a:ext uri="{FF2B5EF4-FFF2-40B4-BE49-F238E27FC236}">
-                <a16:creationId xmlns:a16="http://schemas.microsoft.com/office/drawing/2014/main" id="{AC78E822-F524-4111-9F04-3E69337C8308}"/>
+                  <a:schemeClr val="bg1"/>
+                </a:solidFill>
+                <a:latin typeface="Gill Sans Nova" panose="020B0602020104020203" pitchFamily="34" charset="0"/>
+              </a:rPr>
+              <a:t>« Ile-de-France »</a:t>
+            </a:r>
+          </a:p>
+        </p:txBody>
+      </p:sp>
+      <p:sp>
+        <p:nvSpPr>
+          <p:cNvPr id="25" name="ZoneTexte 24">
+            <a:extLst>
+              <a:ext uri="{FF2B5EF4-FFF2-40B4-BE49-F238E27FC236}">
+                <a16:creationId xmlns:a16="http://schemas.microsoft.com/office/drawing/2014/main" id="{06B2533C-0074-4CCE-B2A3-DCA5F032D8B5}"/>
+              </a:ext>
+            </a:extLst>
+          </p:cNvPr>
+          <p:cNvSpPr txBox="1"/>
+          <p:nvPr/>
+        </p:nvSpPr>
+        <p:spPr>
+          <a:xfrm>
+            <a:off x="6826054" y="20842418"/>
+            <a:ext cx="1516372" cy="230832"/>
+          </a:xfrm>
+          <a:prstGeom prst="rect">
+            <a:avLst/>
+          </a:prstGeom>
+          <a:noFill/>
+        </p:spPr>
+        <p:txBody>
+          <a:bodyPr wrap="square" rtlCol="0">
+            <a:spAutoFit/>
+          </a:bodyPr>
+          <a:lstStyle/>
+          <a:p>
+            <a:pPr algn="ctr"/>
+            <a:r>
+              <a:rPr lang="fr-FR" sz="900" i="1" dirty="0">
+                <a:latin typeface="Gill Sans Nova" panose="020B0602020104020203" pitchFamily="34" charset="0"/>
+              </a:rPr>
+              <a:t>P9 </a:t>
+            </a:r>
+            <a:r>
+              <a:rPr lang="fr-FR" sz="900" i="1" dirty="0" err="1">
+                <a:latin typeface="Gill Sans Nova" panose="020B0602020104020203" pitchFamily="34" charset="0"/>
+              </a:rPr>
+              <a:t>consists</a:t>
+            </a:r>
+            <a:r>
+              <a:rPr lang="fr-FR" sz="900" i="1" dirty="0">
+                <a:latin typeface="Gill Sans Nova" panose="020B0602020104020203" pitchFamily="34" charset="0"/>
+              </a:rPr>
+              <a:t> of</a:t>
+            </a:r>
+          </a:p>
+        </p:txBody>
+      </p:sp>
+      <p:cxnSp>
+        <p:nvCxnSpPr>
+          <p:cNvPr id="42" name="Connecteur droit avec flèche 41">
+            <a:extLst>
+              <a:ext uri="{FF2B5EF4-FFF2-40B4-BE49-F238E27FC236}">
+                <a16:creationId xmlns:a16="http://schemas.microsoft.com/office/drawing/2014/main" id="{5B97E80C-DA2E-4003-B5DD-7622242F351F}"/>
+              </a:ext>
+            </a:extLst>
+          </p:cNvPr>
+          <p:cNvCxnSpPr>
+            <a:stCxn id="10" idx="1"/>
+            <a:endCxn id="18" idx="3"/>
+          </p:cNvCxnSpPr>
+          <p:nvPr/>
+        </p:nvCxnSpPr>
+        <p:spPr>
+          <a:xfrm flipH="1">
+            <a:off x="5442849" y="21101355"/>
+            <a:ext cx="3862350" cy="7025"/>
+          </a:xfrm>
+          <a:prstGeom prst="straightConnector1">
+            <a:avLst/>
+          </a:prstGeom>
+          <a:ln>
+            <a:tailEnd type="triangle"/>
+          </a:ln>
+        </p:spPr>
+        <p:style>
+          <a:lnRef idx="1">
+            <a:schemeClr val="dk1"/>
+          </a:lnRef>
+          <a:fillRef idx="0">
+            <a:schemeClr val="dk1"/>
+          </a:fillRef>
+          <a:effectRef idx="0">
+            <a:schemeClr val="dk1"/>
+          </a:effectRef>
+          <a:fontRef idx="minor">
+            <a:schemeClr val="tx1"/>
+          </a:fontRef>
+        </p:style>
+      </p:cxnSp>
+      <p:sp>
+        <p:nvSpPr>
+          <p:cNvPr id="43" name="Rectangle : coins arrondis 42">
+            <a:extLst>
+              <a:ext uri="{FF2B5EF4-FFF2-40B4-BE49-F238E27FC236}">
+                <a16:creationId xmlns:a16="http://schemas.microsoft.com/office/drawing/2014/main" id="{340CF533-20C7-4B35-BFDB-32A23E9CA09F}"/>
               </a:ext>
             </a:extLst>
           </p:cNvPr>
@@ -14373,14 +14097,14 @@
         </p:nvSpPr>
         <p:spPr>
           <a:xfrm>
-            <a:off x="9305199" y="20847046"/>
-            <a:ext cx="1062750" cy="508618"/>
+            <a:off x="10426442" y="23531281"/>
+            <a:ext cx="1062750" cy="636759"/>
           </a:xfrm>
           <a:prstGeom prst="roundRect">
             <a:avLst/>
           </a:prstGeom>
           <a:solidFill>
-            <a:srgbClr val="9E96DA"/>
+            <a:srgbClr val="8A6868"/>
           </a:solidFill>
           <a:ln w="28575">
             <a:noFill/>
@@ -14412,7 +14136,7 @@
                 </a:solidFill>
                 <a:latin typeface="Gill Sans Nova" panose="020B0602020104020203" pitchFamily="34" charset="0"/>
               </a:rPr>
-              <a:t>E4 </a:t>
+              <a:t>E93 </a:t>
             </a:r>
             <a:r>
               <a:rPr lang="fr-FR" sz="900" dirty="0" err="1">
@@ -14421,7 +14145,7 @@
                 </a:solidFill>
                 <a:latin typeface="Gill Sans Nova" panose="020B0602020104020203" pitchFamily="34" charset="0"/>
               </a:rPr>
-              <a:t>Period</a:t>
+              <a:t>Presence</a:t>
             </a:r>
             <a:endParaRPr lang="fr-FR" sz="900" dirty="0">
               <a:solidFill>
@@ -14439,17 +14163,171 @@
                 </a:solidFill>
                 <a:latin typeface="Gill Sans Nova" panose="020B0602020104020203" pitchFamily="34" charset="0"/>
               </a:rPr>
-              <a:t>« France »</a:t>
-            </a:r>
-          </a:p>
-        </p:txBody>
-      </p:sp>
-      <p:sp>
-        <p:nvSpPr>
-          <p:cNvPr id="18" name="Rectangle : coins arrondis 17">
-            <a:extLst>
-              <a:ext uri="{FF2B5EF4-FFF2-40B4-BE49-F238E27FC236}">
-                <a16:creationId xmlns:a16="http://schemas.microsoft.com/office/drawing/2014/main" id="{087D9C2C-3891-41C6-BBB9-D15E7A8B2B1A}"/>
+              <a:t>« Royaume de France »</a:t>
+            </a:r>
+          </a:p>
+        </p:txBody>
+      </p:sp>
+      <p:cxnSp>
+        <p:nvCxnSpPr>
+          <p:cNvPr id="54" name="Connecteur : en angle 53">
+            <a:extLst>
+              <a:ext uri="{FF2B5EF4-FFF2-40B4-BE49-F238E27FC236}">
+                <a16:creationId xmlns:a16="http://schemas.microsoft.com/office/drawing/2014/main" id="{114E59AC-0DC1-450C-B2E1-FD4649CEE25A}"/>
+              </a:ext>
+            </a:extLst>
+          </p:cNvPr>
+          <p:cNvCxnSpPr>
+            <a:cxnSpLocks/>
+            <a:stCxn id="1436" idx="0"/>
+            <a:endCxn id="10" idx="2"/>
+          </p:cNvCxnSpPr>
+          <p:nvPr/>
+        </p:nvCxnSpPr>
+        <p:spPr>
+          <a:xfrm rot="5400000" flipH="1" flipV="1">
+            <a:off x="7375118" y="21076725"/>
+            <a:ext cx="2182517" cy="2740396"/>
+          </a:xfrm>
+          <a:prstGeom prst="curvedConnector3">
+            <a:avLst>
+              <a:gd name="adj1" fmla="val 50000"/>
+            </a:avLst>
+          </a:prstGeom>
+          <a:ln>
+            <a:tailEnd type="triangle"/>
+          </a:ln>
+        </p:spPr>
+        <p:style>
+          <a:lnRef idx="1">
+            <a:schemeClr val="dk1"/>
+          </a:lnRef>
+          <a:fillRef idx="0">
+            <a:schemeClr val="dk1"/>
+          </a:fillRef>
+          <a:effectRef idx="0">
+            <a:schemeClr val="dk1"/>
+          </a:effectRef>
+          <a:fontRef idx="minor">
+            <a:schemeClr val="tx1"/>
+          </a:fontRef>
+        </p:style>
+      </p:cxnSp>
+      <p:cxnSp>
+        <p:nvCxnSpPr>
+          <p:cNvPr id="57" name="Connecteur : en angle 56">
+            <a:extLst>
+              <a:ext uri="{FF2B5EF4-FFF2-40B4-BE49-F238E27FC236}">
+                <a16:creationId xmlns:a16="http://schemas.microsoft.com/office/drawing/2014/main" id="{4F004246-B1C8-43E8-AB14-6C186AA10833}"/>
+              </a:ext>
+            </a:extLst>
+          </p:cNvPr>
+          <p:cNvCxnSpPr>
+            <a:cxnSpLocks/>
+            <a:stCxn id="43" idx="0"/>
+            <a:endCxn id="10" idx="2"/>
+          </p:cNvCxnSpPr>
+          <p:nvPr/>
+        </p:nvCxnSpPr>
+        <p:spPr>
+          <a:xfrm rot="16200000" flipV="1">
+            <a:off x="9309388" y="21882851"/>
+            <a:ext cx="2175617" cy="1121243"/>
+          </a:xfrm>
+          <a:prstGeom prst="curvedConnector3">
+            <a:avLst>
+              <a:gd name="adj1" fmla="val 50000"/>
+            </a:avLst>
+          </a:prstGeom>
+          <a:ln>
+            <a:tailEnd type="triangle"/>
+          </a:ln>
+        </p:spPr>
+        <p:style>
+          <a:lnRef idx="1">
+            <a:schemeClr val="dk1"/>
+          </a:lnRef>
+          <a:fillRef idx="0">
+            <a:schemeClr val="dk1"/>
+          </a:fillRef>
+          <a:effectRef idx="0">
+            <a:schemeClr val="dk1"/>
+          </a:effectRef>
+          <a:fontRef idx="minor">
+            <a:schemeClr val="tx1"/>
+          </a:fontRef>
+        </p:style>
+      </p:cxnSp>
+      <p:sp>
+        <p:nvSpPr>
+          <p:cNvPr id="231" name="ZoneTexte 230">
+            <a:extLst>
+              <a:ext uri="{FF2B5EF4-FFF2-40B4-BE49-F238E27FC236}">
+                <a16:creationId xmlns:a16="http://schemas.microsoft.com/office/drawing/2014/main" id="{C4558834-1780-4BF3-9DF5-806D33E05DC7}"/>
+              </a:ext>
+            </a:extLst>
+          </p:cNvPr>
+          <p:cNvSpPr txBox="1"/>
+          <p:nvPr/>
+        </p:nvSpPr>
+        <p:spPr>
+          <a:xfrm>
+            <a:off x="8979641" y="21758328"/>
+            <a:ext cx="1662746" cy="230832"/>
+          </a:xfrm>
+          <a:prstGeom prst="rect">
+            <a:avLst/>
+          </a:prstGeom>
+          <a:solidFill>
+            <a:schemeClr val="bg1"/>
+          </a:solidFill>
+        </p:spPr>
+        <p:txBody>
+          <a:bodyPr wrap="square" rtlCol="0" anchor="ctr">
+            <a:spAutoFit/>
+          </a:bodyPr>
+          <a:lstStyle/>
+          <a:p>
+            <a:pPr algn="ctr"/>
+            <a:r>
+              <a:rPr lang="fr-FR" sz="900" i="1" dirty="0">
+                <a:latin typeface="Gill Sans Nova" panose="020B0602020104020203" pitchFamily="34" charset="0"/>
+              </a:rPr>
+              <a:t>P166 </a:t>
+            </a:r>
+            <a:r>
+              <a:rPr lang="fr-FR" sz="900" i="1" dirty="0" err="1">
+                <a:latin typeface="Gill Sans Nova" panose="020B0602020104020203" pitchFamily="34" charset="0"/>
+              </a:rPr>
+              <a:t>was</a:t>
+            </a:r>
+            <a:r>
+              <a:rPr lang="fr-FR" sz="900" i="1" dirty="0">
+                <a:latin typeface="Gill Sans Nova" panose="020B0602020104020203" pitchFamily="34" charset="0"/>
+              </a:rPr>
+              <a:t> a </a:t>
+            </a:r>
+            <a:r>
+              <a:rPr lang="fr-FR" sz="900" i="1" dirty="0" err="1">
+                <a:latin typeface="Gill Sans Nova" panose="020B0602020104020203" pitchFamily="34" charset="0"/>
+              </a:rPr>
+              <a:t>presence</a:t>
+            </a:r>
+            <a:r>
+              <a:rPr lang="fr-FR" sz="900" i="1" dirty="0">
+                <a:latin typeface="Gill Sans Nova" panose="020B0602020104020203" pitchFamily="34" charset="0"/>
+              </a:rPr>
+              <a:t> of</a:t>
+            </a:r>
+          </a:p>
+        </p:txBody>
+      </p:sp>
+      <p:sp>
+        <p:nvSpPr>
+          <p:cNvPr id="232" name="Rectangle : coins arrondis 231">
+            <a:extLst>
+              <a:ext uri="{FF2B5EF4-FFF2-40B4-BE49-F238E27FC236}">
+                <a16:creationId xmlns:a16="http://schemas.microsoft.com/office/drawing/2014/main" id="{EFDE7289-EA18-43AF-89C5-E5FD2C7607E5}"/>
               </a:ext>
             </a:extLst>
           </p:cNvPr>
@@ -14458,14 +14336,14 @@
         </p:nvSpPr>
         <p:spPr>
           <a:xfrm>
-            <a:off x="4380099" y="20854071"/>
-            <a:ext cx="1062750" cy="508618"/>
+            <a:off x="4380099" y="23495349"/>
+            <a:ext cx="1062750" cy="636758"/>
           </a:xfrm>
           <a:prstGeom prst="roundRect">
             <a:avLst/>
           </a:prstGeom>
           <a:solidFill>
-            <a:srgbClr val="9E96DA"/>
+            <a:srgbClr val="8A6868"/>
           </a:solidFill>
           <a:ln w="28575">
             <a:noFill/>
@@ -14497,7 +14375,7 @@
                 </a:solidFill>
                 <a:latin typeface="Gill Sans Nova" panose="020B0602020104020203" pitchFamily="34" charset="0"/>
               </a:rPr>
-              <a:t>E4 </a:t>
+              <a:t>E93 </a:t>
             </a:r>
             <a:r>
               <a:rPr lang="fr-FR" sz="900" dirty="0" err="1">
@@ -14506,7 +14384,7 @@
                 </a:solidFill>
                 <a:latin typeface="Gill Sans Nova" panose="020B0602020104020203" pitchFamily="34" charset="0"/>
               </a:rPr>
-              <a:t>Period</a:t>
+              <a:t>Presence</a:t>
             </a:r>
             <a:endParaRPr lang="fr-FR" sz="900" dirty="0">
               <a:solidFill>
@@ -14524,80 +14402,48 @@
                 </a:solidFill>
                 <a:latin typeface="Gill Sans Nova" panose="020B0602020104020203" pitchFamily="34" charset="0"/>
               </a:rPr>
-              <a:t>« Ile-de-France »</a:t>
-            </a:r>
-          </a:p>
-        </p:txBody>
-      </p:sp>
-      <p:sp>
-        <p:nvSpPr>
-          <p:cNvPr id="25" name="ZoneTexte 24">
-            <a:extLst>
-              <a:ext uri="{FF2B5EF4-FFF2-40B4-BE49-F238E27FC236}">
-                <a16:creationId xmlns:a16="http://schemas.microsoft.com/office/drawing/2014/main" id="{06B2533C-0074-4CCE-B2A3-DCA5F032D8B5}"/>
-              </a:ext>
-            </a:extLst>
-          </p:cNvPr>
-          <p:cNvSpPr txBox="1"/>
-          <p:nvPr/>
-        </p:nvSpPr>
-        <p:spPr>
-          <a:xfrm>
-            <a:off x="6826054" y="20842418"/>
-            <a:ext cx="1516372" cy="230832"/>
-          </a:xfrm>
-          <a:prstGeom prst="rect">
-            <a:avLst/>
-          </a:prstGeom>
-          <a:noFill/>
-        </p:spPr>
-        <p:txBody>
-          <a:bodyPr wrap="square" rtlCol="0">
-            <a:spAutoFit/>
-          </a:bodyPr>
-          <a:lstStyle/>
-          <a:p>
-            <a:pPr algn="ctr"/>
+              <a:t>« Gouvernement d’</a:t>
+            </a:r>
+            <a:r>
+              <a:rPr lang="fr-FR" sz="900" i="1" dirty="0" err="1">
+                <a:solidFill>
+                  <a:schemeClr val="bg1"/>
+                </a:solidFill>
+                <a:latin typeface="Gill Sans Nova" panose="020B0602020104020203" pitchFamily="34" charset="0"/>
+              </a:rPr>
+              <a:t>Isle-de-France</a:t>
+            </a:r>
             <a:r>
               <a:rPr lang="fr-FR" sz="900" i="1" dirty="0">
-                <a:latin typeface="Gill Sans Nova" panose="020B0602020104020203" pitchFamily="34" charset="0"/>
-              </a:rPr>
-              <a:t>P9 </a:t>
-            </a:r>
-            <a:r>
-              <a:rPr lang="fr-FR" sz="900" i="1" dirty="0" err="1">
-                <a:latin typeface="Gill Sans Nova" panose="020B0602020104020203" pitchFamily="34" charset="0"/>
-              </a:rPr>
-              <a:t>consists</a:t>
-            </a:r>
-            <a:r>
-              <a:rPr lang="fr-FR" sz="900" i="1" dirty="0">
-                <a:latin typeface="Gill Sans Nova" panose="020B0602020104020203" pitchFamily="34" charset="0"/>
-              </a:rPr>
-              <a:t> of</a:t>
+                <a:solidFill>
+                  <a:schemeClr val="bg1"/>
+                </a:solidFill>
+                <a:latin typeface="Gill Sans Nova" panose="020B0602020104020203" pitchFamily="34" charset="0"/>
+              </a:rPr>
+              <a:t>»</a:t>
             </a:r>
           </a:p>
         </p:txBody>
       </p:sp>
       <p:cxnSp>
         <p:nvCxnSpPr>
-          <p:cNvPr id="42" name="Connecteur droit avec flèche 41">
-            <a:extLst>
-              <a:ext uri="{FF2B5EF4-FFF2-40B4-BE49-F238E27FC236}">
-                <a16:creationId xmlns:a16="http://schemas.microsoft.com/office/drawing/2014/main" id="{5B97E80C-DA2E-4003-B5DD-7622242F351F}"/>
+          <p:cNvPr id="236" name="Connecteur droit avec flèche 235">
+            <a:extLst>
+              <a:ext uri="{FF2B5EF4-FFF2-40B4-BE49-F238E27FC236}">
+                <a16:creationId xmlns:a16="http://schemas.microsoft.com/office/drawing/2014/main" id="{42D1A718-DF54-4B76-9528-36FE968B1297}"/>
               </a:ext>
             </a:extLst>
           </p:cNvPr>
           <p:cNvCxnSpPr>
-            <a:stCxn id="10" idx="1"/>
-            <a:endCxn id="18" idx="3"/>
+            <a:stCxn id="43" idx="2"/>
+            <a:endCxn id="1326" idx="0"/>
           </p:cNvCxnSpPr>
           <p:nvPr/>
         </p:nvCxnSpPr>
         <p:spPr>
-          <a:xfrm flipH="1">
-            <a:off x="5442849" y="21101355"/>
-            <a:ext cx="3862350" cy="7025"/>
+          <a:xfrm>
+            <a:off x="10957817" y="24168040"/>
+            <a:ext cx="20026" cy="2065161"/>
           </a:xfrm>
           <a:prstGeom prst="straightConnector1">
             <a:avLst/>
@@ -14621,12 +14467,312 @@
           </a:fontRef>
         </p:style>
       </p:cxnSp>
-      <p:sp>
-        <p:nvSpPr>
-          <p:cNvPr id="43" name="Rectangle : coins arrondis 42">
-            <a:extLst>
-              <a:ext uri="{FF2B5EF4-FFF2-40B4-BE49-F238E27FC236}">
-                <a16:creationId xmlns:a16="http://schemas.microsoft.com/office/drawing/2014/main" id="{340CF533-20C7-4B35-BFDB-32A23E9CA09F}"/>
+      <p:cxnSp>
+        <p:nvCxnSpPr>
+          <p:cNvPr id="239" name="Connecteur : en arc 238">
+            <a:extLst>
+              <a:ext uri="{FF2B5EF4-FFF2-40B4-BE49-F238E27FC236}">
+                <a16:creationId xmlns:a16="http://schemas.microsoft.com/office/drawing/2014/main" id="{B1F19F26-76D4-4339-8D16-1F8BC1737FD5}"/>
+              </a:ext>
+            </a:extLst>
+          </p:cNvPr>
+          <p:cNvCxnSpPr>
+            <a:cxnSpLocks/>
+            <a:stCxn id="232" idx="2"/>
+            <a:endCxn id="43" idx="2"/>
+          </p:cNvCxnSpPr>
+          <p:nvPr/>
+        </p:nvCxnSpPr>
+        <p:spPr>
+          <a:xfrm rot="16200000" flipH="1">
+            <a:off x="7916679" y="21126901"/>
+            <a:ext cx="35933" cy="6046343"/>
+          </a:xfrm>
+          <a:prstGeom prst="curvedConnector3">
+            <a:avLst>
+              <a:gd name="adj1" fmla="val 4376570"/>
+            </a:avLst>
+          </a:prstGeom>
+          <a:ln>
+            <a:tailEnd type="triangle"/>
+          </a:ln>
+        </p:spPr>
+        <p:style>
+          <a:lnRef idx="1">
+            <a:schemeClr val="dk1"/>
+          </a:lnRef>
+          <a:fillRef idx="0">
+            <a:schemeClr val="dk1"/>
+          </a:fillRef>
+          <a:effectRef idx="0">
+            <a:schemeClr val="dk1"/>
+          </a:effectRef>
+          <a:fontRef idx="minor">
+            <a:schemeClr val="tx1"/>
+          </a:fontRef>
+        </p:style>
+      </p:cxnSp>
+      <p:sp>
+        <p:nvSpPr>
+          <p:cNvPr id="242" name="ZoneTexte 241">
+            <a:extLst>
+              <a:ext uri="{FF2B5EF4-FFF2-40B4-BE49-F238E27FC236}">
+                <a16:creationId xmlns:a16="http://schemas.microsoft.com/office/drawing/2014/main" id="{60F94A66-4154-4979-B688-1FF997B4ECBA}"/>
+              </a:ext>
+            </a:extLst>
+          </p:cNvPr>
+          <p:cNvSpPr txBox="1"/>
+          <p:nvPr/>
+        </p:nvSpPr>
+        <p:spPr>
+          <a:xfrm>
+            <a:off x="7213854" y="25425997"/>
+            <a:ext cx="1324756" cy="230832"/>
+          </a:xfrm>
+          <a:prstGeom prst="rect">
+            <a:avLst/>
+          </a:prstGeom>
+          <a:noFill/>
+        </p:spPr>
+        <p:txBody>
+          <a:bodyPr wrap="square" rtlCol="0">
+            <a:spAutoFit/>
+          </a:bodyPr>
+          <a:lstStyle/>
+          <a:p>
+            <a:pPr algn="ctr"/>
+            <a:r>
+              <a:rPr lang="fr-FR" sz="900" i="1" dirty="0">
+                <a:latin typeface="Gill Sans Nova" panose="020B0602020104020203" pitchFamily="34" charset="0"/>
+              </a:rPr>
+              <a:t>P10 </a:t>
+            </a:r>
+            <a:r>
+              <a:rPr lang="fr-FR" sz="900" i="1" dirty="0" err="1">
+                <a:latin typeface="Gill Sans Nova" panose="020B0602020104020203" pitchFamily="34" charset="0"/>
+              </a:rPr>
+              <a:t>falls</a:t>
+            </a:r>
+            <a:r>
+              <a:rPr lang="fr-FR" sz="900" i="1" dirty="0">
+                <a:latin typeface="Gill Sans Nova" panose="020B0602020104020203" pitchFamily="34" charset="0"/>
+              </a:rPr>
+              <a:t> </a:t>
+            </a:r>
+            <a:r>
+              <a:rPr lang="fr-FR" sz="900" i="1" dirty="0" err="1">
+                <a:latin typeface="Gill Sans Nova" panose="020B0602020104020203" pitchFamily="34" charset="0"/>
+              </a:rPr>
+              <a:t>within</a:t>
+            </a:r>
+            <a:endParaRPr lang="fr-FR" sz="900" i="1" dirty="0">
+              <a:latin typeface="Gill Sans Nova" panose="020B0602020104020203" pitchFamily="34" charset="0"/>
+            </a:endParaRPr>
+          </a:p>
+        </p:txBody>
+      </p:sp>
+      <p:cxnSp>
+        <p:nvCxnSpPr>
+          <p:cNvPr id="245" name="Connecteur droit avec flèche 244">
+            <a:extLst>
+              <a:ext uri="{FF2B5EF4-FFF2-40B4-BE49-F238E27FC236}">
+                <a16:creationId xmlns:a16="http://schemas.microsoft.com/office/drawing/2014/main" id="{33AF4C4D-AB9F-4C9C-9A50-4CA102C13823}"/>
+              </a:ext>
+            </a:extLst>
+          </p:cNvPr>
+          <p:cNvCxnSpPr>
+            <a:cxnSpLocks/>
+            <a:stCxn id="18" idx="2"/>
+            <a:endCxn id="232" idx="0"/>
+          </p:cNvCxnSpPr>
+          <p:nvPr/>
+        </p:nvCxnSpPr>
+        <p:spPr>
+          <a:xfrm>
+            <a:off x="4911474" y="21362689"/>
+            <a:ext cx="0" cy="2132660"/>
+          </a:xfrm>
+          <a:prstGeom prst="straightConnector1">
+            <a:avLst/>
+          </a:prstGeom>
+          <a:ln>
+            <a:tailEnd type="triangle"/>
+          </a:ln>
+        </p:spPr>
+        <p:style>
+          <a:lnRef idx="1">
+            <a:schemeClr val="dk1"/>
+          </a:lnRef>
+          <a:fillRef idx="0">
+            <a:schemeClr val="dk1"/>
+          </a:fillRef>
+          <a:effectRef idx="0">
+            <a:schemeClr val="dk1"/>
+          </a:effectRef>
+          <a:fontRef idx="minor">
+            <a:schemeClr val="tx1"/>
+          </a:fontRef>
+        </p:style>
+      </p:cxnSp>
+      <p:sp>
+        <p:nvSpPr>
+          <p:cNvPr id="246" name="ZoneTexte 245">
+            <a:extLst>
+              <a:ext uri="{FF2B5EF4-FFF2-40B4-BE49-F238E27FC236}">
+                <a16:creationId xmlns:a16="http://schemas.microsoft.com/office/drawing/2014/main" id="{31BA01F3-3AE0-4E7D-A0FE-2A9C1694CA47}"/>
+              </a:ext>
+            </a:extLst>
+          </p:cNvPr>
+          <p:cNvSpPr txBox="1"/>
+          <p:nvPr/>
+        </p:nvSpPr>
+        <p:spPr>
+          <a:xfrm>
+            <a:off x="4081736" y="21863719"/>
+            <a:ext cx="960633" cy="369332"/>
+          </a:xfrm>
+          <a:prstGeom prst="rect">
+            <a:avLst/>
+          </a:prstGeom>
+          <a:noFill/>
+        </p:spPr>
+        <p:txBody>
+          <a:bodyPr wrap="square" rtlCol="0" anchor="ctr">
+            <a:spAutoFit/>
+          </a:bodyPr>
+          <a:lstStyle/>
+          <a:p>
+            <a:pPr algn="ctr"/>
+            <a:r>
+              <a:rPr lang="fr-FR" sz="900" i="1" dirty="0">
+                <a:latin typeface="Gill Sans Nova" panose="020B0602020104020203" pitchFamily="34" charset="0"/>
+              </a:rPr>
+              <a:t>P166 </a:t>
+            </a:r>
+            <a:r>
+              <a:rPr lang="fr-FR" sz="900" i="1" dirty="0" err="1">
+                <a:latin typeface="Gill Sans Nova" panose="020B0602020104020203" pitchFamily="34" charset="0"/>
+              </a:rPr>
+              <a:t>was</a:t>
+            </a:r>
+            <a:r>
+              <a:rPr lang="fr-FR" sz="900" i="1" dirty="0">
+                <a:latin typeface="Gill Sans Nova" panose="020B0602020104020203" pitchFamily="34" charset="0"/>
+              </a:rPr>
+              <a:t> a </a:t>
+            </a:r>
+            <a:r>
+              <a:rPr lang="fr-FR" sz="900" i="1" dirty="0" err="1">
+                <a:latin typeface="Gill Sans Nova" panose="020B0602020104020203" pitchFamily="34" charset="0"/>
+              </a:rPr>
+              <a:t>presence</a:t>
+            </a:r>
+            <a:r>
+              <a:rPr lang="fr-FR" sz="900" i="1" dirty="0">
+                <a:latin typeface="Gill Sans Nova" panose="020B0602020104020203" pitchFamily="34" charset="0"/>
+              </a:rPr>
+              <a:t> of</a:t>
+            </a:r>
+          </a:p>
+        </p:txBody>
+      </p:sp>
+      <p:cxnSp>
+        <p:nvCxnSpPr>
+          <p:cNvPr id="257" name="Connecteur : en arc 256">
+            <a:extLst>
+              <a:ext uri="{FF2B5EF4-FFF2-40B4-BE49-F238E27FC236}">
+                <a16:creationId xmlns:a16="http://schemas.microsoft.com/office/drawing/2014/main" id="{0281C721-B9A3-4EDD-9319-983B0288E8B3}"/>
+              </a:ext>
+            </a:extLst>
+          </p:cNvPr>
+          <p:cNvCxnSpPr>
+            <a:cxnSpLocks/>
+            <a:stCxn id="232" idx="2"/>
+            <a:endCxn id="1376" idx="1"/>
+          </p:cNvCxnSpPr>
+          <p:nvPr/>
+        </p:nvCxnSpPr>
+        <p:spPr>
+          <a:xfrm rot="5400000" flipH="1" flipV="1">
+            <a:off x="9452641" y="18572046"/>
+            <a:ext cx="1018893" cy="10101229"/>
+          </a:xfrm>
+          <a:prstGeom prst="curvedConnector4">
+            <a:avLst>
+              <a:gd name="adj1" fmla="val -406343"/>
+              <a:gd name="adj2" fmla="val 92486"/>
+            </a:avLst>
+          </a:prstGeom>
+          <a:ln w="12700">
+            <a:solidFill>
+              <a:srgbClr val="8A6868"/>
+            </a:solidFill>
+            <a:prstDash val="sysDot"/>
+            <a:tailEnd type="triangle"/>
+          </a:ln>
+        </p:spPr>
+        <p:style>
+          <a:lnRef idx="1">
+            <a:schemeClr val="dk1"/>
+          </a:lnRef>
+          <a:fillRef idx="0">
+            <a:schemeClr val="dk1"/>
+          </a:fillRef>
+          <a:effectRef idx="0">
+            <a:schemeClr val="dk1"/>
+          </a:effectRef>
+          <a:fontRef idx="minor">
+            <a:schemeClr val="tx1"/>
+          </a:fontRef>
+        </p:style>
+      </p:cxnSp>
+      <p:sp>
+        <p:nvSpPr>
+          <p:cNvPr id="267" name="ZoneTexte 266">
+            <a:extLst>
+              <a:ext uri="{FF2B5EF4-FFF2-40B4-BE49-F238E27FC236}">
+                <a16:creationId xmlns:a16="http://schemas.microsoft.com/office/drawing/2014/main" id="{436CFC8F-1523-44B8-AC11-0DEEC2629B38}"/>
+              </a:ext>
+            </a:extLst>
+          </p:cNvPr>
+          <p:cNvSpPr txBox="1"/>
+          <p:nvPr/>
+        </p:nvSpPr>
+        <p:spPr>
+          <a:xfrm>
+            <a:off x="9007761" y="27749779"/>
+            <a:ext cx="1242988" cy="415498"/>
+          </a:xfrm>
+          <a:prstGeom prst="rect">
+            <a:avLst/>
+          </a:prstGeom>
+          <a:noFill/>
+        </p:spPr>
+        <p:txBody>
+          <a:bodyPr wrap="square" rtlCol="0">
+            <a:spAutoFit/>
+          </a:bodyPr>
+          <a:lstStyle/>
+          <a:p>
+            <a:pPr algn="ctr"/>
+            <a:r>
+              <a:rPr lang="fr-FR" sz="1050" i="1" dirty="0">
+                <a:solidFill>
+                  <a:srgbClr val="8A6868"/>
+                </a:solidFill>
+                <a:latin typeface="Gill Sans Nova" panose="020B0602020104020203" pitchFamily="34" charset="0"/>
+              </a:rPr>
+              <a:t>P161 has spatial projection </a:t>
+            </a:r>
+          </a:p>
+        </p:txBody>
+      </p:sp>
+      <p:sp>
+        <p:nvSpPr>
+          <p:cNvPr id="270" name="Rectangle : coins arrondis 269">
+            <a:extLst>
+              <a:ext uri="{FF2B5EF4-FFF2-40B4-BE49-F238E27FC236}">
+                <a16:creationId xmlns:a16="http://schemas.microsoft.com/office/drawing/2014/main" id="{17D53C07-2C39-41A7-BF83-0326882B9302}"/>
               </a:ext>
             </a:extLst>
           </p:cNvPr>
@@ -14635,16 +14781,16 @@
         </p:nvSpPr>
         <p:spPr>
           <a:xfrm>
-            <a:off x="10426442" y="23531281"/>
-            <a:ext cx="1062750" cy="636759"/>
+            <a:off x="26598010" y="4204171"/>
+            <a:ext cx="1139308" cy="678712"/>
           </a:xfrm>
           <a:prstGeom prst="roundRect">
             <a:avLst/>
           </a:prstGeom>
           <a:solidFill>
-            <a:srgbClr val="8A6868"/>
+            <a:srgbClr val="F6CACA"/>
           </a:solidFill>
-          <a:ln w="28575">
+          <a:ln w="12700">
             <a:noFill/>
           </a:ln>
         </p:spPr>
@@ -14670,67 +14816,124 @@
             <a:r>
               <a:rPr lang="fr-FR" sz="900" dirty="0">
                 <a:solidFill>
-                  <a:schemeClr val="bg1"/>
-                </a:solidFill>
-                <a:latin typeface="Gill Sans Nova" panose="020B0602020104020203" pitchFamily="34" charset="0"/>
-              </a:rPr>
-              <a:t>E93 </a:t>
-            </a:r>
-            <a:r>
-              <a:rPr lang="fr-FR" sz="900" dirty="0" err="1">
-                <a:solidFill>
-                  <a:schemeClr val="bg1"/>
-                </a:solidFill>
-                <a:latin typeface="Gill Sans Nova" panose="020B0602020104020203" pitchFamily="34" charset="0"/>
-              </a:rPr>
-              <a:t>Presence</a:t>
-            </a:r>
-            <a:endParaRPr lang="fr-FR" sz="900" dirty="0">
-              <a:solidFill>
-                <a:schemeClr val="bg1"/>
-              </a:solidFill>
-              <a:latin typeface="Gill Sans Nova" panose="020B0602020104020203" pitchFamily="34" charset="0"/>
-            </a:endParaRPr>
-          </a:p>
+                  <a:schemeClr val="tx1"/>
+                </a:solidFill>
+                <a:latin typeface="Gill Sans Nova" panose="020B0602020104020203" pitchFamily="34" charset="0"/>
+              </a:rPr>
+              <a:t>E55 Type</a:t>
+            </a:r>
+          </a:p>
+          <a:p>
+            <a:pPr algn="ctr"/>
+            <a:r>
+              <a:rPr lang="fr-FR" sz="900" dirty="0">
+                <a:solidFill>
+                  <a:schemeClr val="tx1"/>
+                </a:solidFill>
+                <a:latin typeface="Gill Sans Nova" panose="020B0602020104020203" pitchFamily="34" charset="0"/>
+              </a:rPr>
+              <a:t>« Livraison du Mercure Galant »</a:t>
+            </a:r>
+          </a:p>
+        </p:txBody>
+      </p:sp>
+      <p:sp>
+        <p:nvSpPr>
+          <p:cNvPr id="273" name="ZoneTexte 272">
+            <a:extLst>
+              <a:ext uri="{FF2B5EF4-FFF2-40B4-BE49-F238E27FC236}">
+                <a16:creationId xmlns:a16="http://schemas.microsoft.com/office/drawing/2014/main" id="{FE6F1C7A-C0B2-4CA7-87BD-B8DCEE1355A9}"/>
+              </a:ext>
+            </a:extLst>
+          </p:cNvPr>
+          <p:cNvSpPr txBox="1"/>
+          <p:nvPr/>
+        </p:nvSpPr>
+        <p:spPr>
+          <a:xfrm>
+            <a:off x="27117105" y="5146625"/>
+            <a:ext cx="1398361" cy="230832"/>
+          </a:xfrm>
+          <a:prstGeom prst="rect">
+            <a:avLst/>
+          </a:prstGeom>
+          <a:noFill/>
+        </p:spPr>
+        <p:txBody>
+          <a:bodyPr wrap="square" rtlCol="0">
+            <a:spAutoFit/>
+          </a:bodyPr>
+          <a:lstStyle/>
           <a:p>
             <a:pPr algn="ctr"/>
             <a:r>
               <a:rPr lang="fr-FR" sz="900" i="1" dirty="0">
-                <a:solidFill>
-                  <a:schemeClr val="bg1"/>
-                </a:solidFill>
-                <a:latin typeface="Gill Sans Nova" panose="020B0602020104020203" pitchFamily="34" charset="0"/>
-              </a:rPr>
-              <a:t>« Royaume de France »</a:t>
+                <a:latin typeface="Gill Sans Nova" panose="020B0602020104020203" pitchFamily="34" charset="0"/>
+              </a:rPr>
+              <a:t>P2 has type</a:t>
+            </a:r>
+          </a:p>
+        </p:txBody>
+      </p:sp>
+      <p:sp>
+        <p:nvSpPr>
+          <p:cNvPr id="274" name="ZoneTexte 273">
+            <a:extLst>
+              <a:ext uri="{FF2B5EF4-FFF2-40B4-BE49-F238E27FC236}">
+                <a16:creationId xmlns:a16="http://schemas.microsoft.com/office/drawing/2014/main" id="{B4F3720B-3EA9-4120-B562-3D61BB9D5FB7}"/>
+              </a:ext>
+            </a:extLst>
+          </p:cNvPr>
+          <p:cNvSpPr txBox="1"/>
+          <p:nvPr/>
+        </p:nvSpPr>
+        <p:spPr>
+          <a:xfrm>
+            <a:off x="29346217" y="10429760"/>
+            <a:ext cx="1398361" cy="230832"/>
+          </a:xfrm>
+          <a:prstGeom prst="rect">
+            <a:avLst/>
+          </a:prstGeom>
+          <a:noFill/>
+        </p:spPr>
+        <p:txBody>
+          <a:bodyPr wrap="square" rtlCol="0">
+            <a:spAutoFit/>
+          </a:bodyPr>
+          <a:lstStyle/>
+          <a:p>
+            <a:pPr algn="ctr"/>
+            <a:r>
+              <a:rPr lang="fr-FR" sz="900" i="1" dirty="0">
+                <a:latin typeface="Gill Sans Nova" panose="020B0602020104020203" pitchFamily="34" charset="0"/>
+              </a:rPr>
+              <a:t>P2 has type</a:t>
             </a:r>
           </a:p>
         </p:txBody>
       </p:sp>
       <p:cxnSp>
         <p:nvCxnSpPr>
-          <p:cNvPr id="54" name="Connecteur : en angle 53">
-            <a:extLst>
-              <a:ext uri="{FF2B5EF4-FFF2-40B4-BE49-F238E27FC236}">
-                <a16:creationId xmlns:a16="http://schemas.microsoft.com/office/drawing/2014/main" id="{114E59AC-0DC1-450C-B2E1-FD4649CEE25A}"/>
+          <p:cNvPr id="286" name="Connecteur droit avec flèche 285">
+            <a:extLst>
+              <a:ext uri="{FF2B5EF4-FFF2-40B4-BE49-F238E27FC236}">
+                <a16:creationId xmlns:a16="http://schemas.microsoft.com/office/drawing/2014/main" id="{222C9276-C0F0-4C07-9607-710E574559BF}"/>
               </a:ext>
             </a:extLst>
           </p:cNvPr>
           <p:cNvCxnSpPr>
             <a:cxnSpLocks/>
-            <a:stCxn id="1436" idx="0"/>
-            <a:endCxn id="10" idx="2"/>
           </p:cNvCxnSpPr>
           <p:nvPr/>
         </p:nvCxnSpPr>
         <p:spPr>
-          <a:xfrm rot="5400000" flipH="1" flipV="1">
-            <a:off x="7375118" y="21076725"/>
-            <a:ext cx="2182517" cy="2740396"/>
-          </a:xfrm>
-          <a:prstGeom prst="curvedConnector3">
-            <a:avLst>
-              <a:gd name="adj1" fmla="val 50000"/>
-            </a:avLst>
+          <a:xfrm>
+            <a:off x="29842823" y="10053212"/>
+            <a:ext cx="898482" cy="704938"/>
+          </a:xfrm>
+          <a:prstGeom prst="straightConnector1">
+            <a:avLst/>
           </a:prstGeom>
           <a:ln>
             <a:tailEnd type="triangle"/>
@@ -14751,139 +14954,30 @@
           </a:fontRef>
         </p:style>
       </p:cxnSp>
-      <p:cxnSp>
-        <p:nvCxnSpPr>
-          <p:cNvPr id="57" name="Connecteur : en angle 56">
-            <a:extLst>
-              <a:ext uri="{FF2B5EF4-FFF2-40B4-BE49-F238E27FC236}">
-                <a16:creationId xmlns:a16="http://schemas.microsoft.com/office/drawing/2014/main" id="{4F004246-B1C8-43E8-AB14-6C186AA10833}"/>
-              </a:ext>
-            </a:extLst>
-          </p:cNvPr>
-          <p:cNvCxnSpPr>
-            <a:cxnSpLocks/>
-            <a:stCxn id="43" idx="0"/>
-            <a:endCxn id="10" idx="2"/>
-          </p:cNvCxnSpPr>
-          <p:nvPr/>
-        </p:nvCxnSpPr>
-        <p:spPr>
-          <a:xfrm rot="16200000" flipV="1">
-            <a:off x="9309388" y="21882851"/>
-            <a:ext cx="2175617" cy="1121243"/>
-          </a:xfrm>
-          <a:prstGeom prst="curvedConnector3">
-            <a:avLst>
-              <a:gd name="adj1" fmla="val 50000"/>
-            </a:avLst>
-          </a:prstGeom>
-          <a:ln>
-            <a:tailEnd type="triangle"/>
-          </a:ln>
-        </p:spPr>
-        <p:style>
-          <a:lnRef idx="1">
-            <a:schemeClr val="dk1"/>
-          </a:lnRef>
-          <a:fillRef idx="0">
-            <a:schemeClr val="dk1"/>
-          </a:fillRef>
-          <a:effectRef idx="0">
-            <a:schemeClr val="dk1"/>
-          </a:effectRef>
-          <a:fontRef idx="minor">
-            <a:schemeClr val="tx1"/>
-          </a:fontRef>
-        </p:style>
-      </p:cxnSp>
-      <p:sp>
-        <p:nvSpPr>
-          <p:cNvPr id="231" name="ZoneTexte 230">
-            <a:extLst>
-              <a:ext uri="{FF2B5EF4-FFF2-40B4-BE49-F238E27FC236}">
-                <a16:creationId xmlns:a16="http://schemas.microsoft.com/office/drawing/2014/main" id="{C4558834-1780-4BF3-9DF5-806D33E05DC7}"/>
-              </a:ext>
-            </a:extLst>
-          </p:cNvPr>
-          <p:cNvSpPr txBox="1"/>
-          <p:nvPr/>
-        </p:nvSpPr>
-        <p:spPr>
-          <a:xfrm>
-            <a:off x="8979641" y="21758328"/>
-            <a:ext cx="1662746" cy="230832"/>
-          </a:xfrm>
-          <a:prstGeom prst="rect">
+      <p:sp>
+        <p:nvSpPr>
+          <p:cNvPr id="292" name="Rectangle : coins arrondis 291">
+            <a:extLst>
+              <a:ext uri="{FF2B5EF4-FFF2-40B4-BE49-F238E27FC236}">
+                <a16:creationId xmlns:a16="http://schemas.microsoft.com/office/drawing/2014/main" id="{E8C496EE-D5E9-435A-9B61-1CA3D291F299}"/>
+              </a:ext>
+            </a:extLst>
+          </p:cNvPr>
+          <p:cNvSpPr/>
+          <p:nvPr/>
+        </p:nvSpPr>
+        <p:spPr>
+          <a:xfrm>
+            <a:off x="30713451" y="10723752"/>
+            <a:ext cx="1139308" cy="678712"/>
+          </a:xfrm>
+          <a:prstGeom prst="roundRect">
             <a:avLst/>
           </a:prstGeom>
           <a:solidFill>
-            <a:schemeClr val="bg1"/>
+            <a:srgbClr val="F6CACA"/>
           </a:solidFill>
-        </p:spPr>
-        <p:txBody>
-          <a:bodyPr wrap="square" rtlCol="0" anchor="ctr">
-            <a:spAutoFit/>
-          </a:bodyPr>
-          <a:lstStyle/>
-          <a:p>
-            <a:pPr algn="ctr"/>
-            <a:r>
-              <a:rPr lang="fr-FR" sz="900" i="1" dirty="0">
-                <a:latin typeface="Gill Sans Nova" panose="020B0602020104020203" pitchFamily="34" charset="0"/>
-              </a:rPr>
-              <a:t>P166 </a:t>
-            </a:r>
-            <a:r>
-              <a:rPr lang="fr-FR" sz="900" i="1" dirty="0" err="1">
-                <a:latin typeface="Gill Sans Nova" panose="020B0602020104020203" pitchFamily="34" charset="0"/>
-              </a:rPr>
-              <a:t>was</a:t>
-            </a:r>
-            <a:r>
-              <a:rPr lang="fr-FR" sz="900" i="1" dirty="0">
-                <a:latin typeface="Gill Sans Nova" panose="020B0602020104020203" pitchFamily="34" charset="0"/>
-              </a:rPr>
-              <a:t> a </a:t>
-            </a:r>
-            <a:r>
-              <a:rPr lang="fr-FR" sz="900" i="1" dirty="0" err="1">
-                <a:latin typeface="Gill Sans Nova" panose="020B0602020104020203" pitchFamily="34" charset="0"/>
-              </a:rPr>
-              <a:t>presence</a:t>
-            </a:r>
-            <a:r>
-              <a:rPr lang="fr-FR" sz="900" i="1" dirty="0">
-                <a:latin typeface="Gill Sans Nova" panose="020B0602020104020203" pitchFamily="34" charset="0"/>
-              </a:rPr>
-              <a:t> of</a:t>
-            </a:r>
-          </a:p>
-        </p:txBody>
-      </p:sp>
-      <p:sp>
-        <p:nvSpPr>
-          <p:cNvPr id="232" name="Rectangle : coins arrondis 231">
-            <a:extLst>
-              <a:ext uri="{FF2B5EF4-FFF2-40B4-BE49-F238E27FC236}">
-                <a16:creationId xmlns:a16="http://schemas.microsoft.com/office/drawing/2014/main" id="{EFDE7289-EA18-43AF-89C5-E5FD2C7607E5}"/>
-              </a:ext>
-            </a:extLst>
-          </p:cNvPr>
-          <p:cNvSpPr/>
-          <p:nvPr/>
-        </p:nvSpPr>
-        <p:spPr>
-          <a:xfrm>
-            <a:off x="4380099" y="23495349"/>
-            <a:ext cx="1062750" cy="636758"/>
-          </a:xfrm>
-          <a:prstGeom prst="roundRect">
-            <a:avLst/>
-          </a:prstGeom>
-          <a:solidFill>
-            <a:srgbClr val="8A6868"/>
-          </a:solidFill>
-          <a:ln w="28575">
+          <a:ln w="12700">
             <a:noFill/>
           </a:ln>
         </p:spPr>
@@ -14909,408 +15003,48 @@
             <a:r>
               <a:rPr lang="fr-FR" sz="900" dirty="0">
                 <a:solidFill>
-                  <a:schemeClr val="bg1"/>
-                </a:solidFill>
-                <a:latin typeface="Gill Sans Nova" panose="020B0602020104020203" pitchFamily="34" charset="0"/>
-              </a:rPr>
-              <a:t>E93 </a:t>
-            </a:r>
-            <a:r>
-              <a:rPr lang="fr-FR" sz="900" dirty="0" err="1">
-                <a:solidFill>
-                  <a:schemeClr val="bg1"/>
-                </a:solidFill>
-                <a:latin typeface="Gill Sans Nova" panose="020B0602020104020203" pitchFamily="34" charset="0"/>
-              </a:rPr>
-              <a:t>Presence</a:t>
+                  <a:schemeClr val="tx1"/>
+                </a:solidFill>
+                <a:latin typeface="Gill Sans Nova" panose="020B0602020104020203" pitchFamily="34" charset="0"/>
+              </a:rPr>
+              <a:t>E55 Type</a:t>
+            </a:r>
+          </a:p>
+          <a:p>
+            <a:pPr algn="ctr"/>
+            <a:r>
+              <a:rPr lang="fr-FR" sz="900" dirty="0">
+                <a:solidFill>
+                  <a:schemeClr val="tx1"/>
+                </a:solidFill>
+                <a:latin typeface="Gill Sans Nova" panose="020B0602020104020203" pitchFamily="34" charset="0"/>
+              </a:rPr>
+              <a:t>« Article du </a:t>
+            </a:r>
+            <a:r>
+              <a:rPr lang="fr-FR" sz="900">
+                <a:solidFill>
+                  <a:schemeClr val="tx1"/>
+                </a:solidFill>
+                <a:latin typeface="Gill Sans Nova" panose="020B0602020104020203" pitchFamily="34" charset="0"/>
+              </a:rPr>
+              <a:t>Mercure Galant »</a:t>
             </a:r>
             <a:endParaRPr lang="fr-FR" sz="900" dirty="0">
               <a:solidFill>
-                <a:schemeClr val="bg1"/>
+                <a:schemeClr val="tx1"/>
               </a:solidFill>
               <a:latin typeface="Gill Sans Nova" panose="020B0602020104020203" pitchFamily="34" charset="0"/>
             </a:endParaRPr>
           </a:p>
-          <a:p>
-            <a:pPr algn="ctr"/>
-            <a:r>
-              <a:rPr lang="fr-FR" sz="900" i="1" dirty="0">
-                <a:solidFill>
-                  <a:schemeClr val="bg1"/>
-                </a:solidFill>
-                <a:latin typeface="Gill Sans Nova" panose="020B0602020104020203" pitchFamily="34" charset="0"/>
-              </a:rPr>
-              <a:t>« Gouvernement d’</a:t>
-            </a:r>
-            <a:r>
-              <a:rPr lang="fr-FR" sz="900" i="1" dirty="0" err="1">
-                <a:solidFill>
-                  <a:schemeClr val="bg1"/>
-                </a:solidFill>
-                <a:latin typeface="Gill Sans Nova" panose="020B0602020104020203" pitchFamily="34" charset="0"/>
-              </a:rPr>
-              <a:t>Isle-de-France</a:t>
-            </a:r>
-            <a:r>
-              <a:rPr lang="fr-FR" sz="900" i="1" dirty="0">
-                <a:solidFill>
-                  <a:schemeClr val="bg1"/>
-                </a:solidFill>
-                <a:latin typeface="Gill Sans Nova" panose="020B0602020104020203" pitchFamily="34" charset="0"/>
-              </a:rPr>
-              <a:t>»</a:t>
-            </a:r>
-          </a:p>
-        </p:txBody>
-      </p:sp>
-      <p:cxnSp>
-        <p:nvCxnSpPr>
-          <p:cNvPr id="236" name="Connecteur droit avec flèche 235">
-            <a:extLst>
-              <a:ext uri="{FF2B5EF4-FFF2-40B4-BE49-F238E27FC236}">
-                <a16:creationId xmlns:a16="http://schemas.microsoft.com/office/drawing/2014/main" id="{42D1A718-DF54-4B76-9528-36FE968B1297}"/>
-              </a:ext>
-            </a:extLst>
-          </p:cNvPr>
-          <p:cNvCxnSpPr>
-            <a:stCxn id="43" idx="2"/>
-            <a:endCxn id="1326" idx="0"/>
-          </p:cNvCxnSpPr>
-          <p:nvPr/>
-        </p:nvCxnSpPr>
-        <p:spPr>
-          <a:xfrm>
-            <a:off x="10957817" y="24168040"/>
-            <a:ext cx="20026" cy="2065161"/>
-          </a:xfrm>
-          <a:prstGeom prst="straightConnector1">
-            <a:avLst/>
-          </a:prstGeom>
-          <a:ln>
-            <a:tailEnd type="triangle"/>
-          </a:ln>
-        </p:spPr>
-        <p:style>
-          <a:lnRef idx="1">
-            <a:schemeClr val="dk1"/>
-          </a:lnRef>
-          <a:fillRef idx="0">
-            <a:schemeClr val="dk1"/>
-          </a:fillRef>
-          <a:effectRef idx="0">
-            <a:schemeClr val="dk1"/>
-          </a:effectRef>
-          <a:fontRef idx="minor">
-            <a:schemeClr val="tx1"/>
-          </a:fontRef>
-        </p:style>
-      </p:cxnSp>
-      <p:cxnSp>
-        <p:nvCxnSpPr>
-          <p:cNvPr id="239" name="Connecteur : en arc 238">
-            <a:extLst>
-              <a:ext uri="{FF2B5EF4-FFF2-40B4-BE49-F238E27FC236}">
-                <a16:creationId xmlns:a16="http://schemas.microsoft.com/office/drawing/2014/main" id="{B1F19F26-76D4-4339-8D16-1F8BC1737FD5}"/>
-              </a:ext>
-            </a:extLst>
-          </p:cNvPr>
-          <p:cNvCxnSpPr>
-            <a:cxnSpLocks/>
-            <a:stCxn id="232" idx="2"/>
-            <a:endCxn id="43" idx="2"/>
-          </p:cNvCxnSpPr>
-          <p:nvPr/>
-        </p:nvCxnSpPr>
-        <p:spPr>
-          <a:xfrm rot="16200000" flipH="1">
-            <a:off x="7916679" y="21126901"/>
-            <a:ext cx="35933" cy="6046343"/>
-          </a:xfrm>
-          <a:prstGeom prst="curvedConnector3">
-            <a:avLst>
-              <a:gd name="adj1" fmla="val 4376570"/>
-            </a:avLst>
-          </a:prstGeom>
-          <a:ln>
-            <a:tailEnd type="triangle"/>
-          </a:ln>
-        </p:spPr>
-        <p:style>
-          <a:lnRef idx="1">
-            <a:schemeClr val="dk1"/>
-          </a:lnRef>
-          <a:fillRef idx="0">
-            <a:schemeClr val="dk1"/>
-          </a:fillRef>
-          <a:effectRef idx="0">
-            <a:schemeClr val="dk1"/>
-          </a:effectRef>
-          <a:fontRef idx="minor">
-            <a:schemeClr val="tx1"/>
-          </a:fontRef>
-        </p:style>
-      </p:cxnSp>
-      <p:sp>
-        <p:nvSpPr>
-          <p:cNvPr id="242" name="ZoneTexte 241">
-            <a:extLst>
-              <a:ext uri="{FF2B5EF4-FFF2-40B4-BE49-F238E27FC236}">
-                <a16:creationId xmlns:a16="http://schemas.microsoft.com/office/drawing/2014/main" id="{60F94A66-4154-4979-B688-1FF997B4ECBA}"/>
-              </a:ext>
-            </a:extLst>
-          </p:cNvPr>
-          <p:cNvSpPr txBox="1"/>
-          <p:nvPr/>
-        </p:nvSpPr>
-        <p:spPr>
-          <a:xfrm>
-            <a:off x="7213854" y="25425997"/>
-            <a:ext cx="1324756" cy="230832"/>
-          </a:xfrm>
-          <a:prstGeom prst="rect">
-            <a:avLst/>
-          </a:prstGeom>
-          <a:noFill/>
-        </p:spPr>
-        <p:txBody>
-          <a:bodyPr wrap="square" rtlCol="0">
-            <a:spAutoFit/>
-          </a:bodyPr>
-          <a:lstStyle/>
-          <a:p>
-            <a:pPr algn="ctr"/>
-            <a:r>
-              <a:rPr lang="fr-FR" sz="900" i="1" dirty="0">
-                <a:latin typeface="Gill Sans Nova" panose="020B0602020104020203" pitchFamily="34" charset="0"/>
-              </a:rPr>
-              <a:t>P10 </a:t>
-            </a:r>
-            <a:r>
-              <a:rPr lang="fr-FR" sz="900" i="1" dirty="0" err="1">
-                <a:latin typeface="Gill Sans Nova" panose="020B0602020104020203" pitchFamily="34" charset="0"/>
-              </a:rPr>
-              <a:t>falls</a:t>
-            </a:r>
-            <a:r>
-              <a:rPr lang="fr-FR" sz="900" i="1" dirty="0">
-                <a:latin typeface="Gill Sans Nova" panose="020B0602020104020203" pitchFamily="34" charset="0"/>
-              </a:rPr>
-              <a:t> </a:t>
-            </a:r>
-            <a:r>
-              <a:rPr lang="fr-FR" sz="900" i="1" dirty="0" err="1">
-                <a:latin typeface="Gill Sans Nova" panose="020B0602020104020203" pitchFamily="34" charset="0"/>
-              </a:rPr>
-              <a:t>within</a:t>
-            </a:r>
-            <a:endParaRPr lang="fr-FR" sz="900" i="1" dirty="0">
-              <a:latin typeface="Gill Sans Nova" panose="020B0602020104020203" pitchFamily="34" charset="0"/>
-            </a:endParaRPr>
-          </a:p>
-        </p:txBody>
-      </p:sp>
-      <p:cxnSp>
-        <p:nvCxnSpPr>
-          <p:cNvPr id="245" name="Connecteur droit avec flèche 244">
-            <a:extLst>
-              <a:ext uri="{FF2B5EF4-FFF2-40B4-BE49-F238E27FC236}">
-                <a16:creationId xmlns:a16="http://schemas.microsoft.com/office/drawing/2014/main" id="{33AF4C4D-AB9F-4C9C-9A50-4CA102C13823}"/>
-              </a:ext>
-            </a:extLst>
-          </p:cNvPr>
-          <p:cNvCxnSpPr>
-            <a:cxnSpLocks/>
-            <a:stCxn id="18" idx="2"/>
-            <a:endCxn id="232" idx="0"/>
-          </p:cNvCxnSpPr>
-          <p:nvPr/>
-        </p:nvCxnSpPr>
-        <p:spPr>
-          <a:xfrm>
-            <a:off x="4911474" y="21362689"/>
-            <a:ext cx="0" cy="2132660"/>
-          </a:xfrm>
-          <a:prstGeom prst="straightConnector1">
-            <a:avLst/>
-          </a:prstGeom>
-          <a:ln>
-            <a:tailEnd type="triangle"/>
-          </a:ln>
-        </p:spPr>
-        <p:style>
-          <a:lnRef idx="1">
-            <a:schemeClr val="dk1"/>
-          </a:lnRef>
-          <a:fillRef idx="0">
-            <a:schemeClr val="dk1"/>
-          </a:fillRef>
-          <a:effectRef idx="0">
-            <a:schemeClr val="dk1"/>
-          </a:effectRef>
-          <a:fontRef idx="minor">
-            <a:schemeClr val="tx1"/>
-          </a:fontRef>
-        </p:style>
-      </p:cxnSp>
-      <p:sp>
-        <p:nvSpPr>
-          <p:cNvPr id="246" name="ZoneTexte 245">
-            <a:extLst>
-              <a:ext uri="{FF2B5EF4-FFF2-40B4-BE49-F238E27FC236}">
-                <a16:creationId xmlns:a16="http://schemas.microsoft.com/office/drawing/2014/main" id="{31BA01F3-3AE0-4E7D-A0FE-2A9C1694CA47}"/>
-              </a:ext>
-            </a:extLst>
-          </p:cNvPr>
-          <p:cNvSpPr txBox="1"/>
-          <p:nvPr/>
-        </p:nvSpPr>
-        <p:spPr>
-          <a:xfrm>
-            <a:off x="4081736" y="21863719"/>
-            <a:ext cx="960633" cy="369332"/>
-          </a:xfrm>
-          <a:prstGeom prst="rect">
-            <a:avLst/>
-          </a:prstGeom>
-          <a:noFill/>
-        </p:spPr>
-        <p:txBody>
-          <a:bodyPr wrap="square" rtlCol="0" anchor="ctr">
-            <a:spAutoFit/>
-          </a:bodyPr>
-          <a:lstStyle/>
-          <a:p>
-            <a:pPr algn="ctr"/>
-            <a:r>
-              <a:rPr lang="fr-FR" sz="900" i="1" dirty="0">
-                <a:latin typeface="Gill Sans Nova" panose="020B0602020104020203" pitchFamily="34" charset="0"/>
-              </a:rPr>
-              <a:t>P166 </a:t>
-            </a:r>
-            <a:r>
-              <a:rPr lang="fr-FR" sz="900" i="1" dirty="0" err="1">
-                <a:latin typeface="Gill Sans Nova" panose="020B0602020104020203" pitchFamily="34" charset="0"/>
-              </a:rPr>
-              <a:t>was</a:t>
-            </a:r>
-            <a:r>
-              <a:rPr lang="fr-FR" sz="900" i="1" dirty="0">
-                <a:latin typeface="Gill Sans Nova" panose="020B0602020104020203" pitchFamily="34" charset="0"/>
-              </a:rPr>
-              <a:t> a </a:t>
-            </a:r>
-            <a:r>
-              <a:rPr lang="fr-FR" sz="900" i="1" dirty="0" err="1">
-                <a:latin typeface="Gill Sans Nova" panose="020B0602020104020203" pitchFamily="34" charset="0"/>
-              </a:rPr>
-              <a:t>presence</a:t>
-            </a:r>
-            <a:r>
-              <a:rPr lang="fr-FR" sz="900" i="1" dirty="0">
-                <a:latin typeface="Gill Sans Nova" panose="020B0602020104020203" pitchFamily="34" charset="0"/>
-              </a:rPr>
-              <a:t> of</a:t>
-            </a:r>
-          </a:p>
-        </p:txBody>
-      </p:sp>
-      <p:cxnSp>
-        <p:nvCxnSpPr>
-          <p:cNvPr id="257" name="Connecteur : en arc 256">
-            <a:extLst>
-              <a:ext uri="{FF2B5EF4-FFF2-40B4-BE49-F238E27FC236}">
-                <a16:creationId xmlns:a16="http://schemas.microsoft.com/office/drawing/2014/main" id="{0281C721-B9A3-4EDD-9319-983B0288E8B3}"/>
-              </a:ext>
-            </a:extLst>
-          </p:cNvPr>
-          <p:cNvCxnSpPr>
-            <a:cxnSpLocks/>
-            <a:stCxn id="232" idx="2"/>
-            <a:endCxn id="1376" idx="1"/>
-          </p:cNvCxnSpPr>
-          <p:nvPr/>
-        </p:nvCxnSpPr>
-        <p:spPr>
-          <a:xfrm rot="5400000" flipH="1" flipV="1">
-            <a:off x="9452641" y="18572046"/>
-            <a:ext cx="1018893" cy="10101229"/>
-          </a:xfrm>
-          <a:prstGeom prst="curvedConnector4">
-            <a:avLst>
-              <a:gd name="adj1" fmla="val -406343"/>
-              <a:gd name="adj2" fmla="val 92486"/>
-            </a:avLst>
-          </a:prstGeom>
-          <a:ln w="12700">
-            <a:solidFill>
-              <a:srgbClr val="8A6868"/>
-            </a:solidFill>
-            <a:prstDash val="sysDot"/>
-            <a:tailEnd type="triangle"/>
-          </a:ln>
-        </p:spPr>
-        <p:style>
-          <a:lnRef idx="1">
-            <a:schemeClr val="dk1"/>
-          </a:lnRef>
-          <a:fillRef idx="0">
-            <a:schemeClr val="dk1"/>
-          </a:fillRef>
-          <a:effectRef idx="0">
-            <a:schemeClr val="dk1"/>
-          </a:effectRef>
-          <a:fontRef idx="minor">
-            <a:schemeClr val="tx1"/>
-          </a:fontRef>
-        </p:style>
-      </p:cxnSp>
-      <p:sp>
-        <p:nvSpPr>
-          <p:cNvPr id="267" name="ZoneTexte 266">
-            <a:extLst>
-              <a:ext uri="{FF2B5EF4-FFF2-40B4-BE49-F238E27FC236}">
-                <a16:creationId xmlns:a16="http://schemas.microsoft.com/office/drawing/2014/main" id="{436CFC8F-1523-44B8-AC11-0DEEC2629B38}"/>
-              </a:ext>
-            </a:extLst>
-          </p:cNvPr>
-          <p:cNvSpPr txBox="1"/>
-          <p:nvPr/>
-        </p:nvSpPr>
-        <p:spPr>
-          <a:xfrm>
-            <a:off x="9007761" y="27749779"/>
-            <a:ext cx="1242988" cy="415498"/>
-          </a:xfrm>
-          <a:prstGeom prst="rect">
-            <a:avLst/>
-          </a:prstGeom>
-          <a:noFill/>
-        </p:spPr>
-        <p:txBody>
-          <a:bodyPr wrap="square" rtlCol="0">
-            <a:spAutoFit/>
-          </a:bodyPr>
-          <a:lstStyle/>
-          <a:p>
-            <a:pPr algn="ctr"/>
-            <a:r>
-              <a:rPr lang="fr-FR" sz="1050" i="1" dirty="0">
-                <a:solidFill>
-                  <a:srgbClr val="8A6868"/>
-                </a:solidFill>
-                <a:latin typeface="Gill Sans Nova" panose="020B0602020104020203" pitchFamily="34" charset="0"/>
-              </a:rPr>
-              <a:t>P161 has spatial projection </a:t>
-            </a:r>
-          </a:p>
-        </p:txBody>
-      </p:sp>
-      <p:sp>
-        <p:nvSpPr>
-          <p:cNvPr id="270" name="Rectangle : coins arrondis 269">
-            <a:extLst>
-              <a:ext uri="{FF2B5EF4-FFF2-40B4-BE49-F238E27FC236}">
-                <a16:creationId xmlns:a16="http://schemas.microsoft.com/office/drawing/2014/main" id="{17D53C07-2C39-41A7-BF83-0326882B9302}"/>
+        </p:txBody>
+      </p:sp>
+      <p:sp>
+        <p:nvSpPr>
+          <p:cNvPr id="300" name="Rectangle : coins arrondis 299">
+            <a:extLst>
+              <a:ext uri="{FF2B5EF4-FFF2-40B4-BE49-F238E27FC236}">
+                <a16:creationId xmlns:a16="http://schemas.microsoft.com/office/drawing/2014/main" id="{F0973BD2-5791-4B69-92DD-DDC5E4C02D77}"/>
               </a:ext>
             </a:extLst>
           </p:cNvPr>
@@ -15319,14 +15053,17 @@
         </p:nvSpPr>
         <p:spPr>
           <a:xfrm>
-            <a:off x="26598010" y="4204171"/>
-            <a:ext cx="1139308" cy="678712"/>
+            <a:off x="27211294" y="6962702"/>
+            <a:ext cx="1052047" cy="665980"/>
           </a:xfrm>
           <a:prstGeom prst="roundRect">
             <a:avLst/>
           </a:prstGeom>
           <a:solidFill>
-            <a:srgbClr val="F6CACA"/>
+            <a:schemeClr val="accent1">
+              <a:lumMod val="60000"/>
+              <a:lumOff val="40000"/>
+            </a:schemeClr>
           </a:solidFill>
           <a:ln w="12700">
             <a:noFill/>
@@ -15354,150 +15091,39 @@
             <a:r>
               <a:rPr lang="fr-FR" sz="900" dirty="0">
                 <a:solidFill>
-                  <a:schemeClr val="tx1"/>
-                </a:solidFill>
-                <a:latin typeface="Gill Sans Nova" panose="020B0602020104020203" pitchFamily="34" charset="0"/>
-              </a:rPr>
-              <a:t>E55 Type</a:t>
-            </a:r>
-          </a:p>
-          <a:p>
-            <a:pPr algn="ctr"/>
+                  <a:schemeClr val="bg1"/>
+                </a:solidFill>
+                <a:latin typeface="Gill Sans Nova" panose="020B0602020104020203" pitchFamily="34" charset="0"/>
+              </a:rPr>
+              <a:t>E63 </a:t>
+            </a:r>
+            <a:r>
+              <a:rPr lang="fr-FR" sz="900" dirty="0" err="1">
+                <a:solidFill>
+                  <a:schemeClr val="bg1"/>
+                </a:solidFill>
+                <a:latin typeface="Gill Sans Nova" panose="020B0602020104020203" pitchFamily="34" charset="0"/>
+              </a:rPr>
+              <a:t>Beginning</a:t>
+            </a:r>
             <a:r>
               <a:rPr lang="fr-FR" sz="900" dirty="0">
                 <a:solidFill>
-                  <a:schemeClr val="tx1"/>
-                </a:solidFill>
-                <a:latin typeface="Gill Sans Nova" panose="020B0602020104020203" pitchFamily="34" charset="0"/>
-              </a:rPr>
-              <a:t>« Livraison du Mercure Galant »</a:t>
-            </a:r>
-          </a:p>
-        </p:txBody>
-      </p:sp>
-      <p:sp>
-        <p:nvSpPr>
-          <p:cNvPr id="273" name="ZoneTexte 272">
-            <a:extLst>
-              <a:ext uri="{FF2B5EF4-FFF2-40B4-BE49-F238E27FC236}">
-                <a16:creationId xmlns:a16="http://schemas.microsoft.com/office/drawing/2014/main" id="{FE6F1C7A-C0B2-4CA7-87BD-B8DCEE1355A9}"/>
-              </a:ext>
-            </a:extLst>
-          </p:cNvPr>
-          <p:cNvSpPr txBox="1"/>
-          <p:nvPr/>
-        </p:nvSpPr>
-        <p:spPr>
-          <a:xfrm>
-            <a:off x="27117105" y="5146625"/>
-            <a:ext cx="1398361" cy="230832"/>
-          </a:xfrm>
-          <a:prstGeom prst="rect">
-            <a:avLst/>
-          </a:prstGeom>
-          <a:noFill/>
-        </p:spPr>
-        <p:txBody>
-          <a:bodyPr wrap="square" rtlCol="0">
-            <a:spAutoFit/>
-          </a:bodyPr>
-          <a:lstStyle/>
-          <a:p>
-            <a:pPr algn="ctr"/>
-            <a:r>
-              <a:rPr lang="fr-FR" sz="900" i="1" dirty="0">
-                <a:latin typeface="Gill Sans Nova" panose="020B0602020104020203" pitchFamily="34" charset="0"/>
-              </a:rPr>
-              <a:t>P2 has type</a:t>
-            </a:r>
-          </a:p>
-        </p:txBody>
-      </p:sp>
-      <p:sp>
-        <p:nvSpPr>
-          <p:cNvPr id="274" name="ZoneTexte 273">
-            <a:extLst>
-              <a:ext uri="{FF2B5EF4-FFF2-40B4-BE49-F238E27FC236}">
-                <a16:creationId xmlns:a16="http://schemas.microsoft.com/office/drawing/2014/main" id="{B4F3720B-3EA9-4120-B562-3D61BB9D5FB7}"/>
-              </a:ext>
-            </a:extLst>
-          </p:cNvPr>
-          <p:cNvSpPr txBox="1"/>
-          <p:nvPr/>
-        </p:nvSpPr>
-        <p:spPr>
-          <a:xfrm>
-            <a:off x="29346217" y="10429760"/>
-            <a:ext cx="1398361" cy="230832"/>
-          </a:xfrm>
-          <a:prstGeom prst="rect">
-            <a:avLst/>
-          </a:prstGeom>
-          <a:noFill/>
-        </p:spPr>
-        <p:txBody>
-          <a:bodyPr wrap="square" rtlCol="0">
-            <a:spAutoFit/>
-          </a:bodyPr>
-          <a:lstStyle/>
-          <a:p>
-            <a:pPr algn="ctr"/>
-            <a:r>
-              <a:rPr lang="fr-FR" sz="900" i="1" dirty="0">
-                <a:latin typeface="Gill Sans Nova" panose="020B0602020104020203" pitchFamily="34" charset="0"/>
-              </a:rPr>
-              <a:t>P2 has type</a:t>
-            </a:r>
-          </a:p>
-        </p:txBody>
-      </p:sp>
-      <p:cxnSp>
-        <p:nvCxnSpPr>
-          <p:cNvPr id="286" name="Connecteur droit avec flèche 285">
-            <a:extLst>
-              <a:ext uri="{FF2B5EF4-FFF2-40B4-BE49-F238E27FC236}">
-                <a16:creationId xmlns:a16="http://schemas.microsoft.com/office/drawing/2014/main" id="{222C9276-C0F0-4C07-9607-710E574559BF}"/>
-              </a:ext>
-            </a:extLst>
-          </p:cNvPr>
-          <p:cNvCxnSpPr>
-            <a:cxnSpLocks/>
-          </p:cNvCxnSpPr>
-          <p:nvPr/>
-        </p:nvCxnSpPr>
-        <p:spPr>
-          <a:xfrm>
-            <a:off x="29842823" y="10053212"/>
-            <a:ext cx="898482" cy="704938"/>
-          </a:xfrm>
-          <a:prstGeom prst="straightConnector1">
-            <a:avLst/>
-          </a:prstGeom>
-          <a:ln>
-            <a:tailEnd type="triangle"/>
-          </a:ln>
-        </p:spPr>
-        <p:style>
-          <a:lnRef idx="1">
-            <a:schemeClr val="dk1"/>
-          </a:lnRef>
-          <a:fillRef idx="0">
-            <a:schemeClr val="dk1"/>
-          </a:fillRef>
-          <a:effectRef idx="0">
-            <a:schemeClr val="dk1"/>
-          </a:effectRef>
-          <a:fontRef idx="minor">
-            <a:schemeClr val="tx1"/>
-          </a:fontRef>
-        </p:style>
-      </p:cxnSp>
-      <p:sp>
-        <p:nvSpPr>
-          <p:cNvPr id="292" name="Rectangle : coins arrondis 291">
-            <a:extLst>
-              <a:ext uri="{FF2B5EF4-FFF2-40B4-BE49-F238E27FC236}">
-                <a16:creationId xmlns:a16="http://schemas.microsoft.com/office/drawing/2014/main" id="{E8C496EE-D5E9-435A-9B61-1CA3D291F299}"/>
+                  <a:schemeClr val="bg1"/>
+                </a:solidFill>
+                <a:latin typeface="Gill Sans Nova" panose="020B0602020104020203" pitchFamily="34" charset="0"/>
+              </a:rPr>
+              <a:t> of Existence</a:t>
+            </a:r>
+          </a:p>
+        </p:txBody>
+      </p:sp>
+      <p:sp>
+        <p:nvSpPr>
+          <p:cNvPr id="305" name="Rectangle : coins arrondis 304">
+            <a:extLst>
+              <a:ext uri="{FF2B5EF4-FFF2-40B4-BE49-F238E27FC236}">
+                <a16:creationId xmlns:a16="http://schemas.microsoft.com/office/drawing/2014/main" id="{064A9CBD-E352-42F1-A05C-0AB6D08774C6}"/>
               </a:ext>
             </a:extLst>
           </p:cNvPr>
@@ -15506,14 +15132,17 @@
         </p:nvSpPr>
         <p:spPr>
           <a:xfrm>
-            <a:off x="30713451" y="10723752"/>
-            <a:ext cx="1139308" cy="678712"/>
+            <a:off x="24858028" y="7055777"/>
+            <a:ext cx="976814" cy="458655"/>
           </a:xfrm>
           <a:prstGeom prst="roundRect">
             <a:avLst/>
           </a:prstGeom>
           <a:solidFill>
-            <a:srgbClr val="F6CACA"/>
+            <a:schemeClr val="accent6">
+              <a:lumMod val="40000"/>
+              <a:lumOff val="60000"/>
+            </a:schemeClr>
           </a:solidFill>
           <a:ln w="12700">
             <a:noFill/>
@@ -15545,33 +15174,136 @@
                 </a:solidFill>
                 <a:latin typeface="Gill Sans Nova" panose="020B0602020104020203" pitchFamily="34" charset="0"/>
               </a:rPr>
-              <a:t>E55 Type</a:t>
-            </a:r>
-          </a:p>
-          <a:p>
-            <a:pPr algn="ctr"/>
-            <a:r>
-              <a:rPr lang="fr-FR" sz="900" dirty="0">
-                <a:solidFill>
-                  <a:schemeClr val="tx1"/>
-                </a:solidFill>
-                <a:latin typeface="Gill Sans Nova" panose="020B0602020104020203" pitchFamily="34" charset="0"/>
-              </a:rPr>
-              <a:t>« Article du </a:t>
-            </a:r>
-            <a:r>
-              <a:rPr lang="fr-FR" sz="900">
-                <a:solidFill>
-                  <a:schemeClr val="tx1"/>
-                </a:solidFill>
-                <a:latin typeface="Gill Sans Nova" panose="020B0602020104020203" pitchFamily="34" charset="0"/>
-              </a:rPr>
-              <a:t>Mercure Galant »</a:t>
-            </a:r>
-            <a:endParaRPr lang="fr-FR" sz="900" dirty="0">
-              <a:solidFill>
-                <a:schemeClr val="tx1"/>
-              </a:solidFill>
+              <a:t>E52 Time-Span</a:t>
+            </a:r>
+          </a:p>
+        </p:txBody>
+      </p:sp>
+      <p:cxnSp>
+        <p:nvCxnSpPr>
+          <p:cNvPr id="307" name="Connecteur droit avec flèche 306">
+            <a:extLst>
+              <a:ext uri="{FF2B5EF4-FFF2-40B4-BE49-F238E27FC236}">
+                <a16:creationId xmlns:a16="http://schemas.microsoft.com/office/drawing/2014/main" id="{B47F3C41-FE45-4C1E-B52B-3B231B04F0F7}"/>
+              </a:ext>
+            </a:extLst>
+          </p:cNvPr>
+          <p:cNvCxnSpPr>
+            <a:cxnSpLocks/>
+          </p:cNvCxnSpPr>
+          <p:nvPr/>
+        </p:nvCxnSpPr>
+        <p:spPr>
+          <a:xfrm flipV="1">
+            <a:off x="28218821" y="6250274"/>
+            <a:ext cx="607720" cy="737599"/>
+          </a:xfrm>
+          <a:prstGeom prst="straightConnector1">
+            <a:avLst/>
+          </a:prstGeom>
+          <a:ln>
+            <a:tailEnd type="triangle"/>
+          </a:ln>
+        </p:spPr>
+        <p:style>
+          <a:lnRef idx="1">
+            <a:schemeClr val="dk1"/>
+          </a:lnRef>
+          <a:fillRef idx="0">
+            <a:schemeClr val="dk1"/>
+          </a:fillRef>
+          <a:effectRef idx="0">
+            <a:schemeClr val="dk1"/>
+          </a:effectRef>
+          <a:fontRef idx="minor">
+            <a:schemeClr val="tx1"/>
+          </a:fontRef>
+        </p:style>
+      </p:cxnSp>
+      <p:cxnSp>
+        <p:nvCxnSpPr>
+          <p:cNvPr id="309" name="Connecteur droit avec flèche 308">
+            <a:extLst>
+              <a:ext uri="{FF2B5EF4-FFF2-40B4-BE49-F238E27FC236}">
+                <a16:creationId xmlns:a16="http://schemas.microsoft.com/office/drawing/2014/main" id="{65C4FD4C-6066-4CF6-85CB-55DC36A5EBB1}"/>
+              </a:ext>
+            </a:extLst>
+          </p:cNvPr>
+          <p:cNvCxnSpPr>
+            <a:stCxn id="300" idx="1"/>
+            <a:endCxn id="305" idx="3"/>
+          </p:cNvCxnSpPr>
+          <p:nvPr/>
+        </p:nvCxnSpPr>
+        <p:spPr>
+          <a:xfrm flipH="1" flipV="1">
+            <a:off x="25834842" y="7285105"/>
+            <a:ext cx="1376452" cy="10587"/>
+          </a:xfrm>
+          <a:prstGeom prst="straightConnector1">
+            <a:avLst/>
+          </a:prstGeom>
+          <a:ln>
+            <a:tailEnd type="triangle"/>
+          </a:ln>
+        </p:spPr>
+        <p:style>
+          <a:lnRef idx="1">
+            <a:schemeClr val="dk1"/>
+          </a:lnRef>
+          <a:fillRef idx="0">
+            <a:schemeClr val="dk1"/>
+          </a:fillRef>
+          <a:effectRef idx="0">
+            <a:schemeClr val="dk1"/>
+          </a:effectRef>
+          <a:fontRef idx="minor">
+            <a:schemeClr val="tx1"/>
+          </a:fontRef>
+        </p:style>
+      </p:cxnSp>
+      <p:sp>
+        <p:nvSpPr>
+          <p:cNvPr id="312" name="ZoneTexte 311">
+            <a:extLst>
+              <a:ext uri="{FF2B5EF4-FFF2-40B4-BE49-F238E27FC236}">
+                <a16:creationId xmlns:a16="http://schemas.microsoft.com/office/drawing/2014/main" id="{1EB1E6F8-C471-4916-A2A7-D21E9AF50D29}"/>
+              </a:ext>
+            </a:extLst>
+          </p:cNvPr>
+          <p:cNvSpPr txBox="1"/>
+          <p:nvPr/>
+        </p:nvSpPr>
+        <p:spPr>
+          <a:xfrm>
+            <a:off x="25867412" y="7034904"/>
+            <a:ext cx="1398361" cy="230832"/>
+          </a:xfrm>
+          <a:prstGeom prst="rect">
+            <a:avLst/>
+          </a:prstGeom>
+          <a:noFill/>
+        </p:spPr>
+        <p:txBody>
+          <a:bodyPr wrap="square" rtlCol="0">
+            <a:spAutoFit/>
+          </a:bodyPr>
+          <a:lstStyle/>
+          <a:p>
+            <a:pPr algn="ctr"/>
+            <a:r>
+              <a:rPr lang="fr-FR" sz="900" i="1" dirty="0">
+                <a:latin typeface="Gill Sans Nova" panose="020B0602020104020203" pitchFamily="34" charset="0"/>
+              </a:rPr>
+              <a:t>P4 has time-</a:t>
+            </a:r>
+            <a:r>
+              <a:rPr lang="fr-FR" sz="900" i="1" dirty="0" err="1">
+                <a:latin typeface="Gill Sans Nova" panose="020B0602020104020203" pitchFamily="34" charset="0"/>
+              </a:rPr>
+              <a:t>span</a:t>
+            </a:r>
+            <a:endParaRPr lang="fr-FR" sz="900" i="1" dirty="0">
               <a:latin typeface="Gill Sans Nova" panose="020B0602020104020203" pitchFamily="34" charset="0"/>
             </a:endParaRPr>
           </a:p>
@@ -15579,10 +15311,72 @@
       </p:sp>
       <p:sp>
         <p:nvSpPr>
-          <p:cNvPr id="300" name="Rectangle : coins arrondis 299">
-            <a:extLst>
-              <a:ext uri="{FF2B5EF4-FFF2-40B4-BE49-F238E27FC236}">
-                <a16:creationId xmlns:a16="http://schemas.microsoft.com/office/drawing/2014/main" id="{F0973BD2-5791-4B69-92DD-DDC5E4C02D77}"/>
+          <p:cNvPr id="313" name="ZoneTexte 312">
+            <a:extLst>
+              <a:ext uri="{FF2B5EF4-FFF2-40B4-BE49-F238E27FC236}">
+                <a16:creationId xmlns:a16="http://schemas.microsoft.com/office/drawing/2014/main" id="{D97C9065-F969-4723-BBC2-9A23DD4DC14B}"/>
+              </a:ext>
+            </a:extLst>
+          </p:cNvPr>
+          <p:cNvSpPr txBox="1"/>
+          <p:nvPr/>
+        </p:nvSpPr>
+        <p:spPr>
+          <a:xfrm>
+            <a:off x="27619411" y="6417010"/>
+            <a:ext cx="984374" cy="369332"/>
+          </a:xfrm>
+          <a:prstGeom prst="rect">
+            <a:avLst/>
+          </a:prstGeom>
+          <a:noFill/>
+        </p:spPr>
+        <p:txBody>
+          <a:bodyPr wrap="square" rtlCol="0">
+            <a:spAutoFit/>
+          </a:bodyPr>
+          <a:lstStyle/>
+          <a:p>
+            <a:pPr algn="ctr"/>
+            <a:r>
+              <a:rPr lang="fr-FR" sz="900" i="1" dirty="0">
+                <a:latin typeface="Gill Sans Nova" panose="020B0602020104020203" pitchFamily="34" charset="0"/>
+              </a:rPr>
+              <a:t>P92 </a:t>
+            </a:r>
+            <a:r>
+              <a:rPr lang="fr-FR" sz="900" i="1" dirty="0" err="1">
+                <a:latin typeface="Gill Sans Nova" panose="020B0602020104020203" pitchFamily="34" charset="0"/>
+              </a:rPr>
+              <a:t>brought</a:t>
+            </a:r>
+            <a:r>
+              <a:rPr lang="fr-FR" sz="900" i="1" dirty="0">
+                <a:latin typeface="Gill Sans Nova" panose="020B0602020104020203" pitchFamily="34" charset="0"/>
+              </a:rPr>
+              <a:t> </a:t>
+            </a:r>
+            <a:r>
+              <a:rPr lang="fr-FR" sz="900" i="1" dirty="0" err="1">
+                <a:latin typeface="Gill Sans Nova" panose="020B0602020104020203" pitchFamily="34" charset="0"/>
+              </a:rPr>
+              <a:t>into</a:t>
+            </a:r>
+            <a:r>
+              <a:rPr lang="fr-FR" sz="900" i="1" dirty="0">
+                <a:latin typeface="Gill Sans Nova" panose="020B0602020104020203" pitchFamily="34" charset="0"/>
+              </a:rPr>
+              <a:t> existence</a:t>
+            </a:r>
+          </a:p>
+        </p:txBody>
+      </p:sp>
+      <p:sp>
+        <p:nvSpPr>
+          <p:cNvPr id="319" name="Rectangle : coins arrondis 318">
+            <a:extLst>
+              <a:ext uri="{FF2B5EF4-FFF2-40B4-BE49-F238E27FC236}">
+                <a16:creationId xmlns:a16="http://schemas.microsoft.com/office/drawing/2014/main" id="{158019D3-31C6-4759-AA6A-F4526287CEE9}"/>
               </a:ext>
             </a:extLst>
           </p:cNvPr>
@@ -15591,18 +15385,13 @@
         </p:nvSpPr>
         <p:spPr>
           <a:xfrm>
-            <a:off x="27211294" y="6962702"/>
-            <a:ext cx="1052047" cy="665980"/>
+            <a:off x="23640415" y="7837167"/>
+            <a:ext cx="976814" cy="458655"/>
           </a:xfrm>
           <a:prstGeom prst="roundRect">
             <a:avLst/>
           </a:prstGeom>
-          <a:solidFill>
-            <a:schemeClr val="accent1">
-              <a:lumMod val="60000"/>
-              <a:lumOff val="40000"/>
-            </a:schemeClr>
-          </a:solidFill>
+          <a:noFill/>
           <a:ln w="12700">
             <a:noFill/>
           </a:ln>
@@ -15629,39 +15418,327 @@
             <a:r>
               <a:rPr lang="fr-FR" sz="900" dirty="0">
                 <a:solidFill>
-                  <a:schemeClr val="bg1"/>
-                </a:solidFill>
-                <a:latin typeface="Gill Sans Nova" panose="020B0602020104020203" pitchFamily="34" charset="0"/>
-              </a:rPr>
-              <a:t>E63 </a:t>
-            </a:r>
-            <a:r>
-              <a:rPr lang="fr-FR" sz="900" dirty="0" err="1">
-                <a:solidFill>
-                  <a:schemeClr val="bg1"/>
-                </a:solidFill>
-                <a:latin typeface="Gill Sans Nova" panose="020B0602020104020203" pitchFamily="34" charset="0"/>
-              </a:rPr>
-              <a:t>Beginning</a:t>
-            </a:r>
-            <a:r>
-              <a:rPr lang="fr-FR" sz="900" dirty="0">
-                <a:solidFill>
-                  <a:schemeClr val="bg1"/>
-                </a:solidFill>
-                <a:latin typeface="Gill Sans Nova" panose="020B0602020104020203" pitchFamily="34" charset="0"/>
-              </a:rPr>
-              <a:t> of Existence</a:t>
-            </a:r>
-          </a:p>
-        </p:txBody>
-      </p:sp>
-      <p:sp>
-        <p:nvSpPr>
-          <p:cNvPr id="305" name="Rectangle : coins arrondis 304">
-            <a:extLst>
-              <a:ext uri="{FF2B5EF4-FFF2-40B4-BE49-F238E27FC236}">
-                <a16:creationId xmlns:a16="http://schemas.microsoft.com/office/drawing/2014/main" id="{064A9CBD-E352-42F1-A05C-0AB6D08774C6}"/>
+                  <a:schemeClr val="tx1"/>
+                </a:solidFill>
+                <a:latin typeface="Gill Sans Nova" panose="020B0602020104020203" pitchFamily="34" charset="0"/>
+              </a:rPr>
+              <a:t>« 1672-01 »</a:t>
+            </a:r>
+          </a:p>
+        </p:txBody>
+      </p:sp>
+      <p:cxnSp>
+        <p:nvCxnSpPr>
+          <p:cNvPr id="321" name="Connecteur : en arc 320">
+            <a:extLst>
+              <a:ext uri="{FF2B5EF4-FFF2-40B4-BE49-F238E27FC236}">
+                <a16:creationId xmlns:a16="http://schemas.microsoft.com/office/drawing/2014/main" id="{B1A1698C-A8C1-4041-A2F8-00ABF52A32CF}"/>
+              </a:ext>
+            </a:extLst>
+          </p:cNvPr>
+          <p:cNvCxnSpPr>
+            <a:stCxn id="305" idx="1"/>
+            <a:endCxn id="319" idx="0"/>
+          </p:cNvCxnSpPr>
+          <p:nvPr/>
+        </p:nvCxnSpPr>
+        <p:spPr>
+          <a:xfrm rot="10800000" flipV="1">
+            <a:off x="24128822" y="7285105"/>
+            <a:ext cx="729206" cy="552062"/>
+          </a:xfrm>
+          <a:prstGeom prst="curvedConnector2">
+            <a:avLst/>
+          </a:prstGeom>
+          <a:ln>
+            <a:tailEnd type="triangle"/>
+          </a:ln>
+        </p:spPr>
+        <p:style>
+          <a:lnRef idx="1">
+            <a:schemeClr val="dk1"/>
+          </a:lnRef>
+          <a:fillRef idx="0">
+            <a:schemeClr val="dk1"/>
+          </a:fillRef>
+          <a:effectRef idx="0">
+            <a:schemeClr val="dk1"/>
+          </a:effectRef>
+          <a:fontRef idx="minor">
+            <a:schemeClr val="tx1"/>
+          </a:fontRef>
+        </p:style>
+      </p:cxnSp>
+      <p:sp>
+        <p:nvSpPr>
+          <p:cNvPr id="322" name="ZoneTexte 321">
+            <a:extLst>
+              <a:ext uri="{FF2B5EF4-FFF2-40B4-BE49-F238E27FC236}">
+                <a16:creationId xmlns:a16="http://schemas.microsoft.com/office/drawing/2014/main" id="{45FDA39D-27A0-4A78-9FC1-B7E5D03559DC}"/>
+              </a:ext>
+            </a:extLst>
+          </p:cNvPr>
+          <p:cNvSpPr txBox="1"/>
+          <p:nvPr/>
+        </p:nvSpPr>
+        <p:spPr>
+          <a:xfrm>
+            <a:off x="23638040" y="7081991"/>
+            <a:ext cx="976814" cy="369332"/>
+          </a:xfrm>
+          <a:prstGeom prst="rect">
+            <a:avLst/>
+          </a:prstGeom>
+          <a:noFill/>
+        </p:spPr>
+        <p:txBody>
+          <a:bodyPr wrap="square" rtlCol="0">
+            <a:spAutoFit/>
+          </a:bodyPr>
+          <a:lstStyle/>
+          <a:p>
+            <a:pPr algn="ctr"/>
+            <a:r>
+              <a:rPr lang="fr-FR" sz="900" i="1" dirty="0">
+                <a:latin typeface="Gill Sans Nova" panose="020B0602020104020203" pitchFamily="34" charset="0"/>
+              </a:rPr>
+              <a:t>P80 end </a:t>
+            </a:r>
+            <a:r>
+              <a:rPr lang="fr-FR" sz="900" i="1" dirty="0" err="1">
+                <a:latin typeface="Gill Sans Nova" panose="020B0602020104020203" pitchFamily="34" charset="0"/>
+              </a:rPr>
+              <a:t>is</a:t>
+            </a:r>
+            <a:r>
+              <a:rPr lang="fr-FR" sz="900" i="1" dirty="0">
+                <a:latin typeface="Gill Sans Nova" panose="020B0602020104020203" pitchFamily="34" charset="0"/>
+              </a:rPr>
+              <a:t> </a:t>
+            </a:r>
+            <a:r>
+              <a:rPr lang="fr-FR" sz="900" i="1" dirty="0" err="1">
+                <a:latin typeface="Gill Sans Nova" panose="020B0602020104020203" pitchFamily="34" charset="0"/>
+              </a:rPr>
+              <a:t>qualified</a:t>
+            </a:r>
+            <a:r>
+              <a:rPr lang="fr-FR" sz="900" i="1" dirty="0">
+                <a:latin typeface="Gill Sans Nova" panose="020B0602020104020203" pitchFamily="34" charset="0"/>
+              </a:rPr>
+              <a:t> by</a:t>
+            </a:r>
+          </a:p>
+        </p:txBody>
+      </p:sp>
+      <p:cxnSp>
+        <p:nvCxnSpPr>
+          <p:cNvPr id="9" name="Connecteur : en arc 8">
+            <a:extLst>
+              <a:ext uri="{FF2B5EF4-FFF2-40B4-BE49-F238E27FC236}">
+                <a16:creationId xmlns:a16="http://schemas.microsoft.com/office/drawing/2014/main" id="{BD1A3EB3-1D6C-4945-BB45-A143C6513823}"/>
+              </a:ext>
+            </a:extLst>
+          </p:cNvPr>
+          <p:cNvCxnSpPr>
+            <a:endCxn id="1323" idx="1"/>
+          </p:cNvCxnSpPr>
+          <p:nvPr/>
+        </p:nvCxnSpPr>
+        <p:spPr>
+          <a:xfrm rot="5400000" flipH="1" flipV="1">
+            <a:off x="11496386" y="22511770"/>
+            <a:ext cx="4812814" cy="2237600"/>
+          </a:xfrm>
+          <a:prstGeom prst="curvedConnector2">
+            <a:avLst/>
+          </a:prstGeom>
+          <a:ln w="12700">
+            <a:solidFill>
+              <a:srgbClr val="8A6868"/>
+            </a:solidFill>
+            <a:prstDash val="sysDot"/>
+            <a:tailEnd type="triangle"/>
+          </a:ln>
+        </p:spPr>
+        <p:style>
+          <a:lnRef idx="1">
+            <a:schemeClr val="dk1"/>
+          </a:lnRef>
+          <a:fillRef idx="0">
+            <a:schemeClr val="dk1"/>
+          </a:fillRef>
+          <a:effectRef idx="0">
+            <a:schemeClr val="dk1"/>
+          </a:effectRef>
+          <a:fontRef idx="minor">
+            <a:schemeClr val="tx1"/>
+          </a:fontRef>
+        </p:style>
+      </p:cxnSp>
+      <p:sp>
+        <p:nvSpPr>
+          <p:cNvPr id="11" name="ZoneTexte 10">
+            <a:extLst>
+              <a:ext uri="{FF2B5EF4-FFF2-40B4-BE49-F238E27FC236}">
+                <a16:creationId xmlns:a16="http://schemas.microsoft.com/office/drawing/2014/main" id="{9D318049-5AFA-4F4B-B9D2-8778294A518F}"/>
+              </a:ext>
+            </a:extLst>
+          </p:cNvPr>
+          <p:cNvSpPr txBox="1"/>
+          <p:nvPr/>
+        </p:nvSpPr>
+        <p:spPr>
+          <a:xfrm>
+            <a:off x="12115300" y="22979637"/>
+            <a:ext cx="1242988" cy="230832"/>
+          </a:xfrm>
+          <a:prstGeom prst="rect">
+            <a:avLst/>
+          </a:prstGeom>
+          <a:noFill/>
+        </p:spPr>
+        <p:txBody>
+          <a:bodyPr wrap="square" rtlCol="0">
+            <a:spAutoFit/>
+          </a:bodyPr>
+          <a:lstStyle/>
+          <a:p>
+            <a:pPr algn="ctr"/>
+            <a:r>
+              <a:rPr lang="fr-FR" sz="900" i="1" dirty="0">
+                <a:solidFill>
+                  <a:srgbClr val="8A6868"/>
+                </a:solidFill>
+                <a:latin typeface="Gill Sans Nova" panose="020B0602020104020203" pitchFamily="34" charset="0"/>
+              </a:rPr>
+              <a:t>P121 </a:t>
+            </a:r>
+            <a:r>
+              <a:rPr lang="fr-FR" sz="900" i="1" dirty="0" err="1">
+                <a:solidFill>
+                  <a:srgbClr val="8A6868"/>
+                </a:solidFill>
+                <a:latin typeface="Gill Sans Nova" panose="020B0602020104020203" pitchFamily="34" charset="0"/>
+              </a:rPr>
+              <a:t>overlaps</a:t>
+            </a:r>
+            <a:r>
+              <a:rPr lang="fr-FR" sz="900" i="1" dirty="0">
+                <a:solidFill>
+                  <a:srgbClr val="8A6868"/>
+                </a:solidFill>
+                <a:latin typeface="Gill Sans Nova" panose="020B0602020104020203" pitchFamily="34" charset="0"/>
+              </a:rPr>
+              <a:t> </a:t>
+            </a:r>
+            <a:r>
+              <a:rPr lang="fr-FR" sz="900" i="1" dirty="0" err="1">
+                <a:solidFill>
+                  <a:srgbClr val="8A6868"/>
+                </a:solidFill>
+                <a:latin typeface="Gill Sans Nova" panose="020B0602020104020203" pitchFamily="34" charset="0"/>
+              </a:rPr>
+              <a:t>with</a:t>
+            </a:r>
+            <a:endParaRPr lang="fr-FR" sz="900" i="1" dirty="0">
+              <a:solidFill>
+                <a:srgbClr val="8A6868"/>
+              </a:solidFill>
+              <a:latin typeface="Gill Sans Nova" panose="020B0602020104020203" pitchFamily="34" charset="0"/>
+            </a:endParaRPr>
+          </a:p>
+        </p:txBody>
+      </p:sp>
+      <p:cxnSp>
+        <p:nvCxnSpPr>
+          <p:cNvPr id="22" name="Connecteur : en arc 21">
+            <a:extLst>
+              <a:ext uri="{FF2B5EF4-FFF2-40B4-BE49-F238E27FC236}">
+                <a16:creationId xmlns:a16="http://schemas.microsoft.com/office/drawing/2014/main" id="{0D6C2BEB-0044-465F-8740-423945CB2ADF}"/>
+              </a:ext>
+            </a:extLst>
+          </p:cNvPr>
+          <p:cNvCxnSpPr>
+            <a:stCxn id="929" idx="0"/>
+            <a:endCxn id="926" idx="2"/>
+          </p:cNvCxnSpPr>
+          <p:nvPr/>
+        </p:nvCxnSpPr>
+        <p:spPr>
+          <a:xfrm rot="16200000" flipV="1">
+            <a:off x="24795630" y="4836742"/>
+            <a:ext cx="1103962" cy="517531"/>
+          </a:xfrm>
+          <a:prstGeom prst="curvedConnector3">
+            <a:avLst/>
+          </a:prstGeom>
+          <a:ln>
+            <a:tailEnd type="triangle"/>
+          </a:ln>
+        </p:spPr>
+        <p:style>
+          <a:lnRef idx="1">
+            <a:schemeClr val="dk1"/>
+          </a:lnRef>
+          <a:fillRef idx="0">
+            <a:schemeClr val="dk1"/>
+          </a:fillRef>
+          <a:effectRef idx="0">
+            <a:schemeClr val="dk1"/>
+          </a:effectRef>
+          <a:fontRef idx="minor">
+            <a:schemeClr val="tx1"/>
+          </a:fontRef>
+        </p:style>
+      </p:cxnSp>
+      <p:cxnSp>
+        <p:nvCxnSpPr>
+          <p:cNvPr id="24" name="Connecteur droit avec flèche 23">
+            <a:extLst>
+              <a:ext uri="{FF2B5EF4-FFF2-40B4-BE49-F238E27FC236}">
+                <a16:creationId xmlns:a16="http://schemas.microsoft.com/office/drawing/2014/main" id="{FFB4E7FA-7777-4CC0-8E17-624378203DD3}"/>
+              </a:ext>
+            </a:extLst>
+          </p:cNvPr>
+          <p:cNvCxnSpPr>
+            <a:cxnSpLocks/>
+          </p:cNvCxnSpPr>
+          <p:nvPr/>
+        </p:nvCxnSpPr>
+        <p:spPr>
+          <a:xfrm flipH="1" flipV="1">
+            <a:off x="27713541" y="4845819"/>
+            <a:ext cx="1088331" cy="801670"/>
+          </a:xfrm>
+          <a:prstGeom prst="straightConnector1">
+            <a:avLst/>
+          </a:prstGeom>
+          <a:ln>
+            <a:tailEnd type="triangle"/>
+          </a:ln>
+        </p:spPr>
+        <p:style>
+          <a:lnRef idx="1">
+            <a:schemeClr val="dk1"/>
+          </a:lnRef>
+          <a:fillRef idx="0">
+            <a:schemeClr val="dk1"/>
+          </a:fillRef>
+          <a:effectRef idx="0">
+            <a:schemeClr val="dk1"/>
+          </a:effectRef>
+          <a:fontRef idx="minor">
+            <a:schemeClr val="tx1"/>
+          </a:fontRef>
+        </p:style>
+      </p:cxnSp>
+      <p:sp>
+        <p:nvSpPr>
+          <p:cNvPr id="2" name="Rectangle : coins arrondis 1">
+            <a:extLst>
+              <a:ext uri="{FF2B5EF4-FFF2-40B4-BE49-F238E27FC236}">
+                <a16:creationId xmlns:a16="http://schemas.microsoft.com/office/drawing/2014/main" id="{244EA3A0-42AF-427C-ABC0-D71EF28A7957}"/>
               </a:ext>
             </a:extLst>
           </p:cNvPr>
@@ -15670,19 +15747,16 @@
         </p:nvSpPr>
         <p:spPr>
           <a:xfrm>
-            <a:off x="24858028" y="7055777"/>
-            <a:ext cx="976814" cy="458655"/>
+            <a:off x="12989705" y="10603894"/>
+            <a:ext cx="1845216" cy="268547"/>
           </a:xfrm>
           <a:prstGeom prst="roundRect">
             <a:avLst/>
           </a:prstGeom>
           <a:solidFill>
-            <a:schemeClr val="accent6">
-              <a:lumMod val="40000"/>
-              <a:lumOff val="60000"/>
-            </a:schemeClr>
+            <a:schemeClr val="bg1"/>
           </a:solidFill>
-          <a:ln w="12700">
+          <a:ln w="19050">
             <a:noFill/>
           </a:ln>
         </p:spPr>
@@ -15701,7 +15775,7 @@
           </a:fontRef>
         </p:style>
         <p:txBody>
-          <a:bodyPr rtlCol="0" anchor="ctr"/>
+          <a:bodyPr rtlCol="0" anchor="t"/>
           <a:lstStyle/>
           <a:p>
             <a:pPr algn="ctr"/>
@@ -15710,211 +15784,35 @@
                 <a:solidFill>
                   <a:schemeClr val="tx1"/>
                 </a:solidFill>
-                <a:latin typeface="Gill Sans Nova" panose="020B0602020104020203" pitchFamily="34" charset="0"/>
-              </a:rPr>
-              <a:t>E52 Time-Span</a:t>
-            </a:r>
-          </a:p>
-        </p:txBody>
-      </p:sp>
-      <p:cxnSp>
-        <p:nvCxnSpPr>
-          <p:cNvPr id="307" name="Connecteur droit avec flèche 306">
-            <a:extLst>
-              <a:ext uri="{FF2B5EF4-FFF2-40B4-BE49-F238E27FC236}">
-                <a16:creationId xmlns:a16="http://schemas.microsoft.com/office/drawing/2014/main" id="{B47F3C41-FE45-4C1E-B52B-3B231B04F0F7}"/>
-              </a:ext>
-            </a:extLst>
-          </p:cNvPr>
-          <p:cNvCxnSpPr>
-            <a:cxnSpLocks/>
-          </p:cNvCxnSpPr>
-          <p:nvPr/>
-        </p:nvCxnSpPr>
-        <p:spPr>
-          <a:xfrm flipV="1">
-            <a:off x="28218821" y="6250274"/>
-            <a:ext cx="607720" cy="737599"/>
-          </a:xfrm>
-          <a:prstGeom prst="straightConnector1">
-            <a:avLst/>
-          </a:prstGeom>
-          <a:ln>
-            <a:tailEnd type="triangle"/>
-          </a:ln>
-        </p:spPr>
-        <p:style>
-          <a:lnRef idx="1">
-            <a:schemeClr val="dk1"/>
-          </a:lnRef>
-          <a:fillRef idx="0">
-            <a:schemeClr val="dk1"/>
-          </a:fillRef>
-          <a:effectRef idx="0">
-            <a:schemeClr val="dk1"/>
-          </a:effectRef>
-          <a:fontRef idx="minor">
-            <a:schemeClr val="tx1"/>
-          </a:fontRef>
-        </p:style>
-      </p:cxnSp>
-      <p:cxnSp>
-        <p:nvCxnSpPr>
-          <p:cNvPr id="309" name="Connecteur droit avec flèche 308">
-            <a:extLst>
-              <a:ext uri="{FF2B5EF4-FFF2-40B4-BE49-F238E27FC236}">
-                <a16:creationId xmlns:a16="http://schemas.microsoft.com/office/drawing/2014/main" id="{65C4FD4C-6066-4CF6-85CB-55DC36A5EBB1}"/>
-              </a:ext>
-            </a:extLst>
-          </p:cNvPr>
-          <p:cNvCxnSpPr>
-            <a:stCxn id="300" idx="1"/>
-            <a:endCxn id="305" idx="3"/>
-          </p:cNvCxnSpPr>
-          <p:nvPr/>
-        </p:nvCxnSpPr>
-        <p:spPr>
-          <a:xfrm flipH="1" flipV="1">
-            <a:off x="25834842" y="7285105"/>
-            <a:ext cx="1376452" cy="10587"/>
-          </a:xfrm>
-          <a:prstGeom prst="straightConnector1">
-            <a:avLst/>
-          </a:prstGeom>
-          <a:ln>
-            <a:tailEnd type="triangle"/>
-          </a:ln>
-        </p:spPr>
-        <p:style>
-          <a:lnRef idx="1">
-            <a:schemeClr val="dk1"/>
-          </a:lnRef>
-          <a:fillRef idx="0">
-            <a:schemeClr val="dk1"/>
-          </a:fillRef>
-          <a:effectRef idx="0">
-            <a:schemeClr val="dk1"/>
-          </a:effectRef>
-          <a:fontRef idx="minor">
-            <a:schemeClr val="tx1"/>
-          </a:fontRef>
-        </p:style>
-      </p:cxnSp>
-      <p:sp>
-        <p:nvSpPr>
-          <p:cNvPr id="312" name="ZoneTexte 311">
-            <a:extLst>
-              <a:ext uri="{FF2B5EF4-FFF2-40B4-BE49-F238E27FC236}">
-                <a16:creationId xmlns:a16="http://schemas.microsoft.com/office/drawing/2014/main" id="{1EB1E6F8-C471-4916-A2A7-D21E9AF50D29}"/>
-              </a:ext>
-            </a:extLst>
-          </p:cNvPr>
-          <p:cNvSpPr txBox="1"/>
-          <p:nvPr/>
-        </p:nvSpPr>
-        <p:spPr>
-          <a:xfrm>
-            <a:off x="25867412" y="7034904"/>
-            <a:ext cx="1398361" cy="230832"/>
-          </a:xfrm>
-          <a:prstGeom prst="rect">
-            <a:avLst/>
-          </a:prstGeom>
-          <a:noFill/>
-        </p:spPr>
-        <p:txBody>
-          <a:bodyPr wrap="square" rtlCol="0">
-            <a:spAutoFit/>
-          </a:bodyPr>
-          <a:lstStyle/>
-          <a:p>
-            <a:pPr algn="ctr"/>
-            <a:r>
-              <a:rPr lang="fr-FR" sz="900" i="1" dirty="0">
-                <a:latin typeface="Gill Sans Nova" panose="020B0602020104020203" pitchFamily="34" charset="0"/>
-              </a:rPr>
-              <a:t>P4 has time-</a:t>
-            </a:r>
-            <a:r>
-              <a:rPr lang="fr-FR" sz="900" i="1" dirty="0" err="1">
-                <a:latin typeface="Gill Sans Nova" panose="020B0602020104020203" pitchFamily="34" charset="0"/>
-              </a:rPr>
-              <a:t>span</a:t>
-            </a:r>
-            <a:endParaRPr lang="fr-FR" sz="900" i="1" dirty="0">
-              <a:latin typeface="Gill Sans Nova" panose="020B0602020104020203" pitchFamily="34" charset="0"/>
-            </a:endParaRPr>
-          </a:p>
-        </p:txBody>
-      </p:sp>
-      <p:sp>
-        <p:nvSpPr>
-          <p:cNvPr id="313" name="ZoneTexte 312">
-            <a:extLst>
-              <a:ext uri="{FF2B5EF4-FFF2-40B4-BE49-F238E27FC236}">
-                <a16:creationId xmlns:a16="http://schemas.microsoft.com/office/drawing/2014/main" id="{D97C9065-F969-4723-BBC2-9A23DD4DC14B}"/>
-              </a:ext>
-            </a:extLst>
-          </p:cNvPr>
-          <p:cNvSpPr txBox="1"/>
-          <p:nvPr/>
-        </p:nvSpPr>
-        <p:spPr>
-          <a:xfrm>
-            <a:off x="27619411" y="6417010"/>
-            <a:ext cx="984374" cy="369332"/>
-          </a:xfrm>
-          <a:prstGeom prst="rect">
-            <a:avLst/>
-          </a:prstGeom>
-          <a:noFill/>
-        </p:spPr>
-        <p:txBody>
-          <a:bodyPr wrap="square" rtlCol="0">
-            <a:spAutoFit/>
-          </a:bodyPr>
-          <a:lstStyle/>
-          <a:p>
-            <a:pPr algn="ctr"/>
-            <a:r>
-              <a:rPr lang="fr-FR" sz="900" i="1" dirty="0">
-                <a:latin typeface="Gill Sans Nova" panose="020B0602020104020203" pitchFamily="34" charset="0"/>
-              </a:rPr>
-              <a:t>P92 </a:t>
-            </a:r>
-            <a:r>
-              <a:rPr lang="fr-FR" sz="900" i="1" dirty="0" err="1">
-                <a:latin typeface="Gill Sans Nova" panose="020B0602020104020203" pitchFamily="34" charset="0"/>
-              </a:rPr>
-              <a:t>brought</a:t>
-            </a:r>
-            <a:r>
-              <a:rPr lang="fr-FR" sz="900" i="1" dirty="0">
-                <a:latin typeface="Gill Sans Nova" panose="020B0602020104020203" pitchFamily="34" charset="0"/>
-              </a:rPr>
-              <a:t> </a:t>
-            </a:r>
-            <a:r>
-              <a:rPr lang="fr-FR" sz="900" i="1" dirty="0" err="1">
-                <a:latin typeface="Gill Sans Nova" panose="020B0602020104020203" pitchFamily="34" charset="0"/>
-              </a:rPr>
-              <a:t>into</a:t>
-            </a:r>
-            <a:r>
-              <a:rPr lang="fr-FR" sz="900" i="1" dirty="0">
-                <a:latin typeface="Gill Sans Nova" panose="020B0602020104020203" pitchFamily="34" charset="0"/>
-              </a:rPr>
-              <a:t> existence</a:t>
-            </a:r>
-          </a:p>
-        </p:txBody>
-      </p:sp>
-      <p:sp>
-        <p:nvSpPr>
-          <p:cNvPr id="319" name="Rectangle : coins arrondis 318">
-            <a:extLst>
-              <a:ext uri="{FF2B5EF4-FFF2-40B4-BE49-F238E27FC236}">
-                <a16:creationId xmlns:a16="http://schemas.microsoft.com/office/drawing/2014/main" id="{158019D3-31C6-4759-AA6A-F4526287CEE9}"/>
+              </a:rPr>
+              <a:t>« </a:t>
+            </a:r>
+            <a:r>
+              <a:rPr lang="fr-FR" sz="900" b="0" dirty="0">
+                <a:solidFill>
+                  <a:schemeClr val="tx1"/>
+                </a:solidFill>
+                <a:effectLst/>
+              </a:rPr>
+              <a:t>2020-11-18T06:16:06+0000 </a:t>
+            </a:r>
+            <a:r>
+              <a:rPr lang="fr-FR" sz="900" dirty="0">
+                <a:solidFill>
+                  <a:schemeClr val="tx1"/>
+                </a:solidFill>
+              </a:rPr>
+              <a:t>»</a:t>
+            </a:r>
+          </a:p>
+        </p:txBody>
+      </p:sp>
+      <p:sp>
+        <p:nvSpPr>
+          <p:cNvPr id="3" name="Rectangle : coins arrondis 2">
+            <a:extLst>
+              <a:ext uri="{FF2B5EF4-FFF2-40B4-BE49-F238E27FC236}">
+                <a16:creationId xmlns:a16="http://schemas.microsoft.com/office/drawing/2014/main" id="{AA3911D9-F769-4D1D-9F1F-3EF9CADCCCE9}"/>
               </a:ext>
             </a:extLst>
           </p:cNvPr>
@@ -15923,14 +15821,16 @@
         </p:nvSpPr>
         <p:spPr>
           <a:xfrm>
-            <a:off x="23640415" y="7837167"/>
-            <a:ext cx="976814" cy="458655"/>
+            <a:off x="18254840" y="13087565"/>
+            <a:ext cx="1845216" cy="268547"/>
           </a:xfrm>
           <a:prstGeom prst="roundRect">
             <a:avLst/>
           </a:prstGeom>
-          <a:noFill/>
-          <a:ln w="12700">
+          <a:solidFill>
+            <a:schemeClr val="bg1"/>
+          </a:solidFill>
+          <a:ln w="19050">
             <a:noFill/>
           </a:ln>
         </p:spPr>
@@ -15949,352 +15849,61 @@
           </a:fontRef>
         </p:style>
         <p:txBody>
-          <a:bodyPr rtlCol="0" anchor="ctr"/>
-          <a:lstStyle/>
-          <a:p>
-            <a:pPr algn="ctr"/>
+          <a:bodyPr rtlCol="0" anchor="t"/>
+          <a:lstStyle/>
+          <a:p>
             <a:r>
               <a:rPr lang="fr-FR" sz="900" dirty="0">
                 <a:solidFill>
                   <a:schemeClr val="tx1"/>
                 </a:solidFill>
-                <a:latin typeface="Gill Sans Nova" panose="020B0602020104020203" pitchFamily="34" charset="0"/>
-              </a:rPr>
-              <a:t>« 1672-01 »</a:t>
-            </a:r>
-          </a:p>
-        </p:txBody>
-      </p:sp>
-      <p:cxnSp>
-        <p:nvCxnSpPr>
-          <p:cNvPr id="321" name="Connecteur : en arc 320">
-            <a:extLst>
-              <a:ext uri="{FF2B5EF4-FFF2-40B4-BE49-F238E27FC236}">
-                <a16:creationId xmlns:a16="http://schemas.microsoft.com/office/drawing/2014/main" id="{B1A1698C-A8C1-4041-A2F8-00ABF52A32CF}"/>
-              </a:ext>
-            </a:extLst>
-          </p:cNvPr>
-          <p:cNvCxnSpPr>
-            <a:stCxn id="305" idx="1"/>
-            <a:endCxn id="319" idx="0"/>
-          </p:cNvCxnSpPr>
-          <p:nvPr/>
-        </p:nvCxnSpPr>
-        <p:spPr>
-          <a:xfrm rot="10800000" flipV="1">
-            <a:off x="24128822" y="7285105"/>
-            <a:ext cx="729206" cy="552062"/>
-          </a:xfrm>
-          <a:prstGeom prst="curvedConnector2">
-            <a:avLst/>
-          </a:prstGeom>
-          <a:ln>
-            <a:tailEnd type="triangle"/>
-          </a:ln>
-        </p:spPr>
-        <p:style>
-          <a:lnRef idx="1">
-            <a:schemeClr val="dk1"/>
-          </a:lnRef>
-          <a:fillRef idx="0">
-            <a:schemeClr val="dk1"/>
-          </a:fillRef>
-          <a:effectRef idx="0">
-            <a:schemeClr val="dk1"/>
-          </a:effectRef>
-          <a:fontRef idx="minor">
-            <a:schemeClr val="tx1"/>
-          </a:fontRef>
-        </p:style>
-      </p:cxnSp>
-      <p:sp>
-        <p:nvSpPr>
-          <p:cNvPr id="322" name="ZoneTexte 321">
-            <a:extLst>
-              <a:ext uri="{FF2B5EF4-FFF2-40B4-BE49-F238E27FC236}">
-                <a16:creationId xmlns:a16="http://schemas.microsoft.com/office/drawing/2014/main" id="{45FDA39D-27A0-4A78-9FC1-B7E5D03559DC}"/>
-              </a:ext>
-            </a:extLst>
-          </p:cNvPr>
-          <p:cNvSpPr txBox="1"/>
-          <p:nvPr/>
-        </p:nvSpPr>
-        <p:spPr>
-          <a:xfrm>
-            <a:off x="23638040" y="7081991"/>
-            <a:ext cx="976814" cy="369332"/>
-          </a:xfrm>
-          <a:prstGeom prst="rect">
-            <a:avLst/>
-          </a:prstGeom>
-          <a:noFill/>
-        </p:spPr>
-        <p:txBody>
-          <a:bodyPr wrap="square" rtlCol="0">
-            <a:spAutoFit/>
-          </a:bodyPr>
-          <a:lstStyle/>
-          <a:p>
-            <a:pPr algn="ctr"/>
-            <a:r>
-              <a:rPr lang="fr-FR" sz="900" i="1" dirty="0">
-                <a:latin typeface="Gill Sans Nova" panose="020B0602020104020203" pitchFamily="34" charset="0"/>
-              </a:rPr>
-              <a:t>P80 end </a:t>
-            </a:r>
-            <a:r>
-              <a:rPr lang="fr-FR" sz="900" i="1" dirty="0" err="1">
-                <a:latin typeface="Gill Sans Nova" panose="020B0602020104020203" pitchFamily="34" charset="0"/>
-              </a:rPr>
-              <a:t>is</a:t>
-            </a:r>
-            <a:r>
-              <a:rPr lang="fr-FR" sz="900" i="1" dirty="0">
-                <a:latin typeface="Gill Sans Nova" panose="020B0602020104020203" pitchFamily="34" charset="0"/>
-              </a:rPr>
-              <a:t> </a:t>
-            </a:r>
-            <a:r>
-              <a:rPr lang="fr-FR" sz="900" i="1" dirty="0" err="1">
-                <a:latin typeface="Gill Sans Nova" panose="020B0602020104020203" pitchFamily="34" charset="0"/>
-              </a:rPr>
-              <a:t>qualified</a:t>
-            </a:r>
-            <a:r>
-              <a:rPr lang="fr-FR" sz="900" i="1" dirty="0">
-                <a:latin typeface="Gill Sans Nova" panose="020B0602020104020203" pitchFamily="34" charset="0"/>
-              </a:rPr>
-              <a:t> by</a:t>
-            </a:r>
-          </a:p>
-        </p:txBody>
-      </p:sp>
-      <p:cxnSp>
-        <p:nvCxnSpPr>
-          <p:cNvPr id="9" name="Connecteur : en arc 8">
-            <a:extLst>
-              <a:ext uri="{FF2B5EF4-FFF2-40B4-BE49-F238E27FC236}">
-                <a16:creationId xmlns:a16="http://schemas.microsoft.com/office/drawing/2014/main" id="{BD1A3EB3-1D6C-4945-BB45-A143C6513823}"/>
-              </a:ext>
-            </a:extLst>
-          </p:cNvPr>
-          <p:cNvCxnSpPr>
-            <a:endCxn id="1323" idx="1"/>
-          </p:cNvCxnSpPr>
-          <p:nvPr/>
-        </p:nvCxnSpPr>
-        <p:spPr>
-          <a:xfrm rot="5400000" flipH="1" flipV="1">
-            <a:off x="11496386" y="22511770"/>
-            <a:ext cx="4812814" cy="2237600"/>
-          </a:xfrm>
-          <a:prstGeom prst="curvedConnector2">
-            <a:avLst/>
-          </a:prstGeom>
+              </a:rPr>
+              <a:t>« </a:t>
+            </a:r>
+            <a:r>
+              <a:rPr lang="fr-FR" sz="900" b="0" dirty="0">
+                <a:solidFill>
+                  <a:schemeClr val="tx1"/>
+                </a:solidFill>
+                <a:effectLst/>
+              </a:rPr>
+              <a:t>2020-11-18T06:16:06+0000 </a:t>
+            </a:r>
+            <a:r>
+              <a:rPr lang="fr-FR" sz="900" dirty="0">
+                <a:solidFill>
+                  <a:schemeClr val="tx1"/>
+                </a:solidFill>
+              </a:rPr>
+              <a:t>»</a:t>
+            </a:r>
+          </a:p>
+        </p:txBody>
+      </p:sp>
+      <p:sp>
+        <p:nvSpPr>
+          <p:cNvPr id="7" name="Rectangle : coins arrondis 6">
+            <a:extLst>
+              <a:ext uri="{FF2B5EF4-FFF2-40B4-BE49-F238E27FC236}">
+                <a16:creationId xmlns:a16="http://schemas.microsoft.com/office/drawing/2014/main" id="{E2415057-E5BB-4388-A278-2FBCAE86AD2C}"/>
+              </a:ext>
+            </a:extLst>
+          </p:cNvPr>
+          <p:cNvSpPr/>
+          <p:nvPr/>
+        </p:nvSpPr>
+        <p:spPr>
+          <a:xfrm>
+            <a:off x="26393563" y="22634431"/>
+            <a:ext cx="960209" cy="437614"/>
+          </a:xfrm>
+          <a:prstGeom prst="roundRect">
+            <a:avLst/>
+          </a:prstGeom>
+          <a:solidFill>
+            <a:srgbClr val="F6CACA"/>
+          </a:solidFill>
           <a:ln w="12700">
-            <a:solidFill>
-              <a:srgbClr val="8A6868"/>
-            </a:solidFill>
-            <a:prstDash val="sysDot"/>
-            <a:tailEnd type="triangle"/>
-          </a:ln>
-        </p:spPr>
-        <p:style>
-          <a:lnRef idx="1">
-            <a:schemeClr val="dk1"/>
-          </a:lnRef>
-          <a:fillRef idx="0">
-            <a:schemeClr val="dk1"/>
-          </a:fillRef>
-          <a:effectRef idx="0">
-            <a:schemeClr val="dk1"/>
-          </a:effectRef>
-          <a:fontRef idx="minor">
-            <a:schemeClr val="tx1"/>
-          </a:fontRef>
-        </p:style>
-      </p:cxnSp>
-      <p:sp>
-        <p:nvSpPr>
-          <p:cNvPr id="11" name="ZoneTexte 10">
-            <a:extLst>
-              <a:ext uri="{FF2B5EF4-FFF2-40B4-BE49-F238E27FC236}">
-                <a16:creationId xmlns:a16="http://schemas.microsoft.com/office/drawing/2014/main" id="{9D318049-5AFA-4F4B-B9D2-8778294A518F}"/>
-              </a:ext>
-            </a:extLst>
-          </p:cNvPr>
-          <p:cNvSpPr txBox="1"/>
-          <p:nvPr/>
-        </p:nvSpPr>
-        <p:spPr>
-          <a:xfrm>
-            <a:off x="12115300" y="22979637"/>
-            <a:ext cx="1242988" cy="230832"/>
-          </a:xfrm>
-          <a:prstGeom prst="rect">
-            <a:avLst/>
-          </a:prstGeom>
-          <a:noFill/>
-        </p:spPr>
-        <p:txBody>
-          <a:bodyPr wrap="square" rtlCol="0">
-            <a:spAutoFit/>
-          </a:bodyPr>
-          <a:lstStyle/>
-          <a:p>
-            <a:pPr algn="ctr"/>
-            <a:r>
-              <a:rPr lang="fr-FR" sz="900" i="1" dirty="0">
-                <a:solidFill>
-                  <a:srgbClr val="8A6868"/>
-                </a:solidFill>
-                <a:latin typeface="Gill Sans Nova" panose="020B0602020104020203" pitchFamily="34" charset="0"/>
-              </a:rPr>
-              <a:t>P121 </a:t>
-            </a:r>
-            <a:r>
-              <a:rPr lang="fr-FR" sz="900" i="1" dirty="0" err="1">
-                <a:solidFill>
-                  <a:srgbClr val="8A6868"/>
-                </a:solidFill>
-                <a:latin typeface="Gill Sans Nova" panose="020B0602020104020203" pitchFamily="34" charset="0"/>
-              </a:rPr>
-              <a:t>overlaps</a:t>
-            </a:r>
-            <a:r>
-              <a:rPr lang="fr-FR" sz="900" i="1" dirty="0">
-                <a:solidFill>
-                  <a:srgbClr val="8A6868"/>
-                </a:solidFill>
-                <a:latin typeface="Gill Sans Nova" panose="020B0602020104020203" pitchFamily="34" charset="0"/>
-              </a:rPr>
-              <a:t> </a:t>
-            </a:r>
-            <a:r>
-              <a:rPr lang="fr-FR" sz="900" i="1" dirty="0" err="1">
-                <a:solidFill>
-                  <a:srgbClr val="8A6868"/>
-                </a:solidFill>
-                <a:latin typeface="Gill Sans Nova" panose="020B0602020104020203" pitchFamily="34" charset="0"/>
-              </a:rPr>
-              <a:t>with</a:t>
-            </a:r>
-            <a:endParaRPr lang="fr-FR" sz="900" i="1" dirty="0">
-              <a:solidFill>
-                <a:srgbClr val="8A6868"/>
-              </a:solidFill>
-              <a:latin typeface="Gill Sans Nova" panose="020B0602020104020203" pitchFamily="34" charset="0"/>
-            </a:endParaRPr>
-          </a:p>
-        </p:txBody>
-      </p:sp>
-      <p:cxnSp>
-        <p:nvCxnSpPr>
-          <p:cNvPr id="22" name="Connecteur : en arc 21">
-            <a:extLst>
-              <a:ext uri="{FF2B5EF4-FFF2-40B4-BE49-F238E27FC236}">
-                <a16:creationId xmlns:a16="http://schemas.microsoft.com/office/drawing/2014/main" id="{0D6C2BEB-0044-465F-8740-423945CB2ADF}"/>
-              </a:ext>
-            </a:extLst>
-          </p:cNvPr>
-          <p:cNvCxnSpPr>
-            <a:stCxn id="929" idx="0"/>
-            <a:endCxn id="926" idx="2"/>
-          </p:cNvCxnSpPr>
-          <p:nvPr/>
-        </p:nvCxnSpPr>
-        <p:spPr>
-          <a:xfrm rot="16200000" flipV="1">
-            <a:off x="24795630" y="4836742"/>
-            <a:ext cx="1103962" cy="517531"/>
-          </a:xfrm>
-          <a:prstGeom prst="curvedConnector3">
-            <a:avLst/>
-          </a:prstGeom>
-          <a:ln>
-            <a:tailEnd type="triangle"/>
-          </a:ln>
-        </p:spPr>
-        <p:style>
-          <a:lnRef idx="1">
-            <a:schemeClr val="dk1"/>
-          </a:lnRef>
-          <a:fillRef idx="0">
-            <a:schemeClr val="dk1"/>
-          </a:fillRef>
-          <a:effectRef idx="0">
-            <a:schemeClr val="dk1"/>
-          </a:effectRef>
-          <a:fontRef idx="minor">
-            <a:schemeClr val="tx1"/>
-          </a:fontRef>
-        </p:style>
-      </p:cxnSp>
-      <p:cxnSp>
-        <p:nvCxnSpPr>
-          <p:cNvPr id="24" name="Connecteur droit avec flèche 23">
-            <a:extLst>
-              <a:ext uri="{FF2B5EF4-FFF2-40B4-BE49-F238E27FC236}">
-                <a16:creationId xmlns:a16="http://schemas.microsoft.com/office/drawing/2014/main" id="{FFB4E7FA-7777-4CC0-8E17-624378203DD3}"/>
-              </a:ext>
-            </a:extLst>
-          </p:cNvPr>
-          <p:cNvCxnSpPr>
-            <a:cxnSpLocks/>
-          </p:cNvCxnSpPr>
-          <p:nvPr/>
-        </p:nvCxnSpPr>
-        <p:spPr>
-          <a:xfrm flipH="1" flipV="1">
-            <a:off x="27713541" y="4845819"/>
-            <a:ext cx="1088331" cy="801670"/>
-          </a:xfrm>
-          <a:prstGeom prst="straightConnector1">
-            <a:avLst/>
-          </a:prstGeom>
-          <a:ln>
-            <a:tailEnd type="triangle"/>
-          </a:ln>
-        </p:spPr>
-        <p:style>
-          <a:lnRef idx="1">
-            <a:schemeClr val="dk1"/>
-          </a:lnRef>
-          <a:fillRef idx="0">
-            <a:schemeClr val="dk1"/>
-          </a:fillRef>
-          <a:effectRef idx="0">
-            <a:schemeClr val="dk1"/>
-          </a:effectRef>
-          <a:fontRef idx="minor">
-            <a:schemeClr val="tx1"/>
-          </a:fontRef>
-        </p:style>
-      </p:cxnSp>
-      <p:sp>
-        <p:nvSpPr>
-          <p:cNvPr id="2" name="Rectangle : coins arrondis 1">
-            <a:extLst>
-              <a:ext uri="{FF2B5EF4-FFF2-40B4-BE49-F238E27FC236}">
-                <a16:creationId xmlns:a16="http://schemas.microsoft.com/office/drawing/2014/main" id="{244EA3A0-42AF-427C-ABC0-D71EF28A7957}"/>
-              </a:ext>
-            </a:extLst>
-          </p:cNvPr>
-          <p:cNvSpPr/>
-          <p:nvPr/>
-        </p:nvSpPr>
-        <p:spPr>
-          <a:xfrm>
-            <a:off x="12989705" y="10603894"/>
-            <a:ext cx="1845216" cy="268547"/>
-          </a:xfrm>
-          <a:prstGeom prst="roundRect">
-            <a:avLst/>
-          </a:prstGeom>
-          <a:solidFill>
-            <a:schemeClr val="bg1"/>
-          </a:solidFill>
-          <a:ln w="19050">
             <a:noFill/>
           </a:ln>
         </p:spPr>
@@ -16313,7 +15922,7 @@
           </a:fontRef>
         </p:style>
         <p:txBody>
-          <a:bodyPr rtlCol="0" anchor="t"/>
+          <a:bodyPr rtlCol="0" anchor="ctr"/>
           <a:lstStyle/>
           <a:p>
             <a:pPr algn="ctr"/>
@@ -16322,35 +15931,123 @@
                 <a:solidFill>
                   <a:schemeClr val="tx1"/>
                 </a:solidFill>
-              </a:rPr>
-              <a:t>« </a:t>
-            </a:r>
-            <a:r>
-              <a:rPr lang="fr-FR" sz="900" b="0" dirty="0">
+                <a:latin typeface="Gill Sans Nova" panose="020B0602020104020203" pitchFamily="34" charset="0"/>
+              </a:rPr>
+              <a:t>E55 Type</a:t>
+            </a:r>
+          </a:p>
+          <a:p>
+            <a:pPr algn="ctr"/>
+            <a:r>
+              <a:rPr lang="fr-FR" sz="900" i="1">
                 <a:solidFill>
                   <a:schemeClr val="tx1"/>
                 </a:solidFill>
-                <a:effectLst/>
-              </a:rPr>
-              <a:t>2020-11-18T06:16:06+0000 </a:t>
-            </a:r>
-            <a:r>
-              <a:rPr lang="fr-FR" sz="900" dirty="0">
+                <a:latin typeface="Gill Sans Nova" panose="020B0602020104020203" pitchFamily="34" charset="0"/>
+              </a:rPr>
+              <a:t>« Adhérent </a:t>
+            </a:r>
+            <a:r>
+              <a:rPr lang="fr-FR" sz="900" i="1" dirty="0">
                 <a:solidFill>
                   <a:schemeClr val="tx1"/>
                 </a:solidFill>
+                <a:latin typeface="Gill Sans Nova" panose="020B0602020104020203" pitchFamily="34" charset="0"/>
               </a:rPr>
               <a:t>»</a:t>
             </a:r>
           </a:p>
         </p:txBody>
       </p:sp>
-      <p:sp>
-        <p:nvSpPr>
-          <p:cNvPr id="3" name="Rectangle : coins arrondis 2">
-            <a:extLst>
-              <a:ext uri="{FF2B5EF4-FFF2-40B4-BE49-F238E27FC236}">
-                <a16:creationId xmlns:a16="http://schemas.microsoft.com/office/drawing/2014/main" id="{AA3911D9-F769-4D1D-9F1F-3EF9CADCCCE9}"/>
+      <p:cxnSp>
+        <p:nvCxnSpPr>
+          <p:cNvPr id="271" name="Connecteur droit avec flèche 1749">
+            <a:extLst>
+              <a:ext uri="{FF2B5EF4-FFF2-40B4-BE49-F238E27FC236}">
+                <a16:creationId xmlns:a16="http://schemas.microsoft.com/office/drawing/2014/main" id="{F1BDEE82-3662-4037-8801-34CCA0A54C4E}"/>
+              </a:ext>
+            </a:extLst>
+          </p:cNvPr>
+          <p:cNvCxnSpPr>
+            <a:cxnSpLocks/>
+            <a:stCxn id="1728" idx="2"/>
+            <a:endCxn id="7" idx="0"/>
+          </p:cNvCxnSpPr>
+          <p:nvPr/>
+        </p:nvCxnSpPr>
+        <p:spPr>
+          <a:xfrm rot="16200000" flipH="1">
+            <a:off x="26237939" y="21998701"/>
+            <a:ext cx="716013" cy="555445"/>
+          </a:xfrm>
+          <a:prstGeom prst="curvedConnector3">
+            <a:avLst>
+              <a:gd name="adj1" fmla="val 50000"/>
+            </a:avLst>
+          </a:prstGeom>
+          <a:ln>
+            <a:tailEnd type="triangle"/>
+          </a:ln>
+        </p:spPr>
+        <p:style>
+          <a:lnRef idx="1">
+            <a:schemeClr val="dk1"/>
+          </a:lnRef>
+          <a:fillRef idx="0">
+            <a:schemeClr val="dk1"/>
+          </a:fillRef>
+          <a:effectRef idx="0">
+            <a:schemeClr val="dk1"/>
+          </a:effectRef>
+          <a:fontRef idx="minor">
+            <a:schemeClr val="tx1"/>
+          </a:fontRef>
+        </p:style>
+      </p:cxnSp>
+      <p:sp>
+        <p:nvSpPr>
+          <p:cNvPr id="15" name="ZoneTexte 14">
+            <a:extLst>
+              <a:ext uri="{FF2B5EF4-FFF2-40B4-BE49-F238E27FC236}">
+                <a16:creationId xmlns:a16="http://schemas.microsoft.com/office/drawing/2014/main" id="{C5B8EBF2-6D1B-4326-A6A2-A6346E9811B9}"/>
+              </a:ext>
+            </a:extLst>
+          </p:cNvPr>
+          <p:cNvSpPr txBox="1"/>
+          <p:nvPr/>
+        </p:nvSpPr>
+        <p:spPr>
+          <a:xfrm>
+            <a:off x="26157663" y="22157308"/>
+            <a:ext cx="1484002" cy="230832"/>
+          </a:xfrm>
+          <a:prstGeom prst="rect">
+            <a:avLst/>
+          </a:prstGeom>
+          <a:noFill/>
+        </p:spPr>
+        <p:txBody>
+          <a:bodyPr wrap="square" rtlCol="0">
+            <a:spAutoFit/>
+          </a:bodyPr>
+          <a:lstStyle/>
+          <a:p>
+            <a:pPr algn="ctr"/>
+            <a:r>
+              <a:rPr lang="fr-FR" sz="900" i="1" dirty="0">
+                <a:latin typeface="Gill Sans Nova" panose="020B0602020104020203" pitchFamily="34" charset="0"/>
+              </a:rPr>
+              <a:t>P2</a:t>
+            </a:r>
+          </a:p>
+        </p:txBody>
+      </p:sp>
+      <p:sp>
+        <p:nvSpPr>
+          <p:cNvPr id="256" name="Rectangle : coins arrondis 255">
+            <a:extLst>
+              <a:ext uri="{FF2B5EF4-FFF2-40B4-BE49-F238E27FC236}">
+                <a16:creationId xmlns:a16="http://schemas.microsoft.com/office/drawing/2014/main" id="{93A6A91A-76BC-4A4F-B849-B2CB9CDA7C4A}"/>
               </a:ext>
             </a:extLst>
           </p:cNvPr>
@@ -16359,17 +16056,19 @@
         </p:nvSpPr>
         <p:spPr>
           <a:xfrm>
-            <a:off x="18254840" y="13087565"/>
-            <a:ext cx="1845216" cy="268547"/>
+            <a:off x="28925590" y="22452739"/>
+            <a:ext cx="1311925" cy="856482"/>
           </a:xfrm>
           <a:prstGeom prst="roundRect">
             <a:avLst/>
           </a:prstGeom>
           <a:solidFill>
-            <a:schemeClr val="bg1"/>
+            <a:srgbClr val="FFD1A7"/>
           </a:solidFill>
-          <a:ln w="19050">
-            <a:noFill/>
+          <a:ln w="28575">
+            <a:solidFill>
+              <a:srgbClr val="FFB36D"/>
+            </a:solidFill>
           </a:ln>
         </p:spPr>
         <p:style>
@@ -16387,43 +16086,82 @@
           </a:fontRef>
         </p:style>
         <p:txBody>
-          <a:bodyPr rtlCol="0" anchor="t"/>
-          <a:lstStyle/>
-          <a:p>
+          <a:bodyPr rtlCol="0" anchor="ctr"/>
+          <a:lstStyle/>
+          <a:p>
+            <a:pPr algn="ctr"/>
             <a:r>
               <a:rPr lang="fr-FR" sz="900" dirty="0">
                 <a:solidFill>
                   <a:schemeClr val="tx1"/>
                 </a:solidFill>
-              </a:rPr>
-              <a:t>« </a:t>
-            </a:r>
-            <a:r>
-              <a:rPr lang="fr-FR" sz="900" b="0" dirty="0">
+                <a:latin typeface="Gill Sans Nova" panose="020B0602020104020203" pitchFamily="34" charset="0"/>
+              </a:rPr>
+              <a:t>E74 Group</a:t>
+            </a:r>
+          </a:p>
+          <a:p>
+            <a:pPr algn="ctr"/>
+            <a:r>
+              <a:rPr lang="fr-FR" sz="900" i="1" dirty="0">
                 <a:solidFill>
                   <a:schemeClr val="tx1"/>
                 </a:solidFill>
-                <a:effectLst/>
-              </a:rPr>
-              <a:t>2020-11-18T06:16:06+0000 </a:t>
-            </a:r>
-            <a:r>
-              <a:rPr lang="fr-FR" sz="900" dirty="0">
-                <a:solidFill>
-                  <a:schemeClr val="tx1"/>
-                </a:solidFill>
-              </a:rPr>
-              <a:t>»</a:t>
-            </a:r>
-          </a:p>
-        </p:txBody>
-      </p:sp>
-      <p:sp>
-        <p:nvSpPr>
-          <p:cNvPr id="7" name="Rectangle : coins arrondis 6">
-            <a:extLst>
-              <a:ext uri="{FF2B5EF4-FFF2-40B4-BE49-F238E27FC236}">
-                <a16:creationId xmlns:a16="http://schemas.microsoft.com/office/drawing/2014/main" id="{E2415057-E5BB-4388-A278-2FBCAE86AD2C}"/>
+                <a:latin typeface="Gill Sans Nova" panose="020B0602020104020203" pitchFamily="34" charset="0"/>
+              </a:rPr>
+              <a:t>(« Communautés de marchands et de bourgeois »)</a:t>
+            </a:r>
+          </a:p>
+        </p:txBody>
+      </p:sp>
+      <p:cxnSp>
+        <p:nvCxnSpPr>
+          <p:cNvPr id="19" name="Connecteur : en arc 18">
+            <a:extLst>
+              <a:ext uri="{FF2B5EF4-FFF2-40B4-BE49-F238E27FC236}">
+                <a16:creationId xmlns:a16="http://schemas.microsoft.com/office/drawing/2014/main" id="{D3B6888C-8D28-4F9E-841A-3042CFC6367F}"/>
+              </a:ext>
+            </a:extLst>
+          </p:cNvPr>
+          <p:cNvCxnSpPr>
+            <a:stCxn id="256" idx="3"/>
+            <a:endCxn id="1203" idx="2"/>
+          </p:cNvCxnSpPr>
+          <p:nvPr/>
+        </p:nvCxnSpPr>
+        <p:spPr>
+          <a:xfrm flipV="1">
+            <a:off x="30237515" y="21400893"/>
+            <a:ext cx="763064" cy="1480087"/>
+          </a:xfrm>
+          <a:prstGeom prst="curvedConnector2">
+            <a:avLst/>
+          </a:prstGeom>
+          <a:ln>
+            <a:tailEnd type="triangle"/>
+          </a:ln>
+        </p:spPr>
+        <p:style>
+          <a:lnRef idx="1">
+            <a:schemeClr val="dk1"/>
+          </a:lnRef>
+          <a:fillRef idx="0">
+            <a:schemeClr val="dk1"/>
+          </a:fillRef>
+          <a:effectRef idx="0">
+            <a:schemeClr val="dk1"/>
+          </a:effectRef>
+          <a:fontRef idx="minor">
+            <a:schemeClr val="tx1"/>
+          </a:fontRef>
+        </p:style>
+      </p:cxnSp>
+      <p:sp>
+        <p:nvSpPr>
+          <p:cNvPr id="266" name="Rectangle : coins arrondis 265">
+            <a:extLst>
+              <a:ext uri="{FF2B5EF4-FFF2-40B4-BE49-F238E27FC236}">
+                <a16:creationId xmlns:a16="http://schemas.microsoft.com/office/drawing/2014/main" id="{F5A61602-C9C4-408F-B8A6-6BBE1FE9BC99}"/>
               </a:ext>
             </a:extLst>
           </p:cNvPr>
@@ -16432,17 +16170,19 @@
         </p:nvSpPr>
         <p:spPr>
           <a:xfrm>
-            <a:off x="26393563" y="22634431"/>
-            <a:ext cx="960209" cy="437614"/>
+            <a:off x="30351866" y="23988531"/>
+            <a:ext cx="1386807" cy="856482"/>
           </a:xfrm>
           <a:prstGeom prst="roundRect">
             <a:avLst/>
           </a:prstGeom>
           <a:solidFill>
-            <a:srgbClr val="F6CACA"/>
+            <a:srgbClr val="FFD1A7"/>
           </a:solidFill>
-          <a:ln w="12700">
-            <a:noFill/>
+          <a:ln w="28575">
+            <a:solidFill>
+              <a:srgbClr val="FFB36D"/>
+            </a:solidFill>
           </a:ln>
         </p:spPr>
         <p:style>
@@ -16471,57 +16211,46 @@
                 </a:solidFill>
                 <a:latin typeface="Gill Sans Nova" panose="020B0602020104020203" pitchFamily="34" charset="0"/>
               </a:rPr>
-              <a:t>E55 Type</a:t>
-            </a:r>
-          </a:p>
-          <a:p>
-            <a:pPr algn="ctr"/>
-            <a:r>
-              <a:rPr lang="fr-FR" sz="900" i="1">
+              <a:t>E74 Group</a:t>
+            </a:r>
+          </a:p>
+          <a:p>
+            <a:pPr algn="ctr"/>
+            <a:r>
+              <a:rPr lang="fr-FR" sz="900" i="1" dirty="0">
                 <a:solidFill>
                   <a:schemeClr val="tx1"/>
                 </a:solidFill>
                 <a:latin typeface="Gill Sans Nova" panose="020B0602020104020203" pitchFamily="34" charset="0"/>
               </a:rPr>
-              <a:t>« Adhérent </a:t>
-            </a:r>
-            <a:r>
-              <a:rPr lang="fr-FR" sz="900" i="1" dirty="0">
-                <a:solidFill>
-                  <a:schemeClr val="tx1"/>
-                </a:solidFill>
-                <a:latin typeface="Gill Sans Nova" panose="020B0602020104020203" pitchFamily="34" charset="0"/>
-              </a:rPr>
-              <a:t>»</a:t>
+              <a:t>(« Bourgeois de Saint-Denis en Ile-de-France »)</a:t>
             </a:r>
           </a:p>
         </p:txBody>
       </p:sp>
       <p:cxnSp>
         <p:nvCxnSpPr>
-          <p:cNvPr id="271" name="Connecteur droit avec flèche 1749">
-            <a:extLst>
-              <a:ext uri="{FF2B5EF4-FFF2-40B4-BE49-F238E27FC236}">
-                <a16:creationId xmlns:a16="http://schemas.microsoft.com/office/drawing/2014/main" id="{F1BDEE82-3662-4037-8801-34CCA0A54C4E}"/>
+          <p:cNvPr id="28" name="Connecteur : en arc 27">
+            <a:extLst>
+              <a:ext uri="{FF2B5EF4-FFF2-40B4-BE49-F238E27FC236}">
+                <a16:creationId xmlns:a16="http://schemas.microsoft.com/office/drawing/2014/main" id="{FD2E284F-FA93-4F49-AF10-05DCAF7BA321}"/>
               </a:ext>
             </a:extLst>
           </p:cNvPr>
           <p:cNvCxnSpPr>
             <a:cxnSpLocks/>
-            <a:stCxn id="1728" idx="2"/>
-            <a:endCxn id="7" idx="0"/>
+            <a:stCxn id="256" idx="3"/>
+            <a:endCxn id="266" idx="0"/>
           </p:cNvCxnSpPr>
           <p:nvPr/>
         </p:nvCxnSpPr>
         <p:spPr>
-          <a:xfrm rot="16200000" flipH="1">
-            <a:off x="26237939" y="21998701"/>
-            <a:ext cx="716013" cy="555445"/>
-          </a:xfrm>
-          <a:prstGeom prst="curvedConnector3">
-            <a:avLst>
-              <a:gd name="adj1" fmla="val 50000"/>
-            </a:avLst>
+          <a:xfrm>
+            <a:off x="30237515" y="22880980"/>
+            <a:ext cx="807755" cy="1107551"/>
+          </a:xfrm>
+          <a:prstGeom prst="curvedConnector2">
+            <a:avLst/>
           </a:prstGeom>
           <a:ln>
             <a:tailEnd type="triangle"/>
@@ -16544,10 +16273,10 @@
       </p:cxnSp>
       <p:sp>
         <p:nvSpPr>
-          <p:cNvPr id="15" name="ZoneTexte 14">
-            <a:extLst>
-              <a:ext uri="{FF2B5EF4-FFF2-40B4-BE49-F238E27FC236}">
-                <a16:creationId xmlns:a16="http://schemas.microsoft.com/office/drawing/2014/main" id="{C5B8EBF2-6D1B-4326-A6A2-A6346E9811B9}"/>
+          <p:cNvPr id="275" name="ZoneTexte 274">
+            <a:extLst>
+              <a:ext uri="{FF2B5EF4-FFF2-40B4-BE49-F238E27FC236}">
+                <a16:creationId xmlns:a16="http://schemas.microsoft.com/office/drawing/2014/main" id="{360D258C-5B47-4FF1-BA85-65FF8B322F49}"/>
               </a:ext>
             </a:extLst>
           </p:cNvPr>
@@ -16556,8 +16285,8 @@
         </p:nvSpPr>
         <p:spPr>
           <a:xfrm>
-            <a:off x="26157663" y="22157308"/>
-            <a:ext cx="1484002" cy="230832"/>
+            <a:off x="30532305" y="22746319"/>
+            <a:ext cx="1484002" cy="369332"/>
           </a:xfrm>
           <a:prstGeom prst="rect">
             <a:avLst/>
@@ -16575,11 +16304,116 @@
               <a:rPr lang="fr-FR" sz="900" i="1" dirty="0">
                 <a:latin typeface="Gill Sans Nova" panose="020B0602020104020203" pitchFamily="34" charset="0"/>
               </a:rPr>
-              <a:t>P2</a:t>
-            </a:r>
-          </a:p>
-        </p:txBody>
-      </p:sp>
+              <a:t>P107 has </a:t>
+            </a:r>
+            <a:r>
+              <a:rPr lang="fr-FR" sz="900" i="1" dirty="0" err="1">
+                <a:latin typeface="Gill Sans Nova" panose="020B0602020104020203" pitchFamily="34" charset="0"/>
+              </a:rPr>
+              <a:t>current</a:t>
+            </a:r>
+            <a:r>
+              <a:rPr lang="fr-FR" sz="900" i="1" dirty="0">
+                <a:latin typeface="Gill Sans Nova" panose="020B0602020104020203" pitchFamily="34" charset="0"/>
+              </a:rPr>
+              <a:t> or former </a:t>
+            </a:r>
+            <a:r>
+              <a:rPr lang="fr-FR" sz="900" i="1" dirty="0" err="1">
+                <a:latin typeface="Gill Sans Nova" panose="020B0602020104020203" pitchFamily="34" charset="0"/>
+              </a:rPr>
+              <a:t>member</a:t>
+            </a:r>
+            <a:endParaRPr lang="fr-FR" sz="900" i="1" dirty="0">
+              <a:latin typeface="Gill Sans Nova" panose="020B0602020104020203" pitchFamily="34" charset="0"/>
+            </a:endParaRPr>
+          </a:p>
+        </p:txBody>
+      </p:sp>
+      <p:cxnSp>
+        <p:nvCxnSpPr>
+          <p:cNvPr id="59" name="Connecteur : en arc 58">
+            <a:extLst>
+              <a:ext uri="{FF2B5EF4-FFF2-40B4-BE49-F238E27FC236}">
+                <a16:creationId xmlns:a16="http://schemas.microsoft.com/office/drawing/2014/main" id="{70C10507-CEC1-4DDA-B9C7-10E2E294D05E}"/>
+              </a:ext>
+            </a:extLst>
+          </p:cNvPr>
+          <p:cNvCxnSpPr>
+            <a:stCxn id="1728" idx="3"/>
+            <a:endCxn id="1203" idx="1"/>
+          </p:cNvCxnSpPr>
+          <p:nvPr/>
+        </p:nvCxnSpPr>
+        <p:spPr>
+          <a:xfrm flipV="1">
+            <a:off x="26782732" y="20972652"/>
+            <a:ext cx="3561884" cy="743171"/>
+          </a:xfrm>
+          <a:prstGeom prst="curvedConnector3">
+            <a:avLst/>
+          </a:prstGeom>
+          <a:ln>
+            <a:tailEnd type="triangle"/>
+          </a:ln>
+        </p:spPr>
+        <p:style>
+          <a:lnRef idx="1">
+            <a:schemeClr val="dk1"/>
+          </a:lnRef>
+          <a:fillRef idx="0">
+            <a:schemeClr val="dk1"/>
+          </a:fillRef>
+          <a:effectRef idx="0">
+            <a:schemeClr val="dk1"/>
+          </a:effectRef>
+          <a:fontRef idx="minor">
+            <a:schemeClr val="tx1"/>
+          </a:fontRef>
+        </p:style>
+      </p:cxnSp>
+      <p:cxnSp>
+        <p:nvCxnSpPr>
+          <p:cNvPr id="195" name="Connecteur droit avec flèche 194">
+            <a:extLst>
+              <a:ext uri="{FF2B5EF4-FFF2-40B4-BE49-F238E27FC236}">
+                <a16:creationId xmlns:a16="http://schemas.microsoft.com/office/drawing/2014/main" id="{0719A202-FA65-4F14-817A-458EE6176A47}"/>
+              </a:ext>
+            </a:extLst>
+          </p:cNvPr>
+          <p:cNvCxnSpPr>
+            <a:stCxn id="1726" idx="3"/>
+            <a:endCxn id="1203" idx="1"/>
+          </p:cNvCxnSpPr>
+          <p:nvPr/>
+        </p:nvCxnSpPr>
+        <p:spPr>
+          <a:xfrm flipV="1">
+            <a:off x="26774101" y="20972652"/>
+            <a:ext cx="3570515" cy="72362"/>
+          </a:xfrm>
+          <a:prstGeom prst="straightConnector1">
+            <a:avLst/>
+          </a:prstGeom>
+          <a:ln>
+            <a:tailEnd type="triangle"/>
+          </a:ln>
+        </p:spPr>
+        <p:style>
+          <a:lnRef idx="1">
+            <a:schemeClr val="dk1"/>
+          </a:lnRef>
+          <a:fillRef idx="0">
+            <a:schemeClr val="dk1"/>
+          </a:fillRef>
+          <a:effectRef idx="0">
+            <a:schemeClr val="dk1"/>
+          </a:effectRef>
+          <a:fontRef idx="minor">
+            <a:schemeClr val="tx1"/>
+          </a:fontRef>
+        </p:style>
+      </p:cxnSp>
     </p:spTree>
     <p:extLst>
       <p:ext uri="{BB962C8B-B14F-4D97-AF65-F5344CB8AC3E}">

</xml_diff>

<commit_message>
Update modelisation mercure galant
</commit_message>
<xml_diff>
--- a/modélisation/mercure-galant-thésaurus-ancien-régime/Modélisation.pptx
+++ b/modélisation/mercure-galant-thésaurus-ancien-régime/Modélisation.pptx
@@ -243,7 +243,7 @@
           <a:p>
             <a:fld id="{F96D367F-7370-4214-86FB-91D90BAC4FAD}" type="datetimeFigureOut">
               <a:rPr lang="fr-FR" smtClean="0"/>
-              <a:t>22/01/2021</a:t>
+              <a:t>27/01/2021</a:t>
             </a:fld>
             <a:endParaRPr lang="fr-FR"/>
           </a:p>
@@ -413,7 +413,7 @@
           <a:p>
             <a:fld id="{F96D367F-7370-4214-86FB-91D90BAC4FAD}" type="datetimeFigureOut">
               <a:rPr lang="fr-FR" smtClean="0"/>
-              <a:t>22/01/2021</a:t>
+              <a:t>27/01/2021</a:t>
             </a:fld>
             <a:endParaRPr lang="fr-FR"/>
           </a:p>
@@ -593,7 +593,7 @@
           <a:p>
             <a:fld id="{F96D367F-7370-4214-86FB-91D90BAC4FAD}" type="datetimeFigureOut">
               <a:rPr lang="fr-FR" smtClean="0"/>
-              <a:t>22/01/2021</a:t>
+              <a:t>27/01/2021</a:t>
             </a:fld>
             <a:endParaRPr lang="fr-FR"/>
           </a:p>
@@ -763,7 +763,7 @@
           <a:p>
             <a:fld id="{F96D367F-7370-4214-86FB-91D90BAC4FAD}" type="datetimeFigureOut">
               <a:rPr lang="fr-FR" smtClean="0"/>
-              <a:t>22/01/2021</a:t>
+              <a:t>27/01/2021</a:t>
             </a:fld>
             <a:endParaRPr lang="fr-FR"/>
           </a:p>
@@ -1007,7 +1007,7 @@
           <a:p>
             <a:fld id="{F96D367F-7370-4214-86FB-91D90BAC4FAD}" type="datetimeFigureOut">
               <a:rPr lang="fr-FR" smtClean="0"/>
-              <a:t>22/01/2021</a:t>
+              <a:t>27/01/2021</a:t>
             </a:fld>
             <a:endParaRPr lang="fr-FR"/>
           </a:p>
@@ -1239,7 +1239,7 @@
           <a:p>
             <a:fld id="{F96D367F-7370-4214-86FB-91D90BAC4FAD}" type="datetimeFigureOut">
               <a:rPr lang="fr-FR" smtClean="0"/>
-              <a:t>22/01/2021</a:t>
+              <a:t>27/01/2021</a:t>
             </a:fld>
             <a:endParaRPr lang="fr-FR"/>
           </a:p>
@@ -1606,7 +1606,7 @@
           <a:p>
             <a:fld id="{F96D367F-7370-4214-86FB-91D90BAC4FAD}" type="datetimeFigureOut">
               <a:rPr lang="fr-FR" smtClean="0"/>
-              <a:t>22/01/2021</a:t>
+              <a:t>27/01/2021</a:t>
             </a:fld>
             <a:endParaRPr lang="fr-FR"/>
           </a:p>
@@ -1724,7 +1724,7 @@
           <a:p>
             <a:fld id="{F96D367F-7370-4214-86FB-91D90BAC4FAD}" type="datetimeFigureOut">
               <a:rPr lang="fr-FR" smtClean="0"/>
-              <a:t>22/01/2021</a:t>
+              <a:t>27/01/2021</a:t>
             </a:fld>
             <a:endParaRPr lang="fr-FR"/>
           </a:p>
@@ -1819,7 +1819,7 @@
           <a:p>
             <a:fld id="{F96D367F-7370-4214-86FB-91D90BAC4FAD}" type="datetimeFigureOut">
               <a:rPr lang="fr-FR" smtClean="0"/>
-              <a:t>22/01/2021</a:t>
+              <a:t>27/01/2021</a:t>
             </a:fld>
             <a:endParaRPr lang="fr-FR"/>
           </a:p>
@@ -2096,7 +2096,7 @@
           <a:p>
             <a:fld id="{F96D367F-7370-4214-86FB-91D90BAC4FAD}" type="datetimeFigureOut">
               <a:rPr lang="fr-FR" smtClean="0"/>
-              <a:t>22/01/2021</a:t>
+              <a:t>27/01/2021</a:t>
             </a:fld>
             <a:endParaRPr lang="fr-FR"/>
           </a:p>
@@ -2353,7 +2353,7 @@
           <a:p>
             <a:fld id="{F96D367F-7370-4214-86FB-91D90BAC4FAD}" type="datetimeFigureOut">
               <a:rPr lang="fr-FR" smtClean="0"/>
-              <a:t>22/01/2021</a:t>
+              <a:t>27/01/2021</a:t>
             </a:fld>
             <a:endParaRPr lang="fr-FR"/>
           </a:p>
@@ -2566,7 +2566,7 @@
           <a:p>
             <a:fld id="{F96D367F-7370-4214-86FB-91D90BAC4FAD}" type="datetimeFigureOut">
               <a:rPr lang="fr-FR" smtClean="0"/>
-              <a:t>22/01/2021</a:t>
+              <a:t>27/01/2021</a:t>
             </a:fld>
             <a:endParaRPr lang="fr-FR"/>
           </a:p>
@@ -8459,7 +8459,7 @@
         </p:nvSpPr>
         <p:spPr>
           <a:xfrm>
-            <a:off x="19176873" y="23858474"/>
+            <a:off x="19150338" y="24411766"/>
             <a:ext cx="1484002" cy="230832"/>
           </a:xfrm>
           <a:prstGeom prst="rect">
@@ -16130,6 +16130,581 @@
               </a:rPr>
               <a:t> by</a:t>
             </a:r>
+          </a:p>
+        </p:txBody>
+      </p:sp>
+      <p:sp>
+        <p:nvSpPr>
+          <p:cNvPr id="247" name="Rectangle : coins arrondis 246">
+            <a:extLst>
+              <a:ext uri="{FF2B5EF4-FFF2-40B4-BE49-F238E27FC236}">
+                <a16:creationId xmlns:a16="http://schemas.microsoft.com/office/drawing/2014/main" id="{8FD31BDF-F5E3-4EED-A1A0-A4F7FBCE2038}"/>
+              </a:ext>
+            </a:extLst>
+          </p:cNvPr>
+          <p:cNvSpPr/>
+          <p:nvPr/>
+        </p:nvSpPr>
+        <p:spPr>
+          <a:xfrm>
+            <a:off x="37586462" y="21468221"/>
+            <a:ext cx="1062749" cy="575143"/>
+          </a:xfrm>
+          <a:prstGeom prst="roundRect">
+            <a:avLst/>
+          </a:prstGeom>
+          <a:solidFill>
+            <a:srgbClr val="A5E9E1"/>
+          </a:solidFill>
+          <a:ln w="28575">
+            <a:solidFill>
+              <a:srgbClr val="5ED8C9"/>
+            </a:solidFill>
+          </a:ln>
+        </p:spPr>
+        <p:style>
+          <a:lnRef idx="2">
+            <a:schemeClr val="accent6"/>
+          </a:lnRef>
+          <a:fillRef idx="1">
+            <a:schemeClr val="lt1"/>
+          </a:fillRef>
+          <a:effectRef idx="0">
+            <a:schemeClr val="accent6"/>
+          </a:effectRef>
+          <a:fontRef idx="minor">
+            <a:schemeClr val="dk1"/>
+          </a:fontRef>
+        </p:style>
+        <p:txBody>
+          <a:bodyPr rtlCol="0" anchor="ctr"/>
+          <a:lstStyle/>
+          <a:p>
+            <a:pPr algn="ctr"/>
+            <a:r>
+              <a:rPr lang="fr-FR" sz="900" dirty="0">
+                <a:solidFill>
+                  <a:schemeClr val="tx1"/>
+                </a:solidFill>
+                <a:latin typeface="Gill Sans Nova" panose="020B0602020104020203" pitchFamily="34" charset="0"/>
+              </a:rPr>
+              <a:t>E66 Formation</a:t>
+            </a:r>
+          </a:p>
+        </p:txBody>
+      </p:sp>
+      <p:sp>
+        <p:nvSpPr>
+          <p:cNvPr id="250" name="ZoneTexte 249">
+            <a:extLst>
+              <a:ext uri="{FF2B5EF4-FFF2-40B4-BE49-F238E27FC236}">
+                <a16:creationId xmlns:a16="http://schemas.microsoft.com/office/drawing/2014/main" id="{C1440861-E564-4CCB-97CE-60377A4AC8B9}"/>
+              </a:ext>
+            </a:extLst>
+          </p:cNvPr>
+          <p:cNvSpPr txBox="1"/>
+          <p:nvPr/>
+        </p:nvSpPr>
+        <p:spPr>
+          <a:xfrm>
+            <a:off x="36027738" y="21571126"/>
+            <a:ext cx="1002663" cy="369332"/>
+          </a:xfrm>
+          <a:prstGeom prst="rect">
+            <a:avLst/>
+          </a:prstGeom>
+          <a:noFill/>
+        </p:spPr>
+        <p:txBody>
+          <a:bodyPr wrap="square" rtlCol="0">
+            <a:spAutoFit/>
+          </a:bodyPr>
+          <a:lstStyle/>
+          <a:p>
+            <a:pPr algn="ctr"/>
+            <a:r>
+              <a:rPr lang="fr-FR" sz="900" i="1" dirty="0">
+                <a:latin typeface="Gill Sans Nova" panose="020B0602020104020203" pitchFamily="34" charset="0"/>
+              </a:rPr>
+              <a:t>P151 </a:t>
+            </a:r>
+            <a:r>
+              <a:rPr lang="fr-FR" sz="900" i="1" dirty="0" err="1">
+                <a:latin typeface="Gill Sans Nova" panose="020B0602020104020203" pitchFamily="34" charset="0"/>
+              </a:rPr>
+              <a:t>was</a:t>
+            </a:r>
+            <a:r>
+              <a:rPr lang="fr-FR" sz="900" i="1" dirty="0">
+                <a:latin typeface="Gill Sans Nova" panose="020B0602020104020203" pitchFamily="34" charset="0"/>
+              </a:rPr>
+              <a:t> </a:t>
+            </a:r>
+            <a:r>
+              <a:rPr lang="fr-FR" sz="900" i="1" dirty="0" err="1">
+                <a:latin typeface="Gill Sans Nova" panose="020B0602020104020203" pitchFamily="34" charset="0"/>
+              </a:rPr>
+              <a:t>formed</a:t>
+            </a:r>
+            <a:r>
+              <a:rPr lang="fr-FR" sz="900" i="1" dirty="0">
+                <a:latin typeface="Gill Sans Nova" panose="020B0602020104020203" pitchFamily="34" charset="0"/>
+              </a:rPr>
+              <a:t> </a:t>
+            </a:r>
+            <a:r>
+              <a:rPr lang="fr-FR" sz="900" i="1" dirty="0" err="1">
+                <a:latin typeface="Gill Sans Nova" panose="020B0602020104020203" pitchFamily="34" charset="0"/>
+              </a:rPr>
+              <a:t>from</a:t>
+            </a:r>
+            <a:endParaRPr lang="fr-FR" sz="900" i="1" dirty="0">
+              <a:latin typeface="Gill Sans Nova" panose="020B0602020104020203" pitchFamily="34" charset="0"/>
+            </a:endParaRPr>
+          </a:p>
+        </p:txBody>
+      </p:sp>
+      <p:cxnSp>
+        <p:nvCxnSpPr>
+          <p:cNvPr id="20" name="Connecteur : en arc 19">
+            <a:extLst>
+              <a:ext uri="{FF2B5EF4-FFF2-40B4-BE49-F238E27FC236}">
+                <a16:creationId xmlns:a16="http://schemas.microsoft.com/office/drawing/2014/main" id="{479237A6-6C4E-4958-A794-6D03C4C414C9}"/>
+              </a:ext>
+            </a:extLst>
+          </p:cNvPr>
+          <p:cNvCxnSpPr>
+            <a:stCxn id="1203" idx="3"/>
+            <a:endCxn id="247" idx="1"/>
+          </p:cNvCxnSpPr>
+          <p:nvPr/>
+        </p:nvCxnSpPr>
+        <p:spPr>
+          <a:xfrm flipV="1">
+            <a:off x="35758896" y="21755793"/>
+            <a:ext cx="1827566" cy="648751"/>
+          </a:xfrm>
+          <a:prstGeom prst="curvedConnector3">
+            <a:avLst/>
+          </a:prstGeom>
+          <a:ln>
+            <a:tailEnd type="triangle"/>
+          </a:ln>
+        </p:spPr>
+        <p:style>
+          <a:lnRef idx="1">
+            <a:schemeClr val="dk1"/>
+          </a:lnRef>
+          <a:fillRef idx="0">
+            <a:schemeClr val="dk1"/>
+          </a:fillRef>
+          <a:effectRef idx="0">
+            <a:schemeClr val="dk1"/>
+          </a:effectRef>
+          <a:fontRef idx="minor">
+            <a:schemeClr val="tx1"/>
+          </a:fontRef>
+        </p:style>
+      </p:cxnSp>
+      <p:sp>
+        <p:nvSpPr>
+          <p:cNvPr id="257" name="Rectangle : coins arrondis 256">
+            <a:extLst>
+              <a:ext uri="{FF2B5EF4-FFF2-40B4-BE49-F238E27FC236}">
+                <a16:creationId xmlns:a16="http://schemas.microsoft.com/office/drawing/2014/main" id="{7C67B9CE-0BD7-45F9-B5DD-740F03FA40BD}"/>
+              </a:ext>
+            </a:extLst>
+          </p:cNvPr>
+          <p:cNvSpPr/>
+          <p:nvPr/>
+        </p:nvSpPr>
+        <p:spPr>
+          <a:xfrm>
+            <a:off x="37586462" y="22599222"/>
+            <a:ext cx="1062749" cy="575143"/>
+          </a:xfrm>
+          <a:prstGeom prst="roundRect">
+            <a:avLst/>
+          </a:prstGeom>
+          <a:solidFill>
+            <a:srgbClr val="37CDBB"/>
+          </a:solidFill>
+          <a:ln w="28575">
+            <a:solidFill>
+              <a:srgbClr val="2AAC9D"/>
+            </a:solidFill>
+          </a:ln>
+        </p:spPr>
+        <p:style>
+          <a:lnRef idx="2">
+            <a:schemeClr val="accent6"/>
+          </a:lnRef>
+          <a:fillRef idx="1">
+            <a:schemeClr val="lt1"/>
+          </a:fillRef>
+          <a:effectRef idx="0">
+            <a:schemeClr val="accent6"/>
+          </a:effectRef>
+          <a:fontRef idx="minor">
+            <a:schemeClr val="dk1"/>
+          </a:fontRef>
+        </p:style>
+        <p:txBody>
+          <a:bodyPr rtlCol="0" anchor="ctr"/>
+          <a:lstStyle/>
+          <a:p>
+            <a:pPr algn="ctr"/>
+            <a:r>
+              <a:rPr lang="fr-FR" sz="900" dirty="0">
+                <a:solidFill>
+                  <a:schemeClr val="bg1"/>
+                </a:solidFill>
+                <a:latin typeface="Gill Sans Nova" panose="020B0602020104020203" pitchFamily="34" charset="0"/>
+              </a:rPr>
+              <a:t>E68 Dissolution</a:t>
+            </a:r>
+          </a:p>
+        </p:txBody>
+      </p:sp>
+      <p:cxnSp>
+        <p:nvCxnSpPr>
+          <p:cNvPr id="23" name="Connecteur : en arc 22">
+            <a:extLst>
+              <a:ext uri="{FF2B5EF4-FFF2-40B4-BE49-F238E27FC236}">
+                <a16:creationId xmlns:a16="http://schemas.microsoft.com/office/drawing/2014/main" id="{9A437E44-B224-43A2-A941-BDF85F70E746}"/>
+              </a:ext>
+            </a:extLst>
+          </p:cNvPr>
+          <p:cNvCxnSpPr>
+            <a:cxnSpLocks/>
+            <a:stCxn id="257" idx="1"/>
+            <a:endCxn id="1203" idx="3"/>
+          </p:cNvCxnSpPr>
+          <p:nvPr/>
+        </p:nvCxnSpPr>
+        <p:spPr>
+          <a:xfrm rot="10800000">
+            <a:off x="35758896" y="22404544"/>
+            <a:ext cx="1827566" cy="482250"/>
+          </a:xfrm>
+          <a:prstGeom prst="curvedConnector3">
+            <a:avLst>
+              <a:gd name="adj1" fmla="val 50000"/>
+            </a:avLst>
+          </a:prstGeom>
+          <a:ln>
+            <a:tailEnd type="triangle"/>
+          </a:ln>
+        </p:spPr>
+        <p:style>
+          <a:lnRef idx="1">
+            <a:schemeClr val="dk1"/>
+          </a:lnRef>
+          <a:fillRef idx="0">
+            <a:schemeClr val="dk1"/>
+          </a:fillRef>
+          <a:effectRef idx="0">
+            <a:schemeClr val="dk1"/>
+          </a:effectRef>
+          <a:fontRef idx="minor">
+            <a:schemeClr val="tx1"/>
+          </a:fontRef>
+        </p:style>
+      </p:cxnSp>
+      <p:sp>
+        <p:nvSpPr>
+          <p:cNvPr id="262" name="ZoneTexte 261">
+            <a:extLst>
+              <a:ext uri="{FF2B5EF4-FFF2-40B4-BE49-F238E27FC236}">
+                <a16:creationId xmlns:a16="http://schemas.microsoft.com/office/drawing/2014/main" id="{D693F609-B1A5-4A21-85E1-ECBA60C0DF23}"/>
+              </a:ext>
+            </a:extLst>
+          </p:cNvPr>
+          <p:cNvSpPr txBox="1"/>
+          <p:nvPr/>
+        </p:nvSpPr>
+        <p:spPr>
+          <a:xfrm>
+            <a:off x="36091130" y="22849589"/>
+            <a:ext cx="1002663" cy="230832"/>
+          </a:xfrm>
+          <a:prstGeom prst="rect">
+            <a:avLst/>
+          </a:prstGeom>
+          <a:noFill/>
+        </p:spPr>
+        <p:txBody>
+          <a:bodyPr wrap="square" rtlCol="0">
+            <a:spAutoFit/>
+          </a:bodyPr>
+          <a:lstStyle/>
+          <a:p>
+            <a:pPr algn="ctr"/>
+            <a:r>
+              <a:rPr lang="fr-FR" sz="900" i="1" dirty="0">
+                <a:latin typeface="Gill Sans Nova" panose="020B0602020104020203" pitchFamily="34" charset="0"/>
+              </a:rPr>
+              <a:t>P99 </a:t>
+            </a:r>
+            <a:r>
+              <a:rPr lang="fr-FR" sz="900" i="1" dirty="0" err="1">
+                <a:latin typeface="Gill Sans Nova" panose="020B0602020104020203" pitchFamily="34" charset="0"/>
+              </a:rPr>
+              <a:t>dissolved</a:t>
+            </a:r>
+            <a:endParaRPr lang="fr-FR" sz="900" i="1" dirty="0">
+              <a:latin typeface="Gill Sans Nova" panose="020B0602020104020203" pitchFamily="34" charset="0"/>
+            </a:endParaRPr>
+          </a:p>
+        </p:txBody>
+      </p:sp>
+      <p:cxnSp>
+        <p:nvCxnSpPr>
+          <p:cNvPr id="31" name="Connecteur : en arc 30">
+            <a:extLst>
+              <a:ext uri="{FF2B5EF4-FFF2-40B4-BE49-F238E27FC236}">
+                <a16:creationId xmlns:a16="http://schemas.microsoft.com/office/drawing/2014/main" id="{B1720472-2DBE-468A-AE6F-C9C7ABCE09DF}"/>
+              </a:ext>
+            </a:extLst>
+          </p:cNvPr>
+          <p:cNvCxnSpPr>
+            <a:stCxn id="1610" idx="3"/>
+            <a:endCxn id="1203" idx="0"/>
+          </p:cNvCxnSpPr>
+          <p:nvPr/>
+        </p:nvCxnSpPr>
+        <p:spPr>
+          <a:xfrm>
+            <a:off x="25731206" y="19873961"/>
+            <a:ext cx="9371728" cy="2102342"/>
+          </a:xfrm>
+          <a:prstGeom prst="curvedConnector2">
+            <a:avLst/>
+          </a:prstGeom>
+          <a:ln>
+            <a:tailEnd type="triangle"/>
+          </a:ln>
+        </p:spPr>
+        <p:style>
+          <a:lnRef idx="1">
+            <a:schemeClr val="dk1"/>
+          </a:lnRef>
+          <a:fillRef idx="0">
+            <a:schemeClr val="dk1"/>
+          </a:fillRef>
+          <a:effectRef idx="0">
+            <a:schemeClr val="dk1"/>
+          </a:effectRef>
+          <a:fontRef idx="minor">
+            <a:schemeClr val="tx1"/>
+          </a:fontRef>
+        </p:style>
+      </p:cxnSp>
+      <p:sp>
+        <p:nvSpPr>
+          <p:cNvPr id="32" name="Ellipse 31">
+            <a:extLst>
+              <a:ext uri="{FF2B5EF4-FFF2-40B4-BE49-F238E27FC236}">
+                <a16:creationId xmlns:a16="http://schemas.microsoft.com/office/drawing/2014/main" id="{15A57189-6AE0-4557-9DA0-C68F4828C861}"/>
+              </a:ext>
+            </a:extLst>
+          </p:cNvPr>
+          <p:cNvSpPr/>
+          <p:nvPr/>
+        </p:nvSpPr>
+        <p:spPr>
+          <a:xfrm>
+            <a:off x="29957123" y="20349103"/>
+            <a:ext cx="1187339" cy="289717"/>
+          </a:xfrm>
+          <a:prstGeom prst="ellipse">
+            <a:avLst/>
+          </a:prstGeom>
+          <a:noFill/>
+          <a:ln w="3175">
+            <a:solidFill>
+              <a:schemeClr val="tx1"/>
+            </a:solidFill>
+          </a:ln>
+        </p:spPr>
+        <p:style>
+          <a:lnRef idx="2">
+            <a:schemeClr val="accent1">
+              <a:shade val="50000"/>
+            </a:schemeClr>
+          </a:lnRef>
+          <a:fillRef idx="1">
+            <a:schemeClr val="accent1"/>
+          </a:fillRef>
+          <a:effectRef idx="0">
+            <a:schemeClr val="accent1"/>
+          </a:effectRef>
+          <a:fontRef idx="minor">
+            <a:schemeClr val="lt1"/>
+          </a:fontRef>
+        </p:style>
+        <p:txBody>
+          <a:bodyPr rtlCol="0" anchor="ctr"/>
+          <a:lstStyle/>
+          <a:p>
+            <a:pPr algn="ctr"/>
+            <a:r>
+              <a:rPr lang="fr-FR" sz="1050" i="1" dirty="0" err="1">
+                <a:solidFill>
+                  <a:schemeClr val="tx1"/>
+                </a:solidFill>
+                <a:latin typeface="Gill Sans Nova" panose="020B0602020104020203" pitchFamily="34" charset="0"/>
+              </a:rPr>
+              <a:t>sheP</a:t>
+            </a:r>
+            <a:r>
+              <a:rPr lang="fr-FR" sz="900" i="1" dirty="0">
+                <a:solidFill>
+                  <a:schemeClr val="tx1"/>
+                </a:solidFill>
+                <a:latin typeface="Gill Sans Nova" panose="020B0602020104020203" pitchFamily="34" charset="0"/>
+              </a:rPr>
+              <a:t> </a:t>
+            </a:r>
+            <a:r>
+              <a:rPr lang="fr-FR" sz="1050" i="1" dirty="0">
+                <a:solidFill>
+                  <a:schemeClr val="tx1"/>
+                </a:solidFill>
+                <a:latin typeface="Gill Sans Nova" panose="020B0602020104020203" pitchFamily="34" charset="0"/>
+              </a:rPr>
+              <a:t>associe</a:t>
+            </a:r>
+            <a:endParaRPr lang="fr-FR" sz="1050" dirty="0">
+              <a:solidFill>
+                <a:schemeClr val="tx1"/>
+              </a:solidFill>
+            </a:endParaRPr>
+          </a:p>
+        </p:txBody>
+      </p:sp>
+      <p:sp>
+        <p:nvSpPr>
+          <p:cNvPr id="33" name="Rectangle : coins arrondis 32">
+            <a:extLst>
+              <a:ext uri="{FF2B5EF4-FFF2-40B4-BE49-F238E27FC236}">
+                <a16:creationId xmlns:a16="http://schemas.microsoft.com/office/drawing/2014/main" id="{23E3FA34-3944-4780-AF7B-E220849355D9}"/>
+              </a:ext>
+            </a:extLst>
+          </p:cNvPr>
+          <p:cNvSpPr/>
+          <p:nvPr/>
+        </p:nvSpPr>
+        <p:spPr>
+          <a:xfrm>
+            <a:off x="38600232" y="32867600"/>
+            <a:ext cx="4122568" cy="2514600"/>
+          </a:xfrm>
+          <a:prstGeom prst="roundRect">
+            <a:avLst/>
+          </a:prstGeom>
+          <a:solidFill>
+            <a:schemeClr val="bg1"/>
+          </a:solidFill>
+          <a:ln>
+            <a:noFill/>
+          </a:ln>
+        </p:spPr>
+        <p:style>
+          <a:lnRef idx="2">
+            <a:schemeClr val="accent1">
+              <a:shade val="50000"/>
+            </a:schemeClr>
+          </a:lnRef>
+          <a:fillRef idx="1">
+            <a:schemeClr val="accent1"/>
+          </a:fillRef>
+          <a:effectRef idx="0">
+            <a:schemeClr val="accent1"/>
+          </a:effectRef>
+          <a:fontRef idx="minor">
+            <a:schemeClr val="lt1"/>
+          </a:fontRef>
+        </p:style>
+        <p:txBody>
+          <a:bodyPr rtlCol="0" anchor="t"/>
+          <a:lstStyle/>
+          <a:p>
+            <a:pPr>
+              <a:lnSpc>
+                <a:spcPct val="150000"/>
+              </a:lnSpc>
+            </a:pPr>
+            <a:r>
+              <a:rPr lang="fr-FR" dirty="0"/>
+              <a:t>     		</a:t>
+            </a:r>
+            <a:r>
+              <a:rPr lang="fr-FR" sz="1200" dirty="0">
+                <a:solidFill>
+                  <a:schemeClr val="tx1"/>
+                </a:solidFill>
+                <a:latin typeface="Gill Sans Nova" panose="020B0602020104020203" pitchFamily="34" charset="0"/>
+              </a:rPr>
+              <a:t>Propriété SHERLOCK</a:t>
+            </a:r>
+            <a:endParaRPr lang="fr-FR" dirty="0">
+              <a:latin typeface="Gill Sans Nova" panose="020B0602020104020203" pitchFamily="34" charset="0"/>
+            </a:endParaRPr>
+          </a:p>
+        </p:txBody>
+      </p:sp>
+      <p:sp>
+        <p:nvSpPr>
+          <p:cNvPr id="34" name="Ellipse 33">
+            <a:extLst>
+              <a:ext uri="{FF2B5EF4-FFF2-40B4-BE49-F238E27FC236}">
+                <a16:creationId xmlns:a16="http://schemas.microsoft.com/office/drawing/2014/main" id="{81CDD935-6267-4225-83BC-DF31C9A776AD}"/>
+              </a:ext>
+            </a:extLst>
+          </p:cNvPr>
+          <p:cNvSpPr/>
+          <p:nvPr/>
+        </p:nvSpPr>
+        <p:spPr>
+          <a:xfrm>
+            <a:off x="38881050" y="33185100"/>
+            <a:ext cx="742950" cy="247650"/>
+          </a:xfrm>
+          <a:prstGeom prst="ellipse">
+            <a:avLst/>
+          </a:prstGeom>
+          <a:solidFill>
+            <a:schemeClr val="bg1"/>
+          </a:solidFill>
+          <a:ln>
+            <a:solidFill>
+              <a:schemeClr val="tx1"/>
+            </a:solidFill>
+          </a:ln>
+        </p:spPr>
+        <p:style>
+          <a:lnRef idx="2">
+            <a:schemeClr val="accent1">
+              <a:shade val="50000"/>
+            </a:schemeClr>
+          </a:lnRef>
+          <a:fillRef idx="1">
+            <a:schemeClr val="accent1"/>
+          </a:fillRef>
+          <a:effectRef idx="0">
+            <a:schemeClr val="accent1"/>
+          </a:effectRef>
+          <a:fontRef idx="minor">
+            <a:schemeClr val="lt1"/>
+          </a:fontRef>
+        </p:style>
+        <p:txBody>
+          <a:bodyPr rtlCol="0" anchor="ctr"/>
+          <a:lstStyle/>
+          <a:p>
+            <a:pPr algn="ctr"/>
+            <a:endParaRPr lang="fr-FR"/>
           </a:p>
         </p:txBody>
       </p:sp>

</xml_diff>

<commit_message>
creation lieux-exemple.py et update modelisation mg
</commit_message>
<xml_diff>
--- a/modélisation/mercure-galant-thésaurus-ancien-régime/Modélisation.pptx
+++ b/modélisation/mercure-galant-thésaurus-ancien-régime/Modélisation.pptx
@@ -243,7 +243,7 @@
           <a:p>
             <a:fld id="{F96D367F-7370-4214-86FB-91D90BAC4FAD}" type="datetimeFigureOut">
               <a:rPr lang="fr-FR" smtClean="0"/>
-              <a:t>27/01/2021</a:t>
+              <a:t>01/02/2021</a:t>
             </a:fld>
             <a:endParaRPr lang="fr-FR"/>
           </a:p>
@@ -413,7 +413,7 @@
           <a:p>
             <a:fld id="{F96D367F-7370-4214-86FB-91D90BAC4FAD}" type="datetimeFigureOut">
               <a:rPr lang="fr-FR" smtClean="0"/>
-              <a:t>27/01/2021</a:t>
+              <a:t>01/02/2021</a:t>
             </a:fld>
             <a:endParaRPr lang="fr-FR"/>
           </a:p>
@@ -593,7 +593,7 @@
           <a:p>
             <a:fld id="{F96D367F-7370-4214-86FB-91D90BAC4FAD}" type="datetimeFigureOut">
               <a:rPr lang="fr-FR" smtClean="0"/>
-              <a:t>27/01/2021</a:t>
+              <a:t>01/02/2021</a:t>
             </a:fld>
             <a:endParaRPr lang="fr-FR"/>
           </a:p>
@@ -763,7 +763,7 @@
           <a:p>
             <a:fld id="{F96D367F-7370-4214-86FB-91D90BAC4FAD}" type="datetimeFigureOut">
               <a:rPr lang="fr-FR" smtClean="0"/>
-              <a:t>27/01/2021</a:t>
+              <a:t>01/02/2021</a:t>
             </a:fld>
             <a:endParaRPr lang="fr-FR"/>
           </a:p>
@@ -1007,7 +1007,7 @@
           <a:p>
             <a:fld id="{F96D367F-7370-4214-86FB-91D90BAC4FAD}" type="datetimeFigureOut">
               <a:rPr lang="fr-FR" smtClean="0"/>
-              <a:t>27/01/2021</a:t>
+              <a:t>01/02/2021</a:t>
             </a:fld>
             <a:endParaRPr lang="fr-FR"/>
           </a:p>
@@ -1239,7 +1239,7 @@
           <a:p>
             <a:fld id="{F96D367F-7370-4214-86FB-91D90BAC4FAD}" type="datetimeFigureOut">
               <a:rPr lang="fr-FR" smtClean="0"/>
-              <a:t>27/01/2021</a:t>
+              <a:t>01/02/2021</a:t>
             </a:fld>
             <a:endParaRPr lang="fr-FR"/>
           </a:p>
@@ -1606,7 +1606,7 @@
           <a:p>
             <a:fld id="{F96D367F-7370-4214-86FB-91D90BAC4FAD}" type="datetimeFigureOut">
               <a:rPr lang="fr-FR" smtClean="0"/>
-              <a:t>27/01/2021</a:t>
+              <a:t>01/02/2021</a:t>
             </a:fld>
             <a:endParaRPr lang="fr-FR"/>
           </a:p>
@@ -1724,7 +1724,7 @@
           <a:p>
             <a:fld id="{F96D367F-7370-4214-86FB-91D90BAC4FAD}" type="datetimeFigureOut">
               <a:rPr lang="fr-FR" smtClean="0"/>
-              <a:t>27/01/2021</a:t>
+              <a:t>01/02/2021</a:t>
             </a:fld>
             <a:endParaRPr lang="fr-FR"/>
           </a:p>
@@ -1819,7 +1819,7 @@
           <a:p>
             <a:fld id="{F96D367F-7370-4214-86FB-91D90BAC4FAD}" type="datetimeFigureOut">
               <a:rPr lang="fr-FR" smtClean="0"/>
-              <a:t>27/01/2021</a:t>
+              <a:t>01/02/2021</a:t>
             </a:fld>
             <a:endParaRPr lang="fr-FR"/>
           </a:p>
@@ -2096,7 +2096,7 @@
           <a:p>
             <a:fld id="{F96D367F-7370-4214-86FB-91D90BAC4FAD}" type="datetimeFigureOut">
               <a:rPr lang="fr-FR" smtClean="0"/>
-              <a:t>27/01/2021</a:t>
+              <a:t>01/02/2021</a:t>
             </a:fld>
             <a:endParaRPr lang="fr-FR"/>
           </a:p>
@@ -2353,7 +2353,7 @@
           <a:p>
             <a:fld id="{F96D367F-7370-4214-86FB-91D90BAC4FAD}" type="datetimeFigureOut">
               <a:rPr lang="fr-FR" smtClean="0"/>
-              <a:t>27/01/2021</a:t>
+              <a:t>01/02/2021</a:t>
             </a:fld>
             <a:endParaRPr lang="fr-FR"/>
           </a:p>
@@ -2566,7 +2566,7 @@
           <a:p>
             <a:fld id="{F96D367F-7370-4214-86FB-91D90BAC4FAD}" type="datetimeFigureOut">
               <a:rPr lang="fr-FR" smtClean="0"/>
-              <a:t>27/01/2021</a:t>
+              <a:t>01/02/2021</a:t>
             </a:fld>
             <a:endParaRPr lang="fr-FR"/>
           </a:p>
@@ -11846,11 +11846,14 @@
           <a:p>
             <a:pPr algn="ctr"/>
             <a:r>
-              <a:rPr lang="fr-FR" sz="900" i="1" dirty="0">
-                <a:latin typeface="Gill Sans Nova" panose="020B0602020104020203" pitchFamily="34" charset="0"/>
-              </a:rPr>
-              <a:t>P14.1</a:t>
-            </a:r>
+              <a:rPr lang="fr-FR" sz="900" i="1">
+                <a:latin typeface="Gill Sans Nova" panose="020B0602020104020203" pitchFamily="34" charset="0"/>
+              </a:rPr>
+              <a:t>P2</a:t>
+            </a:r>
+            <a:endParaRPr lang="fr-FR" sz="900" i="1" dirty="0">
+              <a:latin typeface="Gill Sans Nova" panose="020B0602020104020203" pitchFamily="34" charset="0"/>
+            </a:endParaRPr>
           </a:p>
         </p:txBody>
       </p:sp>

</xml_diff>

<commit_message>
Update modelisation et caches
</commit_message>
<xml_diff>
--- a/modélisation/mercure-galant-thésaurus-ancien-régime/Modélisation.pptx
+++ b/modélisation/mercure-galant-thésaurus-ancien-régime/Modélisation.pptx
@@ -243,7 +243,7 @@
           <a:p>
             <a:fld id="{F96D367F-7370-4214-86FB-91D90BAC4FAD}" type="datetimeFigureOut">
               <a:rPr lang="fr-FR" smtClean="0"/>
-              <a:t>01/02/2021</a:t>
+              <a:t>11/02/2021</a:t>
             </a:fld>
             <a:endParaRPr lang="fr-FR"/>
           </a:p>
@@ -413,7 +413,7 @@
           <a:p>
             <a:fld id="{F96D367F-7370-4214-86FB-91D90BAC4FAD}" type="datetimeFigureOut">
               <a:rPr lang="fr-FR" smtClean="0"/>
-              <a:t>01/02/2021</a:t>
+              <a:t>11/02/2021</a:t>
             </a:fld>
             <a:endParaRPr lang="fr-FR"/>
           </a:p>
@@ -593,7 +593,7 @@
           <a:p>
             <a:fld id="{F96D367F-7370-4214-86FB-91D90BAC4FAD}" type="datetimeFigureOut">
               <a:rPr lang="fr-FR" smtClean="0"/>
-              <a:t>01/02/2021</a:t>
+              <a:t>11/02/2021</a:t>
             </a:fld>
             <a:endParaRPr lang="fr-FR"/>
           </a:p>
@@ -763,7 +763,7 @@
           <a:p>
             <a:fld id="{F96D367F-7370-4214-86FB-91D90BAC4FAD}" type="datetimeFigureOut">
               <a:rPr lang="fr-FR" smtClean="0"/>
-              <a:t>01/02/2021</a:t>
+              <a:t>11/02/2021</a:t>
             </a:fld>
             <a:endParaRPr lang="fr-FR"/>
           </a:p>
@@ -1007,7 +1007,7 @@
           <a:p>
             <a:fld id="{F96D367F-7370-4214-86FB-91D90BAC4FAD}" type="datetimeFigureOut">
               <a:rPr lang="fr-FR" smtClean="0"/>
-              <a:t>01/02/2021</a:t>
+              <a:t>11/02/2021</a:t>
             </a:fld>
             <a:endParaRPr lang="fr-FR"/>
           </a:p>
@@ -1239,7 +1239,7 @@
           <a:p>
             <a:fld id="{F96D367F-7370-4214-86FB-91D90BAC4FAD}" type="datetimeFigureOut">
               <a:rPr lang="fr-FR" smtClean="0"/>
-              <a:t>01/02/2021</a:t>
+              <a:t>11/02/2021</a:t>
             </a:fld>
             <a:endParaRPr lang="fr-FR"/>
           </a:p>
@@ -1606,7 +1606,7 @@
           <a:p>
             <a:fld id="{F96D367F-7370-4214-86FB-91D90BAC4FAD}" type="datetimeFigureOut">
               <a:rPr lang="fr-FR" smtClean="0"/>
-              <a:t>01/02/2021</a:t>
+              <a:t>11/02/2021</a:t>
             </a:fld>
             <a:endParaRPr lang="fr-FR"/>
           </a:p>
@@ -1724,7 +1724,7 @@
           <a:p>
             <a:fld id="{F96D367F-7370-4214-86FB-91D90BAC4FAD}" type="datetimeFigureOut">
               <a:rPr lang="fr-FR" smtClean="0"/>
-              <a:t>01/02/2021</a:t>
+              <a:t>11/02/2021</a:t>
             </a:fld>
             <a:endParaRPr lang="fr-FR"/>
           </a:p>
@@ -1819,7 +1819,7 @@
           <a:p>
             <a:fld id="{F96D367F-7370-4214-86FB-91D90BAC4FAD}" type="datetimeFigureOut">
               <a:rPr lang="fr-FR" smtClean="0"/>
-              <a:t>01/02/2021</a:t>
+              <a:t>11/02/2021</a:t>
             </a:fld>
             <a:endParaRPr lang="fr-FR"/>
           </a:p>
@@ -2096,7 +2096,7 @@
           <a:p>
             <a:fld id="{F96D367F-7370-4214-86FB-91D90BAC4FAD}" type="datetimeFigureOut">
               <a:rPr lang="fr-FR" smtClean="0"/>
-              <a:t>01/02/2021</a:t>
+              <a:t>11/02/2021</a:t>
             </a:fld>
             <a:endParaRPr lang="fr-FR"/>
           </a:p>
@@ -2353,7 +2353,7 @@
           <a:p>
             <a:fld id="{F96D367F-7370-4214-86FB-91D90BAC4FAD}" type="datetimeFigureOut">
               <a:rPr lang="fr-FR" smtClean="0"/>
-              <a:t>01/02/2021</a:t>
+              <a:t>11/02/2021</a:t>
             </a:fld>
             <a:endParaRPr lang="fr-FR"/>
           </a:p>
@@ -2566,7 +2566,7 @@
           <a:p>
             <a:fld id="{F96D367F-7370-4214-86FB-91D90BAC4FAD}" type="datetimeFigureOut">
               <a:rPr lang="fr-FR" smtClean="0"/>
-              <a:t>01/02/2021</a:t>
+              <a:t>11/02/2021</a:t>
             </a:fld>
             <a:endParaRPr lang="fr-FR"/>
           </a:p>
@@ -14222,7 +14222,7 @@
         </p:nvSpPr>
         <p:spPr>
           <a:xfrm>
-            <a:off x="29727222" y="11630705"/>
+            <a:off x="29615213" y="11698075"/>
             <a:ext cx="1398361" cy="230832"/>
           </a:xfrm>
           <a:prstGeom prst="rect">
@@ -14241,7 +14241,7 @@
               <a:rPr lang="fr-FR" sz="900" i="1" dirty="0">
                 <a:latin typeface="Gill Sans Nova" panose="020B0602020104020203" pitchFamily="34" charset="0"/>
               </a:rPr>
-              <a:t>P2 has type</a:t>
+              <a:t>R15 has fragment</a:t>
             </a:r>
           </a:p>
         </p:txBody>
@@ -14301,8 +14301,8 @@
         </p:nvSpPr>
         <p:spPr>
           <a:xfrm>
-            <a:off x="31094451" y="11924697"/>
-            <a:ext cx="1139308" cy="678712"/>
+            <a:off x="31053202" y="13329620"/>
+            <a:ext cx="1153211" cy="758314"/>
           </a:xfrm>
           <a:prstGeom prst="roundRect">
             <a:avLst/>
@@ -14346,29 +14346,14 @@
           <a:p>
             <a:pPr algn="ctr"/>
             <a:r>
-              <a:rPr lang="fr-FR" sz="900" dirty="0">
+              <a:rPr lang="fr-FR" sz="900" i="1" dirty="0">
                 <a:solidFill>
                   <a:schemeClr val="tx1"/>
                 </a:solidFill>
                 <a:latin typeface="Gill Sans Nova" panose="020B0602020104020203" pitchFamily="34" charset="0"/>
               </a:rPr>
-              <a:t>« Article du </a:t>
-            </a:r>
-            <a:r>
-              <a:rPr lang="fr-FR" sz="900">
-                <a:solidFill>
-                  <a:schemeClr val="tx1"/>
-                </a:solidFill>
-                <a:latin typeface="Gill Sans Nova" panose="020B0602020104020203" pitchFamily="34" charset="0"/>
-              </a:rPr>
-              <a:t>Mercure Galant »</a:t>
-            </a:r>
-            <a:endParaRPr lang="fr-FR" sz="900" dirty="0">
-              <a:solidFill>
-                <a:schemeClr val="tx1"/>
-              </a:solidFill>
-              <a:latin typeface="Gill Sans Nova" panose="020B0602020104020203" pitchFamily="34" charset="0"/>
-            </a:endParaRPr>
+              <a:t>(«  http://www.iconclass.org/rkd/32/ »)</a:t>
+            </a:r>
           </a:p>
         </p:txBody>
       </p:sp>
@@ -16708,6 +16693,166 @@
           <a:p>
             <a:pPr algn="ctr"/>
             <a:endParaRPr lang="fr-FR"/>
+          </a:p>
+        </p:txBody>
+      </p:sp>
+      <p:sp>
+        <p:nvSpPr>
+          <p:cNvPr id="258" name="Rectangle : coins arrondis 257">
+            <a:extLst>
+              <a:ext uri="{FF2B5EF4-FFF2-40B4-BE49-F238E27FC236}">
+                <a16:creationId xmlns:a16="http://schemas.microsoft.com/office/drawing/2014/main" id="{EA50A966-EAEF-4AA2-893B-418A325ADA27}"/>
+              </a:ext>
+            </a:extLst>
+          </p:cNvPr>
+          <p:cNvSpPr/>
+          <p:nvPr/>
+        </p:nvSpPr>
+        <p:spPr>
+          <a:xfrm>
+            <a:off x="31103785" y="11926395"/>
+            <a:ext cx="1052047" cy="697636"/>
+          </a:xfrm>
+          <a:prstGeom prst="roundRect">
+            <a:avLst/>
+          </a:prstGeom>
+          <a:solidFill>
+            <a:srgbClr val="DF5BCC"/>
+          </a:solidFill>
+          <a:ln w="12700">
+            <a:noFill/>
+          </a:ln>
+        </p:spPr>
+        <p:style>
+          <a:lnRef idx="2">
+            <a:schemeClr val="accent6"/>
+          </a:lnRef>
+          <a:fillRef idx="1">
+            <a:schemeClr val="lt1"/>
+          </a:fillRef>
+          <a:effectRef idx="0">
+            <a:schemeClr val="accent6"/>
+          </a:effectRef>
+          <a:fontRef idx="minor">
+            <a:schemeClr val="dk1"/>
+          </a:fontRef>
+        </p:style>
+        <p:txBody>
+          <a:bodyPr rtlCol="0" anchor="ctr"/>
+          <a:lstStyle/>
+          <a:p>
+            <a:pPr algn="ctr"/>
+            <a:r>
+              <a:rPr lang="fr-FR" sz="900" dirty="0">
+                <a:solidFill>
+                  <a:schemeClr val="bg1"/>
+                </a:solidFill>
+                <a:latin typeface="Gill Sans Nova" panose="020B0602020104020203" pitchFamily="34" charset="0"/>
+              </a:rPr>
+              <a:t>E36 Visual Item</a:t>
+            </a:r>
+          </a:p>
+          <a:p>
+            <a:pPr algn="ctr"/>
+            <a:r>
+              <a:rPr lang="fr-FR" sz="900" i="1" dirty="0">
+                <a:solidFill>
+                  <a:schemeClr val="bg1"/>
+                </a:solidFill>
+                <a:latin typeface="Gill Sans Nova" panose="020B0602020104020203" pitchFamily="34" charset="0"/>
+              </a:rPr>
+              <a:t>(Gravure)</a:t>
+            </a:r>
+          </a:p>
+        </p:txBody>
+      </p:sp>
+      <p:cxnSp>
+        <p:nvCxnSpPr>
+          <p:cNvPr id="8" name="Connecteur droit avec flèche 7">
+            <a:extLst>
+              <a:ext uri="{FF2B5EF4-FFF2-40B4-BE49-F238E27FC236}">
+                <a16:creationId xmlns:a16="http://schemas.microsoft.com/office/drawing/2014/main" id="{DCFF6C89-3050-4686-A940-FEFBF6463689}"/>
+              </a:ext>
+            </a:extLst>
+          </p:cNvPr>
+          <p:cNvCxnSpPr>
+            <a:cxnSpLocks/>
+            <a:stCxn id="258" idx="2"/>
+            <a:endCxn id="292" idx="0"/>
+          </p:cNvCxnSpPr>
+          <p:nvPr/>
+        </p:nvCxnSpPr>
+        <p:spPr>
+          <a:xfrm flipH="1">
+            <a:off x="31629808" y="12624031"/>
+            <a:ext cx="1" cy="705589"/>
+          </a:xfrm>
+          <a:prstGeom prst="straightConnector1">
+            <a:avLst/>
+          </a:prstGeom>
+          <a:ln>
+            <a:tailEnd type="triangle"/>
+          </a:ln>
+        </p:spPr>
+        <p:style>
+          <a:lnRef idx="1">
+            <a:schemeClr val="dk1"/>
+          </a:lnRef>
+          <a:fillRef idx="0">
+            <a:schemeClr val="dk1"/>
+          </a:fillRef>
+          <a:effectRef idx="0">
+            <a:schemeClr val="dk1"/>
+          </a:effectRef>
+          <a:fontRef idx="minor">
+            <a:schemeClr val="tx1"/>
+          </a:fontRef>
+        </p:style>
+      </p:cxnSp>
+      <p:sp>
+        <p:nvSpPr>
+          <p:cNvPr id="261" name="ZoneTexte 260">
+            <a:extLst>
+              <a:ext uri="{FF2B5EF4-FFF2-40B4-BE49-F238E27FC236}">
+                <a16:creationId xmlns:a16="http://schemas.microsoft.com/office/drawing/2014/main" id="{624F9947-9ED6-41C5-94F0-25C4E5ADDF83}"/>
+              </a:ext>
+            </a:extLst>
+          </p:cNvPr>
+          <p:cNvSpPr txBox="1"/>
+          <p:nvPr/>
+        </p:nvSpPr>
+        <p:spPr>
+          <a:xfrm>
+            <a:off x="30434164" y="12865386"/>
+            <a:ext cx="1398361" cy="230832"/>
+          </a:xfrm>
+          <a:prstGeom prst="rect">
+            <a:avLst/>
+          </a:prstGeom>
+          <a:noFill/>
+        </p:spPr>
+        <p:txBody>
+          <a:bodyPr wrap="square" rtlCol="0">
+            <a:spAutoFit/>
+          </a:bodyPr>
+          <a:lstStyle/>
+          <a:p>
+            <a:pPr algn="ctr"/>
+            <a:r>
+              <a:rPr lang="fr-FR" sz="900" i="1" dirty="0">
+                <a:latin typeface="Gill Sans Nova" panose="020B0602020104020203" pitchFamily="34" charset="0"/>
+              </a:rPr>
+              <a:t>P138 </a:t>
+            </a:r>
+            <a:r>
+              <a:rPr lang="fr-FR" sz="900" i="1" dirty="0" err="1">
+                <a:latin typeface="Gill Sans Nova" panose="020B0602020104020203" pitchFamily="34" charset="0"/>
+              </a:rPr>
+              <a:t>represents</a:t>
+            </a:r>
+            <a:endParaRPr lang="fr-FR" sz="900" i="1" dirty="0">
+              <a:latin typeface="Gill Sans Nova" panose="020B0602020104020203" pitchFamily="34" charset="0"/>
+            </a:endParaRPr>
           </a:p>
         </p:txBody>
       </p:sp>

</xml_diff>

<commit_message>
creation exemple ttl collection iiif
</commit_message>
<xml_diff>
--- a/modélisation/mercure-galant-thésaurus-ancien-régime/Modélisation.pptx
+++ b/modélisation/mercure-galant-thésaurus-ancien-régime/Modélisation.pptx
@@ -243,7 +243,7 @@
           <a:p>
             <a:fld id="{F96D367F-7370-4214-86FB-91D90BAC4FAD}" type="datetimeFigureOut">
               <a:rPr lang="fr-FR" smtClean="0"/>
-              <a:t>12/03/2021</a:t>
+              <a:t>24/03/2021</a:t>
             </a:fld>
             <a:endParaRPr lang="fr-FR"/>
           </a:p>
@@ -413,7 +413,7 @@
           <a:p>
             <a:fld id="{F96D367F-7370-4214-86FB-91D90BAC4FAD}" type="datetimeFigureOut">
               <a:rPr lang="fr-FR" smtClean="0"/>
-              <a:t>12/03/2021</a:t>
+              <a:t>24/03/2021</a:t>
             </a:fld>
             <a:endParaRPr lang="fr-FR"/>
           </a:p>
@@ -593,7 +593,7 @@
           <a:p>
             <a:fld id="{F96D367F-7370-4214-86FB-91D90BAC4FAD}" type="datetimeFigureOut">
               <a:rPr lang="fr-FR" smtClean="0"/>
-              <a:t>12/03/2021</a:t>
+              <a:t>24/03/2021</a:t>
             </a:fld>
             <a:endParaRPr lang="fr-FR"/>
           </a:p>
@@ -763,7 +763,7 @@
           <a:p>
             <a:fld id="{F96D367F-7370-4214-86FB-91D90BAC4FAD}" type="datetimeFigureOut">
               <a:rPr lang="fr-FR" smtClean="0"/>
-              <a:t>12/03/2021</a:t>
+              <a:t>24/03/2021</a:t>
             </a:fld>
             <a:endParaRPr lang="fr-FR"/>
           </a:p>
@@ -1007,7 +1007,7 @@
           <a:p>
             <a:fld id="{F96D367F-7370-4214-86FB-91D90BAC4FAD}" type="datetimeFigureOut">
               <a:rPr lang="fr-FR" smtClean="0"/>
-              <a:t>12/03/2021</a:t>
+              <a:t>24/03/2021</a:t>
             </a:fld>
             <a:endParaRPr lang="fr-FR"/>
           </a:p>
@@ -1239,7 +1239,7 @@
           <a:p>
             <a:fld id="{F96D367F-7370-4214-86FB-91D90BAC4FAD}" type="datetimeFigureOut">
               <a:rPr lang="fr-FR" smtClean="0"/>
-              <a:t>12/03/2021</a:t>
+              <a:t>24/03/2021</a:t>
             </a:fld>
             <a:endParaRPr lang="fr-FR"/>
           </a:p>
@@ -1606,7 +1606,7 @@
           <a:p>
             <a:fld id="{F96D367F-7370-4214-86FB-91D90BAC4FAD}" type="datetimeFigureOut">
               <a:rPr lang="fr-FR" smtClean="0"/>
-              <a:t>12/03/2021</a:t>
+              <a:t>24/03/2021</a:t>
             </a:fld>
             <a:endParaRPr lang="fr-FR"/>
           </a:p>
@@ -1724,7 +1724,7 @@
           <a:p>
             <a:fld id="{F96D367F-7370-4214-86FB-91D90BAC4FAD}" type="datetimeFigureOut">
               <a:rPr lang="fr-FR" smtClean="0"/>
-              <a:t>12/03/2021</a:t>
+              <a:t>24/03/2021</a:t>
             </a:fld>
             <a:endParaRPr lang="fr-FR"/>
           </a:p>
@@ -1819,7 +1819,7 @@
           <a:p>
             <a:fld id="{F96D367F-7370-4214-86FB-91D90BAC4FAD}" type="datetimeFigureOut">
               <a:rPr lang="fr-FR" smtClean="0"/>
-              <a:t>12/03/2021</a:t>
+              <a:t>24/03/2021</a:t>
             </a:fld>
             <a:endParaRPr lang="fr-FR"/>
           </a:p>
@@ -2096,7 +2096,7 @@
           <a:p>
             <a:fld id="{F96D367F-7370-4214-86FB-91D90BAC4FAD}" type="datetimeFigureOut">
               <a:rPr lang="fr-FR" smtClean="0"/>
-              <a:t>12/03/2021</a:t>
+              <a:t>24/03/2021</a:t>
             </a:fld>
             <a:endParaRPr lang="fr-FR"/>
           </a:p>
@@ -2353,7 +2353,7 @@
           <a:p>
             <a:fld id="{F96D367F-7370-4214-86FB-91D90BAC4FAD}" type="datetimeFigureOut">
               <a:rPr lang="fr-FR" smtClean="0"/>
-              <a:t>12/03/2021</a:t>
+              <a:t>24/03/2021</a:t>
             </a:fld>
             <a:endParaRPr lang="fr-FR"/>
           </a:p>
@@ -2566,7 +2566,7 @@
           <a:p>
             <a:fld id="{F96D367F-7370-4214-86FB-91D90BAC4FAD}" type="datetimeFigureOut">
               <a:rPr lang="fr-FR" smtClean="0"/>
-              <a:t>12/03/2021</a:t>
+              <a:t>24/03/2021</a:t>
             </a:fld>
             <a:endParaRPr lang="fr-FR"/>
           </a:p>
@@ -15688,7 +15688,7 @@
         </p:nvSpPr>
         <p:spPr>
           <a:xfrm>
-            <a:off x="32591545" y="15585890"/>
+            <a:off x="32370499" y="14940811"/>
             <a:ext cx="1052048" cy="697632"/>
           </a:xfrm>
           <a:prstGeom prst="roundRect">
@@ -15731,18 +15731,12 @@
               </a:rPr>
               <a:t>E36 Visual Item</a:t>
             </a:r>
-          </a:p>
-          <a:p>
-            <a:pPr algn="ctr"/>
-            <a:r>
-              <a:rPr lang="fr-FR" sz="1000" i="1" dirty="0">
-                <a:solidFill>
-                  <a:schemeClr val="bg1"/>
-                </a:solidFill>
-                <a:latin typeface="Gill Sans Nova" panose="020B0602020104020203" pitchFamily="34" charset="0"/>
-              </a:rPr>
-              <a:t>(Gravure)</a:t>
-            </a:r>
+            <a:endParaRPr lang="fr-FR" sz="1000" i="1" dirty="0">
+              <a:solidFill>
+                <a:schemeClr val="bg1"/>
+              </a:solidFill>
+              <a:latin typeface="Gill Sans Nova" panose="020B0602020104020203" pitchFamily="34" charset="0"/>
+            </a:endParaRPr>
           </a:p>
         </p:txBody>
       </p:sp>
@@ -15760,7 +15754,7 @@
         </p:nvSpPr>
         <p:spPr>
           <a:xfrm>
-            <a:off x="32450334" y="17322160"/>
+            <a:off x="32193929" y="16564890"/>
             <a:ext cx="1398356" cy="253916"/>
           </a:xfrm>
           <a:prstGeom prst="rect">
@@ -15865,6 +15859,7 @@
             </a:extLst>
           </p:cNvPr>
           <p:cNvCxnSpPr>
+            <a:cxnSpLocks/>
             <a:stCxn id="919" idx="3"/>
             <a:endCxn id="258" idx="0"/>
           </p:cNvCxnSpPr>
@@ -15873,7 +15868,7 @@
         <p:spPr>
           <a:xfrm>
             <a:off x="30863496" y="10023642"/>
-            <a:ext cx="2254073" cy="5562248"/>
+            <a:ext cx="2033027" cy="4917169"/>
           </a:xfrm>
           <a:prstGeom prst="curvedConnector2">
             <a:avLst/>
@@ -16265,20 +16260,18 @@
         </p:nvSpPr>
         <p:spPr>
           <a:xfrm>
-            <a:off x="31507124" y="18346414"/>
+            <a:off x="31322740" y="17339484"/>
             <a:ext cx="1130864" cy="519454"/>
           </a:xfrm>
           <a:prstGeom prst="roundRect">
             <a:avLst/>
           </a:prstGeom>
           <a:solidFill>
-            <a:srgbClr val="C3A441"/>
+            <a:srgbClr val="F2B800"/>
           </a:solidFill>
           <a:ln w="28575">
             <a:solidFill>
-              <a:schemeClr val="accent4">
-                <a:lumMod val="75000"/>
-              </a:schemeClr>
+              <a:srgbClr val="DAA600"/>
             </a:solidFill>
           </a:ln>
         </p:spPr>
@@ -16354,7 +16347,7 @@
         </p:nvSpPr>
         <p:spPr>
           <a:xfrm>
-            <a:off x="35917132" y="14728949"/>
+            <a:off x="34722710" y="13734294"/>
             <a:ext cx="864026" cy="571570"/>
           </a:xfrm>
           <a:prstGeom prst="roundRect">
@@ -16429,7 +16422,7 @@
         </p:nvSpPr>
         <p:spPr>
           <a:xfrm>
-            <a:off x="34148275" y="15193758"/>
+            <a:off x="33559792" y="14098964"/>
             <a:ext cx="685869" cy="400110"/>
           </a:xfrm>
           <a:prstGeom prst="rect">
@@ -16476,7 +16469,7 @@
         </p:nvSpPr>
         <p:spPr>
           <a:xfrm>
-            <a:off x="35735228" y="13554529"/>
+            <a:off x="36453125" y="13755086"/>
             <a:ext cx="1216621" cy="540468"/>
           </a:xfrm>
           <a:prstGeom prst="roundRect">
@@ -16561,15 +16554,15 @@
           </p:cNvPr>
           <p:cNvCxnSpPr>
             <a:cxnSpLocks/>
-            <a:stCxn id="290" idx="0"/>
-            <a:endCxn id="296" idx="2"/>
+            <a:stCxn id="290" idx="3"/>
+            <a:endCxn id="296" idx="1"/>
           </p:cNvCxnSpPr>
           <p:nvPr/>
         </p:nvCxnSpPr>
         <p:spPr>
-          <a:xfrm flipH="1" flipV="1">
-            <a:off x="36343539" y="14094997"/>
-            <a:ext cx="5606" cy="633952"/>
+          <a:xfrm>
+            <a:off x="35586736" y="14020079"/>
+            <a:ext cx="866389" cy="5241"/>
           </a:xfrm>
           <a:prstGeom prst="straightConnector1">
             <a:avLst/>
@@ -16607,7 +16600,7 @@
         </p:nvSpPr>
         <p:spPr>
           <a:xfrm>
-            <a:off x="33625239" y="18320204"/>
+            <a:off x="33440855" y="17313274"/>
             <a:ext cx="1062751" cy="636761"/>
           </a:xfrm>
           <a:prstGeom prst="roundRect">
@@ -16695,8 +16688,8 @@
         </p:nvCxnSpPr>
         <p:spPr>
           <a:xfrm rot="5400000">
-            <a:off x="31563617" y="16792462"/>
-            <a:ext cx="2062892" cy="1045013"/>
+            <a:off x="31541828" y="15984788"/>
+            <a:ext cx="1701041" cy="1008351"/>
           </a:xfrm>
           <a:prstGeom prst="curvedConnector3">
             <a:avLst/>
@@ -16737,8 +16730,8 @@
         </p:nvCxnSpPr>
         <p:spPr>
           <a:xfrm rot="16200000" flipH="1">
-            <a:off x="32618751" y="16782340"/>
-            <a:ext cx="2036682" cy="1039046"/>
+            <a:off x="32596962" y="15938004"/>
+            <a:ext cx="1674831" cy="1075708"/>
           </a:xfrm>
           <a:prstGeom prst="curvedConnector3">
             <a:avLst/>
@@ -16779,8 +16772,8 @@
         </p:nvCxnSpPr>
         <p:spPr>
           <a:xfrm flipV="1">
-            <a:off x="33643593" y="15014734"/>
-            <a:ext cx="2273539" cy="919972"/>
+            <a:off x="33422547" y="14020079"/>
+            <a:ext cx="1300163" cy="1269548"/>
           </a:xfrm>
           <a:prstGeom prst="curvedConnector3">
             <a:avLst/>
@@ -16806,10 +16799,60 @@
       </p:cxnSp>
       <p:sp>
         <p:nvSpPr>
-          <p:cNvPr id="317" name="Rectangle : coins arrondis 316">
-            <a:extLst>
-              <a:ext uri="{FF2B5EF4-FFF2-40B4-BE49-F238E27FC236}">
-                <a16:creationId xmlns:a16="http://schemas.microsoft.com/office/drawing/2014/main" id="{04B27341-0B9C-4F9B-B1EA-0A66BF739B47}"/>
+          <p:cNvPr id="323" name="ZoneTexte 322">
+            <a:extLst>
+              <a:ext uri="{FF2B5EF4-FFF2-40B4-BE49-F238E27FC236}">
+                <a16:creationId xmlns:a16="http://schemas.microsoft.com/office/drawing/2014/main" id="{251027FE-19EC-4378-BF55-BF1D868A6E9C}"/>
+              </a:ext>
+            </a:extLst>
+          </p:cNvPr>
+          <p:cNvSpPr txBox="1"/>
+          <p:nvPr/>
+        </p:nvSpPr>
+        <p:spPr>
+          <a:xfrm>
+            <a:off x="31330565" y="14727985"/>
+            <a:ext cx="732494" cy="415498"/>
+          </a:xfrm>
+          <a:prstGeom prst="rect">
+            <a:avLst/>
+          </a:prstGeom>
+          <a:noFill/>
+        </p:spPr>
+        <p:txBody>
+          <a:bodyPr wrap="square" rtlCol="0">
+            <a:spAutoFit/>
+          </a:bodyPr>
+          <a:lstStyle/>
+          <a:p>
+            <a:pPr algn="ctr"/>
+            <a:r>
+              <a:rPr lang="fr-FR" sz="1050" i="1" dirty="0">
+                <a:latin typeface="Gill Sans Nova" panose="020B0602020104020203" pitchFamily="34" charset="0"/>
+              </a:rPr>
+              <a:t>P129 </a:t>
+            </a:r>
+            <a:r>
+              <a:rPr lang="fr-FR" sz="1050" i="1" dirty="0" err="1">
+                <a:latin typeface="Gill Sans Nova" panose="020B0602020104020203" pitchFamily="34" charset="0"/>
+              </a:rPr>
+              <a:t>is</a:t>
+            </a:r>
+            <a:r>
+              <a:rPr lang="fr-FR" sz="1050" i="1" dirty="0">
+                <a:latin typeface="Gill Sans Nova" panose="020B0602020104020203" pitchFamily="34" charset="0"/>
+              </a:rPr>
+              <a:t> about</a:t>
+            </a:r>
+          </a:p>
+        </p:txBody>
+      </p:sp>
+      <p:sp>
+        <p:nvSpPr>
+          <p:cNvPr id="324" name="Rectangle : coins arrondis 323">
+            <a:extLst>
+              <a:ext uri="{FF2B5EF4-FFF2-40B4-BE49-F238E27FC236}">
+                <a16:creationId xmlns:a16="http://schemas.microsoft.com/office/drawing/2014/main" id="{994047F3-E8DC-4BCD-9A99-77175C796312}"/>
               </a:ext>
             </a:extLst>
           </p:cNvPr>
@@ -16818,20 +16861,18 @@
         </p:nvSpPr>
         <p:spPr>
           <a:xfrm>
-            <a:off x="29463661" y="15146967"/>
-            <a:ext cx="1130864" cy="519454"/>
+            <a:off x="34577958" y="15478975"/>
+            <a:ext cx="1105041" cy="565753"/>
           </a:xfrm>
           <a:prstGeom prst="roundRect">
             <a:avLst/>
           </a:prstGeom>
           <a:solidFill>
-            <a:srgbClr val="C3A441"/>
+            <a:srgbClr val="96BE18"/>
           </a:solidFill>
           <a:ln w="28575">
             <a:solidFill>
-              <a:schemeClr val="accent4">
-                <a:lumMod val="75000"/>
-              </a:schemeClr>
+              <a:srgbClr val="8AAE16"/>
             </a:solidFill>
           </a:ln>
         </p:spPr>
@@ -16861,7 +16902,7 @@
                 </a:solidFill>
                 <a:latin typeface="Gill Sans Nova" panose="020B0602020104020203" pitchFamily="34" charset="0"/>
               </a:rPr>
-              <a:t>E1 CRM </a:t>
+              <a:t>E65 </a:t>
             </a:r>
             <a:r>
               <a:rPr lang="fr-FR" sz="1000" dirty="0" err="1">
@@ -16870,7 +16911,7 @@
                 </a:solidFill>
                 <a:latin typeface="Gill Sans Nova" panose="020B0602020104020203" pitchFamily="34" charset="0"/>
               </a:rPr>
-              <a:t>Entity</a:t>
+              <a:t>Creation</a:t>
             </a:r>
             <a:endParaRPr lang="fr-FR" sz="1000" dirty="0">
               <a:solidFill>
@@ -16879,26 +16920,59 @@
               <a:latin typeface="Gill Sans Nova" panose="020B0602020104020203" pitchFamily="34" charset="0"/>
             </a:endParaRPr>
           </a:p>
-          <a:p>
-            <a:pPr algn="ctr"/>
-            <a:r>
-              <a:rPr lang="fr-FR" sz="1000" i="1" dirty="0">
-                <a:solidFill>
-                  <a:schemeClr val="bg1"/>
-                </a:solidFill>
-                <a:latin typeface="Gill Sans Nova" panose="020B0602020104020203" pitchFamily="34" charset="0"/>
-              </a:rPr>
-              <a:t>« Enigme »</a:t>
-            </a:r>
-          </a:p>
-        </p:txBody>
-      </p:sp>
-      <p:sp>
-        <p:nvSpPr>
-          <p:cNvPr id="323" name="ZoneTexte 322">
-            <a:extLst>
-              <a:ext uri="{FF2B5EF4-FFF2-40B4-BE49-F238E27FC236}">
-                <a16:creationId xmlns:a16="http://schemas.microsoft.com/office/drawing/2014/main" id="{251027FE-19EC-4378-BF55-BF1D868A6E9C}"/>
+        </p:txBody>
+      </p:sp>
+      <p:cxnSp>
+        <p:nvCxnSpPr>
+          <p:cNvPr id="212" name="Connecteur : en arc 211">
+            <a:extLst>
+              <a:ext uri="{FF2B5EF4-FFF2-40B4-BE49-F238E27FC236}">
+                <a16:creationId xmlns:a16="http://schemas.microsoft.com/office/drawing/2014/main" id="{DF072112-44D3-48E4-9DAE-FEF61FEAF689}"/>
+              </a:ext>
+            </a:extLst>
+          </p:cNvPr>
+          <p:cNvCxnSpPr>
+            <a:cxnSpLocks/>
+            <a:stCxn id="324" idx="1"/>
+            <a:endCxn id="258" idx="3"/>
+          </p:cNvCxnSpPr>
+          <p:nvPr/>
+        </p:nvCxnSpPr>
+        <p:spPr>
+          <a:xfrm rot="10800000">
+            <a:off x="33422548" y="15289628"/>
+            <a:ext cx="1155411" cy="472225"/>
+          </a:xfrm>
+          <a:prstGeom prst="curvedConnector3">
+            <a:avLst>
+              <a:gd name="adj1" fmla="val 50000"/>
+            </a:avLst>
+          </a:prstGeom>
+          <a:ln>
+            <a:tailEnd type="triangle"/>
+          </a:ln>
+        </p:spPr>
+        <p:style>
+          <a:lnRef idx="1">
+            <a:schemeClr val="dk1"/>
+          </a:lnRef>
+          <a:fillRef idx="0">
+            <a:schemeClr val="dk1"/>
+          </a:fillRef>
+          <a:effectRef idx="0">
+            <a:schemeClr val="dk1"/>
+          </a:effectRef>
+          <a:fontRef idx="minor">
+            <a:schemeClr val="tx1"/>
+          </a:fontRef>
+        </p:style>
+      </p:cxnSp>
+      <p:sp>
+        <p:nvSpPr>
+          <p:cNvPr id="330" name="ZoneTexte 329">
+            <a:extLst>
+              <a:ext uri="{FF2B5EF4-FFF2-40B4-BE49-F238E27FC236}">
+                <a16:creationId xmlns:a16="http://schemas.microsoft.com/office/drawing/2014/main" id="{4BFD32AD-3CE3-40BA-99FC-731BBCB38E18}"/>
               </a:ext>
             </a:extLst>
           </p:cNvPr>
@@ -16907,8 +16981,8 @@
         </p:nvSpPr>
         <p:spPr>
           <a:xfrm>
-            <a:off x="31418882" y="15277541"/>
-            <a:ext cx="950003" cy="415498"/>
+            <a:off x="34296209" y="16297473"/>
+            <a:ext cx="868954" cy="400110"/>
           </a:xfrm>
           <a:prstGeom prst="rect">
             <a:avLst/>
@@ -16923,41 +16997,29 @@
           <a:p>
             <a:pPr algn="ctr"/>
             <a:r>
-              <a:rPr lang="fr-FR" sz="1050" b="1" i="1" dirty="0">
-                <a:solidFill>
-                  <a:srgbClr val="FF0000"/>
-                </a:solidFill>
-                <a:latin typeface="Gill Sans Nova" panose="020B0602020104020203" pitchFamily="34" charset="0"/>
-              </a:rPr>
-              <a:t>P129 </a:t>
-            </a:r>
-            <a:r>
-              <a:rPr lang="fr-FR" sz="1050" b="1" i="1" dirty="0" err="1">
-                <a:solidFill>
-                  <a:srgbClr val="FF0000"/>
-                </a:solidFill>
-                <a:latin typeface="Gill Sans Nova" panose="020B0602020104020203" pitchFamily="34" charset="0"/>
-              </a:rPr>
-              <a:t>is</a:t>
-            </a:r>
-            <a:r>
-              <a:rPr lang="fr-FR" sz="1050" b="1" i="1" dirty="0">
-                <a:solidFill>
-                  <a:srgbClr val="FF0000"/>
-                </a:solidFill>
-                <a:latin typeface="Gill Sans Nova" panose="020B0602020104020203" pitchFamily="34" charset="0"/>
-              </a:rPr>
-              <a:t> about ?</a:t>
-            </a:r>
-          </a:p>
-        </p:txBody>
-      </p:sp>
-      <p:sp>
-        <p:nvSpPr>
-          <p:cNvPr id="324" name="Rectangle : coins arrondis 323">
-            <a:extLst>
-              <a:ext uri="{FF2B5EF4-FFF2-40B4-BE49-F238E27FC236}">
-                <a16:creationId xmlns:a16="http://schemas.microsoft.com/office/drawing/2014/main" id="{994047F3-E8DC-4BCD-9A99-77175C796312}"/>
+              <a:rPr lang="fr-FR" sz="1000" i="1" dirty="0">
+                <a:latin typeface="Gill Sans Nova" panose="020B0602020104020203" pitchFamily="34" charset="0"/>
+              </a:rPr>
+              <a:t>P94 has </a:t>
+            </a:r>
+            <a:r>
+              <a:rPr lang="fr-FR" sz="1000" i="1" dirty="0" err="1">
+                <a:latin typeface="Gill Sans Nova" panose="020B0602020104020203" pitchFamily="34" charset="0"/>
+              </a:rPr>
+              <a:t>created</a:t>
+            </a:r>
+            <a:endParaRPr lang="fr-FR" sz="1000" i="1" dirty="0">
+              <a:latin typeface="Gill Sans Nova" panose="020B0602020104020203" pitchFamily="34" charset="0"/>
+            </a:endParaRPr>
+          </a:p>
+        </p:txBody>
+      </p:sp>
+      <p:sp>
+        <p:nvSpPr>
+          <p:cNvPr id="331" name="Rectangle : coins arrondis 330">
+            <a:extLst>
+              <a:ext uri="{FF2B5EF4-FFF2-40B4-BE49-F238E27FC236}">
+                <a16:creationId xmlns:a16="http://schemas.microsoft.com/office/drawing/2014/main" id="{144CDFD1-A3DB-4EF3-B289-2A7A5D04541E}"/>
               </a:ext>
             </a:extLst>
           </p:cNvPr>
@@ -16966,19 +17028,17 @@
         </p:nvSpPr>
         <p:spPr>
           <a:xfrm>
-            <a:off x="35835637" y="16618796"/>
-            <a:ext cx="1105041" cy="565753"/>
+            <a:off x="39376292" y="14895690"/>
+            <a:ext cx="1023275" cy="446226"/>
           </a:xfrm>
           <a:prstGeom prst="roundRect">
             <a:avLst/>
           </a:prstGeom>
           <a:solidFill>
-            <a:srgbClr val="96BE18"/>
+            <a:srgbClr val="FFE699"/>
           </a:solidFill>
-          <a:ln w="28575">
-            <a:solidFill>
-              <a:srgbClr val="8AAE16"/>
-            </a:solidFill>
+          <a:ln w="12700">
+            <a:noFill/>
           </a:ln>
         </p:spPr>
         <p:style>
@@ -17003,128 +17063,21 @@
             <a:r>
               <a:rPr lang="fr-FR" sz="1000" dirty="0">
                 <a:solidFill>
-                  <a:schemeClr val="bg1"/>
-                </a:solidFill>
-                <a:latin typeface="Gill Sans Nova" panose="020B0602020104020203" pitchFamily="34" charset="0"/>
-              </a:rPr>
-              <a:t>E65 </a:t>
-            </a:r>
-            <a:r>
-              <a:rPr lang="fr-FR" sz="1000" dirty="0" err="1">
-                <a:solidFill>
-                  <a:schemeClr val="bg1"/>
-                </a:solidFill>
-                <a:latin typeface="Gill Sans Nova" panose="020B0602020104020203" pitchFamily="34" charset="0"/>
-              </a:rPr>
-              <a:t>Creation</a:t>
-            </a:r>
-            <a:endParaRPr lang="fr-FR" sz="1000" dirty="0">
-              <a:solidFill>
-                <a:schemeClr val="bg1"/>
-              </a:solidFill>
-              <a:latin typeface="Gill Sans Nova" panose="020B0602020104020203" pitchFamily="34" charset="0"/>
-            </a:endParaRPr>
-          </a:p>
-        </p:txBody>
-      </p:sp>
-      <p:cxnSp>
-        <p:nvCxnSpPr>
-          <p:cNvPr id="212" name="Connecteur : en arc 211">
-            <a:extLst>
-              <a:ext uri="{FF2B5EF4-FFF2-40B4-BE49-F238E27FC236}">
-                <a16:creationId xmlns:a16="http://schemas.microsoft.com/office/drawing/2014/main" id="{DF072112-44D3-48E4-9DAE-FEF61FEAF689}"/>
-              </a:ext>
-            </a:extLst>
-          </p:cNvPr>
-          <p:cNvCxnSpPr>
-            <a:cxnSpLocks/>
-            <a:stCxn id="324" idx="1"/>
-            <a:endCxn id="258" idx="3"/>
-          </p:cNvCxnSpPr>
-          <p:nvPr/>
-        </p:nvCxnSpPr>
-        <p:spPr>
-          <a:xfrm rot="10800000">
-            <a:off x="33643593" y="15934707"/>
-            <a:ext cx="2192044" cy="966967"/>
-          </a:xfrm>
-          <a:prstGeom prst="curvedConnector3">
-            <a:avLst>
-              <a:gd name="adj1" fmla="val 50000"/>
-            </a:avLst>
-          </a:prstGeom>
-          <a:ln>
-            <a:tailEnd type="triangle"/>
-          </a:ln>
-        </p:spPr>
-        <p:style>
-          <a:lnRef idx="1">
-            <a:schemeClr val="dk1"/>
-          </a:lnRef>
-          <a:fillRef idx="0">
-            <a:schemeClr val="dk1"/>
-          </a:fillRef>
-          <a:effectRef idx="0">
-            <a:schemeClr val="dk1"/>
-          </a:effectRef>
-          <a:fontRef idx="minor">
-            <a:schemeClr val="tx1"/>
-          </a:fontRef>
-        </p:style>
-      </p:cxnSp>
-      <p:sp>
-        <p:nvSpPr>
-          <p:cNvPr id="330" name="ZoneTexte 329">
-            <a:extLst>
-              <a:ext uri="{FF2B5EF4-FFF2-40B4-BE49-F238E27FC236}">
-                <a16:creationId xmlns:a16="http://schemas.microsoft.com/office/drawing/2014/main" id="{4BFD32AD-3CE3-40BA-99FC-731BBCB38E18}"/>
-              </a:ext>
-            </a:extLst>
-          </p:cNvPr>
-          <p:cNvSpPr txBox="1"/>
-          <p:nvPr/>
-        </p:nvSpPr>
-        <p:spPr>
-          <a:xfrm>
-            <a:off x="34021855" y="16326146"/>
-            <a:ext cx="868954" cy="400110"/>
-          </a:xfrm>
-          <a:prstGeom prst="rect">
-            <a:avLst/>
-          </a:prstGeom>
-          <a:noFill/>
-        </p:spPr>
-        <p:txBody>
-          <a:bodyPr wrap="square" rtlCol="0">
-            <a:spAutoFit/>
-          </a:bodyPr>
-          <a:lstStyle/>
-          <a:p>
-            <a:pPr algn="ctr"/>
-            <a:r>
-              <a:rPr lang="fr-FR" sz="1000" i="1" dirty="0">
-                <a:latin typeface="Gill Sans Nova" panose="020B0602020104020203" pitchFamily="34" charset="0"/>
-              </a:rPr>
-              <a:t>P94 has </a:t>
-            </a:r>
-            <a:r>
-              <a:rPr lang="fr-FR" sz="1000" i="1" dirty="0" err="1">
-                <a:latin typeface="Gill Sans Nova" panose="020B0602020104020203" pitchFamily="34" charset="0"/>
-              </a:rPr>
-              <a:t>created</a:t>
-            </a:r>
-            <a:endParaRPr lang="fr-FR" sz="1000" i="1" dirty="0">
-              <a:latin typeface="Gill Sans Nova" panose="020B0602020104020203" pitchFamily="34" charset="0"/>
-            </a:endParaRPr>
-          </a:p>
-        </p:txBody>
-      </p:sp>
-      <p:sp>
-        <p:nvSpPr>
-          <p:cNvPr id="331" name="Rectangle : coins arrondis 330">
-            <a:extLst>
-              <a:ext uri="{FF2B5EF4-FFF2-40B4-BE49-F238E27FC236}">
-                <a16:creationId xmlns:a16="http://schemas.microsoft.com/office/drawing/2014/main" id="{144CDFD1-A3DB-4EF3-B289-2A7A5D04541E}"/>
+                  <a:schemeClr val="tx1"/>
+                </a:solidFill>
+                <a:latin typeface="Gill Sans Nova" panose="020B0602020104020203" pitchFamily="34" charset="0"/>
+              </a:rPr>
+              <a:t>E21 Person</a:t>
+            </a:r>
+          </a:p>
+        </p:txBody>
+      </p:sp>
+      <p:sp>
+        <p:nvSpPr>
+          <p:cNvPr id="332" name="Rectangle : coins arrondis 331">
+            <a:extLst>
+              <a:ext uri="{FF2B5EF4-FFF2-40B4-BE49-F238E27FC236}">
+                <a16:creationId xmlns:a16="http://schemas.microsoft.com/office/drawing/2014/main" id="{24CE1718-FABC-49CD-BCFA-E1040A93B82E}"/>
               </a:ext>
             </a:extLst>
           </p:cNvPr>
@@ -17133,14 +17086,14 @@
         </p:nvSpPr>
         <p:spPr>
           <a:xfrm>
-            <a:off x="40633971" y="16035511"/>
-            <a:ext cx="1023275" cy="446226"/>
+            <a:off x="37006857" y="14837734"/>
+            <a:ext cx="1062751" cy="575137"/>
           </a:xfrm>
           <a:prstGeom prst="roundRect">
             <a:avLst/>
           </a:prstGeom>
           <a:solidFill>
-            <a:srgbClr val="FFE699"/>
+            <a:srgbClr val="8DC28C"/>
           </a:solidFill>
           <a:ln w="12700">
             <a:noFill/>
@@ -17168,21 +17121,48 @@
             <a:r>
               <a:rPr lang="fr-FR" sz="1000" dirty="0">
                 <a:solidFill>
-                  <a:schemeClr val="tx1"/>
-                </a:solidFill>
-                <a:latin typeface="Gill Sans Nova" panose="020B0602020104020203" pitchFamily="34" charset="0"/>
-              </a:rPr>
-              <a:t>E21 Person</a:t>
-            </a:r>
-          </a:p>
-        </p:txBody>
-      </p:sp>
-      <p:sp>
-        <p:nvSpPr>
-          <p:cNvPr id="332" name="Rectangle : coins arrondis 331">
-            <a:extLst>
-              <a:ext uri="{FF2B5EF4-FFF2-40B4-BE49-F238E27FC236}">
-                <a16:creationId xmlns:a16="http://schemas.microsoft.com/office/drawing/2014/main" id="{24CE1718-FABC-49CD-BCFA-E1040A93B82E}"/>
+                  <a:schemeClr val="bg1"/>
+                </a:solidFill>
+                <a:latin typeface="Gill Sans Nova" panose="020B0602020104020203" pitchFamily="34" charset="0"/>
+              </a:rPr>
+              <a:t>E7 Activity</a:t>
+            </a:r>
+          </a:p>
+          <a:p>
+            <a:pPr algn="ctr"/>
+            <a:r>
+              <a:rPr lang="fr-FR" sz="1000" dirty="0">
+                <a:solidFill>
+                  <a:schemeClr val="bg1"/>
+                </a:solidFill>
+                <a:latin typeface="Gill Sans Nova" panose="020B0602020104020203" pitchFamily="34" charset="0"/>
+              </a:rPr>
+              <a:t>(</a:t>
+            </a:r>
+            <a:r>
+              <a:rPr lang="fr-FR" sz="1000" i="1" dirty="0">
+                <a:solidFill>
+                  <a:schemeClr val="bg1"/>
+                </a:solidFill>
+                <a:latin typeface="Gill Sans Nova" panose="020B0602020104020203" pitchFamily="34" charset="0"/>
+              </a:rPr>
+              <a:t>de type « invention »)</a:t>
+            </a:r>
+            <a:endParaRPr lang="fr-FR" sz="1000" dirty="0">
+              <a:solidFill>
+                <a:schemeClr val="bg1"/>
+              </a:solidFill>
+              <a:latin typeface="Gill Sans Nova" panose="020B0602020104020203" pitchFamily="34" charset="0"/>
+            </a:endParaRPr>
+          </a:p>
+        </p:txBody>
+      </p:sp>
+      <p:sp>
+        <p:nvSpPr>
+          <p:cNvPr id="333" name="Rectangle : coins arrondis 332">
+            <a:extLst>
+              <a:ext uri="{FF2B5EF4-FFF2-40B4-BE49-F238E27FC236}">
+                <a16:creationId xmlns:a16="http://schemas.microsoft.com/office/drawing/2014/main" id="{E41C258E-60D6-46BB-B9C0-1FADF5B5DD07}"/>
               </a:ext>
             </a:extLst>
           </p:cNvPr>
@@ -17191,8 +17171,8 @@
         </p:nvSpPr>
         <p:spPr>
           <a:xfrm>
-            <a:off x="38264536" y="15977555"/>
-            <a:ext cx="1062751" cy="575137"/>
+            <a:off x="37014774" y="15976057"/>
+            <a:ext cx="1132392" cy="743480"/>
           </a:xfrm>
           <a:prstGeom prst="roundRect">
             <a:avLst/>
@@ -17236,38 +17216,23 @@
           <a:p>
             <a:pPr algn="ctr"/>
             <a:r>
-              <a:rPr lang="fr-FR" sz="1000" dirty="0">
+              <a:rPr lang="fr-FR" sz="1000" i="1" dirty="0">
                 <a:solidFill>
                   <a:schemeClr val="bg1"/>
                 </a:solidFill>
                 <a:latin typeface="Gill Sans Nova" panose="020B0602020104020203" pitchFamily="34" charset="0"/>
               </a:rPr>
-              <a:t>(</a:t>
-            </a:r>
-            <a:r>
-              <a:rPr lang="fr-FR" sz="1000" i="1" dirty="0">
-                <a:solidFill>
-                  <a:schemeClr val="bg1"/>
-                </a:solidFill>
-                <a:latin typeface="Gill Sans Nova" panose="020B0602020104020203" pitchFamily="34" charset="0"/>
-              </a:rPr>
-              <a:t>de type « invention »)</a:t>
-            </a:r>
-            <a:endParaRPr lang="fr-FR" sz="1000" dirty="0">
-              <a:solidFill>
-                <a:schemeClr val="bg1"/>
-              </a:solidFill>
-              <a:latin typeface="Gill Sans Nova" panose="020B0602020104020203" pitchFamily="34" charset="0"/>
-            </a:endParaRPr>
-          </a:p>
-        </p:txBody>
-      </p:sp>
-      <p:sp>
-        <p:nvSpPr>
-          <p:cNvPr id="333" name="Rectangle : coins arrondis 332">
-            <a:extLst>
-              <a:ext uri="{FF2B5EF4-FFF2-40B4-BE49-F238E27FC236}">
-                <a16:creationId xmlns:a16="http://schemas.microsoft.com/office/drawing/2014/main" id="{E41C258E-60D6-46BB-B9C0-1FADF5B5DD07}"/>
+              <a:t>(de type « sculpture / gravure »)</a:t>
+            </a:r>
+          </a:p>
+        </p:txBody>
+      </p:sp>
+      <p:sp>
+        <p:nvSpPr>
+          <p:cNvPr id="334" name="Rectangle : coins arrondis 333">
+            <a:extLst>
+              <a:ext uri="{FF2B5EF4-FFF2-40B4-BE49-F238E27FC236}">
+                <a16:creationId xmlns:a16="http://schemas.microsoft.com/office/drawing/2014/main" id="{0F605940-120C-47BF-89B8-6544770D5575}"/>
               </a:ext>
             </a:extLst>
           </p:cNvPr>
@@ -17276,14 +17241,14 @@
         </p:nvSpPr>
         <p:spPr>
           <a:xfrm>
-            <a:off x="38272453" y="17115878"/>
-            <a:ext cx="1132392" cy="743480"/>
+            <a:off x="39376291" y="16104799"/>
+            <a:ext cx="1023275" cy="446226"/>
           </a:xfrm>
           <a:prstGeom prst="roundRect">
             <a:avLst/>
           </a:prstGeom>
           <a:solidFill>
-            <a:srgbClr val="8DC28C"/>
+            <a:srgbClr val="FFE699"/>
           </a:solidFill>
           <a:ln w="12700">
             <a:noFill/>
@@ -17311,33 +17276,584 @@
             <a:r>
               <a:rPr lang="fr-FR" sz="1000" dirty="0">
                 <a:solidFill>
-                  <a:schemeClr val="bg1"/>
-                </a:solidFill>
-                <a:latin typeface="Gill Sans Nova" panose="020B0602020104020203" pitchFamily="34" charset="0"/>
-              </a:rPr>
-              <a:t>E7 Activity</a:t>
-            </a:r>
-          </a:p>
+                  <a:schemeClr val="tx1"/>
+                </a:solidFill>
+                <a:latin typeface="Gill Sans Nova" panose="020B0602020104020203" pitchFamily="34" charset="0"/>
+              </a:rPr>
+              <a:t>E21 Person</a:t>
+            </a:r>
+          </a:p>
+        </p:txBody>
+      </p:sp>
+      <p:cxnSp>
+        <p:nvCxnSpPr>
+          <p:cNvPr id="220" name="Connecteur : en arc 219">
+            <a:extLst>
+              <a:ext uri="{FF2B5EF4-FFF2-40B4-BE49-F238E27FC236}">
+                <a16:creationId xmlns:a16="http://schemas.microsoft.com/office/drawing/2014/main" id="{1DFD1410-4BA9-441F-A7A8-C923840ECBC8}"/>
+              </a:ext>
+            </a:extLst>
+          </p:cNvPr>
+          <p:cNvCxnSpPr>
+            <a:cxnSpLocks/>
+            <a:stCxn id="332" idx="1"/>
+            <a:endCxn id="324" idx="3"/>
+          </p:cNvCxnSpPr>
+          <p:nvPr/>
+        </p:nvCxnSpPr>
+        <p:spPr>
+          <a:xfrm rot="10800000" flipV="1">
+            <a:off x="35682999" y="15125302"/>
+            <a:ext cx="1323858" cy="636549"/>
+          </a:xfrm>
+          <a:prstGeom prst="curvedConnector3">
+            <a:avLst/>
+          </a:prstGeom>
+          <a:ln>
+            <a:tailEnd type="triangle"/>
+          </a:ln>
+        </p:spPr>
+        <p:style>
+          <a:lnRef idx="1">
+            <a:schemeClr val="dk1"/>
+          </a:lnRef>
+          <a:fillRef idx="0">
+            <a:schemeClr val="dk1"/>
+          </a:fillRef>
+          <a:effectRef idx="0">
+            <a:schemeClr val="dk1"/>
+          </a:effectRef>
+          <a:fontRef idx="minor">
+            <a:schemeClr val="tx1"/>
+          </a:fontRef>
+        </p:style>
+      </p:cxnSp>
+      <p:cxnSp>
+        <p:nvCxnSpPr>
+          <p:cNvPr id="222" name="Connecteur : en arc 221">
+            <a:extLst>
+              <a:ext uri="{FF2B5EF4-FFF2-40B4-BE49-F238E27FC236}">
+                <a16:creationId xmlns:a16="http://schemas.microsoft.com/office/drawing/2014/main" id="{19688826-CB43-477F-8087-D5A50BDA6BBF}"/>
+              </a:ext>
+            </a:extLst>
+          </p:cNvPr>
+          <p:cNvCxnSpPr>
+            <a:cxnSpLocks/>
+            <a:stCxn id="333" idx="1"/>
+            <a:endCxn id="324" idx="3"/>
+          </p:cNvCxnSpPr>
+          <p:nvPr/>
+        </p:nvCxnSpPr>
+        <p:spPr>
+          <a:xfrm rot="10800000">
+            <a:off x="35683000" y="15761853"/>
+            <a:ext cx="1331775" cy="585945"/>
+          </a:xfrm>
+          <a:prstGeom prst="curvedConnector3">
+            <a:avLst/>
+          </a:prstGeom>
+          <a:ln>
+            <a:tailEnd type="triangle"/>
+          </a:ln>
+        </p:spPr>
+        <p:style>
+          <a:lnRef idx="1">
+            <a:schemeClr val="dk1"/>
+          </a:lnRef>
+          <a:fillRef idx="0">
+            <a:schemeClr val="dk1"/>
+          </a:fillRef>
+          <a:effectRef idx="0">
+            <a:schemeClr val="dk1"/>
+          </a:effectRef>
+          <a:fontRef idx="minor">
+            <a:schemeClr val="tx1"/>
+          </a:fontRef>
+        </p:style>
+      </p:cxnSp>
+      <p:sp>
+        <p:nvSpPr>
+          <p:cNvPr id="339" name="ZoneTexte 338">
+            <a:extLst>
+              <a:ext uri="{FF2B5EF4-FFF2-40B4-BE49-F238E27FC236}">
+                <a16:creationId xmlns:a16="http://schemas.microsoft.com/office/drawing/2014/main" id="{8EE97E95-33C7-4A50-B013-4E8B6EDC1E9C}"/>
+              </a:ext>
+            </a:extLst>
+          </p:cNvPr>
+          <p:cNvSpPr txBox="1"/>
+          <p:nvPr/>
+        </p:nvSpPr>
+        <p:spPr>
+          <a:xfrm>
+            <a:off x="36296712" y="15474489"/>
+            <a:ext cx="685869" cy="553998"/>
+          </a:xfrm>
+          <a:prstGeom prst="rect">
+            <a:avLst/>
+          </a:prstGeom>
+          <a:noFill/>
+        </p:spPr>
+        <p:txBody>
+          <a:bodyPr wrap="square" rtlCol="0">
+            <a:spAutoFit/>
+          </a:bodyPr>
+          <a:lstStyle/>
           <a:p>
             <a:pPr algn="ctr"/>
             <a:r>
               <a:rPr lang="fr-FR" sz="1000" i="1" dirty="0">
-                <a:solidFill>
-                  <a:schemeClr val="bg1"/>
-                </a:solidFill>
-                <a:latin typeface="Gill Sans Nova" panose="020B0602020104020203" pitchFamily="34" charset="0"/>
-              </a:rPr>
-              <a:t>(de type « sculpture / gravure »)</a:t>
-            </a:r>
-          </a:p>
-        </p:txBody>
-      </p:sp>
-      <p:sp>
-        <p:nvSpPr>
-          <p:cNvPr id="334" name="Rectangle : coins arrondis 333">
-            <a:extLst>
-              <a:ext uri="{FF2B5EF4-FFF2-40B4-BE49-F238E27FC236}">
-                <a16:creationId xmlns:a16="http://schemas.microsoft.com/office/drawing/2014/main" id="{0F605940-120C-47BF-89B8-6544770D5575}"/>
+                <a:latin typeface="Gill Sans Nova" panose="020B0602020104020203" pitchFamily="34" charset="0"/>
+              </a:rPr>
+              <a:t>P20 </a:t>
+            </a:r>
+            <a:r>
+              <a:rPr lang="fr-FR" sz="1000" i="1" dirty="0" err="1">
+                <a:latin typeface="Gill Sans Nova" panose="020B0602020104020203" pitchFamily="34" charset="0"/>
+              </a:rPr>
+              <a:t>had</a:t>
+            </a:r>
+            <a:r>
+              <a:rPr lang="fr-FR" sz="1000" i="1" dirty="0">
+                <a:latin typeface="Gill Sans Nova" panose="020B0602020104020203" pitchFamily="34" charset="0"/>
+              </a:rPr>
+              <a:t> </a:t>
+            </a:r>
+            <a:r>
+              <a:rPr lang="fr-FR" sz="1000" i="1" dirty="0" err="1">
+                <a:latin typeface="Gill Sans Nova" panose="020B0602020104020203" pitchFamily="34" charset="0"/>
+              </a:rPr>
+              <a:t>specific</a:t>
+            </a:r>
+            <a:r>
+              <a:rPr lang="fr-FR" sz="1000" i="1" dirty="0">
+                <a:latin typeface="Gill Sans Nova" panose="020B0602020104020203" pitchFamily="34" charset="0"/>
+              </a:rPr>
+              <a:t> </a:t>
+            </a:r>
+            <a:r>
+              <a:rPr lang="fr-FR" sz="1000" i="1" dirty="0" err="1">
+                <a:latin typeface="Gill Sans Nova" panose="020B0602020104020203" pitchFamily="34" charset="0"/>
+              </a:rPr>
+              <a:t>purpose</a:t>
+            </a:r>
+            <a:endParaRPr lang="fr-FR" sz="1000" i="1" dirty="0">
+              <a:latin typeface="Gill Sans Nova" panose="020B0602020104020203" pitchFamily="34" charset="0"/>
+            </a:endParaRPr>
+          </a:p>
+        </p:txBody>
+      </p:sp>
+      <p:cxnSp>
+        <p:nvCxnSpPr>
+          <p:cNvPr id="234" name="Connecteur droit avec flèche 233">
+            <a:extLst>
+              <a:ext uri="{FF2B5EF4-FFF2-40B4-BE49-F238E27FC236}">
+                <a16:creationId xmlns:a16="http://schemas.microsoft.com/office/drawing/2014/main" id="{CAAA2C34-F034-42FD-905E-F6D54E1F73F1}"/>
+              </a:ext>
+            </a:extLst>
+          </p:cNvPr>
+          <p:cNvCxnSpPr>
+            <a:stCxn id="332" idx="3"/>
+            <a:endCxn id="331" idx="1"/>
+          </p:cNvCxnSpPr>
+          <p:nvPr/>
+        </p:nvCxnSpPr>
+        <p:spPr>
+          <a:xfrm flipV="1">
+            <a:off x="38069608" y="15118803"/>
+            <a:ext cx="1306684" cy="6500"/>
+          </a:xfrm>
+          <a:prstGeom prst="straightConnector1">
+            <a:avLst/>
+          </a:prstGeom>
+          <a:ln>
+            <a:tailEnd type="triangle"/>
+          </a:ln>
+        </p:spPr>
+        <p:style>
+          <a:lnRef idx="1">
+            <a:schemeClr val="dk1"/>
+          </a:lnRef>
+          <a:fillRef idx="0">
+            <a:schemeClr val="dk1"/>
+          </a:fillRef>
+          <a:effectRef idx="0">
+            <a:schemeClr val="dk1"/>
+          </a:effectRef>
+          <a:fontRef idx="minor">
+            <a:schemeClr val="tx1"/>
+          </a:fontRef>
+        </p:style>
+      </p:cxnSp>
+      <p:cxnSp>
+        <p:nvCxnSpPr>
+          <p:cNvPr id="238" name="Connecteur droit avec flèche 237">
+            <a:extLst>
+              <a:ext uri="{FF2B5EF4-FFF2-40B4-BE49-F238E27FC236}">
+                <a16:creationId xmlns:a16="http://schemas.microsoft.com/office/drawing/2014/main" id="{BE37FFCE-E92A-4E41-B691-50D7A0BC0374}"/>
+              </a:ext>
+            </a:extLst>
+          </p:cNvPr>
+          <p:cNvCxnSpPr>
+            <a:cxnSpLocks/>
+            <a:stCxn id="333" idx="3"/>
+            <a:endCxn id="334" idx="1"/>
+          </p:cNvCxnSpPr>
+          <p:nvPr/>
+        </p:nvCxnSpPr>
+        <p:spPr>
+          <a:xfrm flipV="1">
+            <a:off x="38147166" y="16327912"/>
+            <a:ext cx="1229125" cy="19885"/>
+          </a:xfrm>
+          <a:prstGeom prst="straightConnector1">
+            <a:avLst/>
+          </a:prstGeom>
+          <a:ln>
+            <a:tailEnd type="triangle"/>
+          </a:ln>
+        </p:spPr>
+        <p:style>
+          <a:lnRef idx="1">
+            <a:schemeClr val="dk1"/>
+          </a:lnRef>
+          <a:fillRef idx="0">
+            <a:schemeClr val="dk1"/>
+          </a:fillRef>
+          <a:effectRef idx="0">
+            <a:schemeClr val="dk1"/>
+          </a:effectRef>
+          <a:fontRef idx="minor">
+            <a:schemeClr val="tx1"/>
+          </a:fontRef>
+        </p:style>
+      </p:cxnSp>
+      <p:sp>
+        <p:nvSpPr>
+          <p:cNvPr id="356" name="ZoneTexte 355">
+            <a:extLst>
+              <a:ext uri="{FF2B5EF4-FFF2-40B4-BE49-F238E27FC236}">
+                <a16:creationId xmlns:a16="http://schemas.microsoft.com/office/drawing/2014/main" id="{003F5E6E-6732-4C7B-B872-CA5FBC273CF4}"/>
+              </a:ext>
+            </a:extLst>
+          </p:cNvPr>
+          <p:cNvSpPr txBox="1"/>
+          <p:nvPr/>
+        </p:nvSpPr>
+        <p:spPr>
+          <a:xfrm>
+            <a:off x="38263405" y="14872379"/>
+            <a:ext cx="868954" cy="246221"/>
+          </a:xfrm>
+          <a:prstGeom prst="rect">
+            <a:avLst/>
+          </a:prstGeom>
+          <a:noFill/>
+        </p:spPr>
+        <p:txBody>
+          <a:bodyPr wrap="square" rtlCol="0">
+            <a:spAutoFit/>
+          </a:bodyPr>
+          <a:lstStyle/>
+          <a:p>
+            <a:pPr algn="ctr"/>
+            <a:r>
+              <a:rPr lang="fr-FR" sz="1000" i="1" dirty="0">
+                <a:latin typeface="Gill Sans Nova" panose="020B0602020104020203" pitchFamily="34" charset="0"/>
+              </a:rPr>
+              <a:t>P14</a:t>
+            </a:r>
+          </a:p>
+        </p:txBody>
+      </p:sp>
+      <p:sp>
+        <p:nvSpPr>
+          <p:cNvPr id="357" name="ZoneTexte 356">
+            <a:extLst>
+              <a:ext uri="{FF2B5EF4-FFF2-40B4-BE49-F238E27FC236}">
+                <a16:creationId xmlns:a16="http://schemas.microsoft.com/office/drawing/2014/main" id="{AA8F24A0-9520-4C25-81AF-48D5EDB8106B}"/>
+              </a:ext>
+            </a:extLst>
+          </p:cNvPr>
+          <p:cNvSpPr txBox="1"/>
+          <p:nvPr/>
+        </p:nvSpPr>
+        <p:spPr>
+          <a:xfrm>
+            <a:off x="38288473" y="16091633"/>
+            <a:ext cx="868954" cy="246221"/>
+          </a:xfrm>
+          <a:prstGeom prst="rect">
+            <a:avLst/>
+          </a:prstGeom>
+          <a:noFill/>
+        </p:spPr>
+        <p:txBody>
+          <a:bodyPr wrap="square" rtlCol="0">
+            <a:spAutoFit/>
+          </a:bodyPr>
+          <a:lstStyle/>
+          <a:p>
+            <a:pPr algn="ctr"/>
+            <a:r>
+              <a:rPr lang="fr-FR" sz="1000" i="1" dirty="0">
+                <a:latin typeface="Gill Sans Nova" panose="020B0602020104020203" pitchFamily="34" charset="0"/>
+              </a:rPr>
+              <a:t>P14</a:t>
+            </a:r>
+          </a:p>
+        </p:txBody>
+      </p:sp>
+      <p:cxnSp>
+        <p:nvCxnSpPr>
+          <p:cNvPr id="248" name="Connecteur : en arc 247">
+            <a:extLst>
+              <a:ext uri="{FF2B5EF4-FFF2-40B4-BE49-F238E27FC236}">
+                <a16:creationId xmlns:a16="http://schemas.microsoft.com/office/drawing/2014/main" id="{9778386B-8D99-4E05-A041-BA60CAFADDB7}"/>
+              </a:ext>
+            </a:extLst>
+          </p:cNvPr>
+          <p:cNvCxnSpPr>
+            <a:cxnSpLocks/>
+            <a:stCxn id="258" idx="1"/>
+            <a:endCxn id="283" idx="3"/>
+          </p:cNvCxnSpPr>
+          <p:nvPr/>
+        </p:nvCxnSpPr>
+        <p:spPr>
+          <a:xfrm rot="10800000">
+            <a:off x="30401397" y="14798001"/>
+            <a:ext cx="1969103" cy="491627"/>
+          </a:xfrm>
+          <a:prstGeom prst="curvedConnector3">
+            <a:avLst/>
+          </a:prstGeom>
+          <a:ln>
+            <a:tailEnd type="triangle"/>
+          </a:ln>
+        </p:spPr>
+        <p:style>
+          <a:lnRef idx="1">
+            <a:schemeClr val="dk1"/>
+          </a:lnRef>
+          <a:fillRef idx="0">
+            <a:schemeClr val="dk1"/>
+          </a:fillRef>
+          <a:effectRef idx="0">
+            <a:schemeClr val="dk1"/>
+          </a:effectRef>
+          <a:fontRef idx="minor">
+            <a:schemeClr val="tx1"/>
+          </a:fontRef>
+        </p:style>
+      </p:cxnSp>
+      <p:sp>
+        <p:nvSpPr>
+          <p:cNvPr id="360" name="ZoneTexte 359">
+            <a:extLst>
+              <a:ext uri="{FF2B5EF4-FFF2-40B4-BE49-F238E27FC236}">
+                <a16:creationId xmlns:a16="http://schemas.microsoft.com/office/drawing/2014/main" id="{70ECB3E1-5227-4432-8F89-CCD34C22FE7D}"/>
+              </a:ext>
+            </a:extLst>
+          </p:cNvPr>
+          <p:cNvSpPr txBox="1"/>
+          <p:nvPr/>
+        </p:nvSpPr>
+        <p:spPr>
+          <a:xfrm>
+            <a:off x="28907346" y="15773111"/>
+            <a:ext cx="1484487" cy="246221"/>
+          </a:xfrm>
+          <a:prstGeom prst="rect">
+            <a:avLst/>
+          </a:prstGeom>
+          <a:noFill/>
+        </p:spPr>
+        <p:txBody>
+          <a:bodyPr wrap="square" rtlCol="0">
+            <a:spAutoFit/>
+          </a:bodyPr>
+          <a:lstStyle/>
+          <a:p>
+            <a:pPr algn="ctr"/>
+            <a:r>
+              <a:rPr lang="fr-FR" sz="1000" i="1" dirty="0">
+                <a:latin typeface="Gill Sans Nova" panose="020B0602020104020203" pitchFamily="34" charset="0"/>
+              </a:rPr>
+              <a:t>« https://www.data.bnf.... »</a:t>
+            </a:r>
+          </a:p>
+        </p:txBody>
+      </p:sp>
+      <p:cxnSp>
+        <p:nvCxnSpPr>
+          <p:cNvPr id="251" name="Connecteur : en arc 250">
+            <a:extLst>
+              <a:ext uri="{FF2B5EF4-FFF2-40B4-BE49-F238E27FC236}">
+                <a16:creationId xmlns:a16="http://schemas.microsoft.com/office/drawing/2014/main" id="{66449F7D-306C-49B2-B871-6A694CABD718}"/>
+              </a:ext>
+            </a:extLst>
+          </p:cNvPr>
+          <p:cNvCxnSpPr>
+            <a:cxnSpLocks/>
+            <a:stCxn id="258" idx="1"/>
+            <a:endCxn id="360" idx="3"/>
+          </p:cNvCxnSpPr>
+          <p:nvPr/>
+        </p:nvCxnSpPr>
+        <p:spPr>
+          <a:xfrm rot="10800000" flipV="1">
+            <a:off x="30391833" y="15289626"/>
+            <a:ext cx="1978666" cy="606595"/>
+          </a:xfrm>
+          <a:prstGeom prst="curvedConnector3">
+            <a:avLst/>
+          </a:prstGeom>
+          <a:ln>
+            <a:tailEnd type="triangle"/>
+          </a:ln>
+        </p:spPr>
+        <p:style>
+          <a:lnRef idx="1">
+            <a:schemeClr val="dk1"/>
+          </a:lnRef>
+          <a:fillRef idx="0">
+            <a:schemeClr val="dk1"/>
+          </a:fillRef>
+          <a:effectRef idx="0">
+            <a:schemeClr val="dk1"/>
+          </a:effectRef>
+          <a:fontRef idx="minor">
+            <a:schemeClr val="tx1"/>
+          </a:fontRef>
+        </p:style>
+      </p:cxnSp>
+      <p:sp>
+        <p:nvSpPr>
+          <p:cNvPr id="364" name="ZoneTexte 363">
+            <a:extLst>
+              <a:ext uri="{FF2B5EF4-FFF2-40B4-BE49-F238E27FC236}">
+                <a16:creationId xmlns:a16="http://schemas.microsoft.com/office/drawing/2014/main" id="{712BDB20-8AE7-498A-A967-3B6827510030}"/>
+              </a:ext>
+            </a:extLst>
+          </p:cNvPr>
+          <p:cNvSpPr txBox="1"/>
+          <p:nvPr/>
+        </p:nvSpPr>
+        <p:spPr>
+          <a:xfrm>
+            <a:off x="31044702" y="15613342"/>
+            <a:ext cx="1398356" cy="253916"/>
+          </a:xfrm>
+          <a:prstGeom prst="rect">
+            <a:avLst/>
+          </a:prstGeom>
+          <a:noFill/>
+        </p:spPr>
+        <p:txBody>
+          <a:bodyPr wrap="square" rtlCol="0">
+            <a:spAutoFit/>
+          </a:bodyPr>
+          <a:lstStyle/>
+          <a:p>
+            <a:pPr algn="ctr"/>
+            <a:r>
+              <a:rPr lang="fr-FR" sz="1000" i="1" dirty="0" err="1">
+                <a:latin typeface="Gill Sans Nova" panose="020B0602020104020203" pitchFamily="34" charset="0"/>
+              </a:rPr>
+              <a:t>rdf:seeAlso</a:t>
+            </a:r>
+            <a:endParaRPr lang="fr-FR" sz="1000" i="1" dirty="0">
+              <a:latin typeface="Gill Sans Nova" panose="020B0602020104020203" pitchFamily="34" charset="0"/>
+            </a:endParaRPr>
+          </a:p>
+        </p:txBody>
+      </p:sp>
+      <p:sp>
+        <p:nvSpPr>
+          <p:cNvPr id="369" name="ZoneTexte 368">
+            <a:extLst>
+              <a:ext uri="{FF2B5EF4-FFF2-40B4-BE49-F238E27FC236}">
+                <a16:creationId xmlns:a16="http://schemas.microsoft.com/office/drawing/2014/main" id="{AE57A962-E375-44A3-8D5F-C1C16810E94B}"/>
+              </a:ext>
+            </a:extLst>
+          </p:cNvPr>
+          <p:cNvSpPr txBox="1"/>
+          <p:nvPr/>
+        </p:nvSpPr>
+        <p:spPr>
+          <a:xfrm>
+            <a:off x="28211426" y="13597949"/>
+            <a:ext cx="3879337" cy="338554"/>
+          </a:xfrm>
+          <a:prstGeom prst="rect">
+            <a:avLst/>
+          </a:prstGeom>
+          <a:noFill/>
+        </p:spPr>
+        <p:txBody>
+          <a:bodyPr wrap="square" rtlCol="0">
+            <a:spAutoFit/>
+          </a:bodyPr>
+          <a:lstStyle/>
+          <a:p>
+            <a:pPr algn="ctr"/>
+            <a:r>
+              <a:rPr lang="fr-FR" sz="1600" dirty="0">
+                <a:latin typeface="Gill Sans Nova" panose="020B0602020104020203" pitchFamily="34" charset="0"/>
+              </a:rPr>
+              <a:t>GRAVURES DU MERCURE GALANT</a:t>
+            </a:r>
+          </a:p>
+        </p:txBody>
+      </p:sp>
+      <p:cxnSp>
+        <p:nvCxnSpPr>
+          <p:cNvPr id="284" name="Connecteur : en arc 283">
+            <a:extLst>
+              <a:ext uri="{FF2B5EF4-FFF2-40B4-BE49-F238E27FC236}">
+                <a16:creationId xmlns:a16="http://schemas.microsoft.com/office/drawing/2014/main" id="{C0FF7B69-D2C4-4855-9A49-CD96B76324A5}"/>
+              </a:ext>
+            </a:extLst>
+          </p:cNvPr>
+          <p:cNvCxnSpPr>
+            <a:stCxn id="947" idx="2"/>
+            <a:endCxn id="950" idx="0"/>
+          </p:cNvCxnSpPr>
+          <p:nvPr/>
+        </p:nvCxnSpPr>
+        <p:spPr>
+          <a:xfrm rot="16200000" flipH="1">
+            <a:off x="38677329" y="9913969"/>
+            <a:ext cx="876164" cy="1706192"/>
+          </a:xfrm>
+          <a:prstGeom prst="curvedConnector3">
+            <a:avLst/>
+          </a:prstGeom>
+          <a:ln>
+            <a:tailEnd type="triangle"/>
+          </a:ln>
+        </p:spPr>
+        <p:style>
+          <a:lnRef idx="1">
+            <a:schemeClr val="dk1"/>
+          </a:lnRef>
+          <a:fillRef idx="0">
+            <a:schemeClr val="dk1"/>
+          </a:fillRef>
+          <a:effectRef idx="0">
+            <a:schemeClr val="dk1"/>
+          </a:effectRef>
+          <a:fontRef idx="minor">
+            <a:schemeClr val="tx1"/>
+          </a:fontRef>
+        </p:style>
+      </p:cxnSp>
+      <p:sp>
+        <p:nvSpPr>
+          <p:cNvPr id="283" name="Rectangle : coins arrondis 282">
+            <a:extLst>
+              <a:ext uri="{FF2B5EF4-FFF2-40B4-BE49-F238E27FC236}">
+                <a16:creationId xmlns:a16="http://schemas.microsoft.com/office/drawing/2014/main" id="{045EEC89-EB79-4615-9041-5828E847746B}"/>
               </a:ext>
             </a:extLst>
           </p:cNvPr>
@@ -17346,14 +17862,14 @@
         </p:nvSpPr>
         <p:spPr>
           <a:xfrm>
-            <a:off x="40633970" y="17244620"/>
-            <a:ext cx="1023275" cy="446226"/>
+            <a:off x="29205218" y="14479330"/>
+            <a:ext cx="1196178" cy="637340"/>
           </a:xfrm>
           <a:prstGeom prst="roundRect">
             <a:avLst/>
           </a:prstGeom>
           <a:solidFill>
-            <a:srgbClr val="FFE699"/>
+            <a:srgbClr val="F6CACA"/>
           </a:solidFill>
           <a:ln w="12700">
             <a:noFill/>
@@ -17385,573 +17901,59 @@
                 </a:solidFill>
                 <a:latin typeface="Gill Sans Nova" panose="020B0602020104020203" pitchFamily="34" charset="0"/>
               </a:rPr>
-              <a:t>E21 Person</a:t>
-            </a:r>
-          </a:p>
-        </p:txBody>
-      </p:sp>
-      <p:cxnSp>
-        <p:nvCxnSpPr>
-          <p:cNvPr id="220" name="Connecteur : en arc 219">
-            <a:extLst>
-              <a:ext uri="{FF2B5EF4-FFF2-40B4-BE49-F238E27FC236}">
-                <a16:creationId xmlns:a16="http://schemas.microsoft.com/office/drawing/2014/main" id="{1DFD1410-4BA9-441F-A7A8-C923840ECBC8}"/>
-              </a:ext>
-            </a:extLst>
-          </p:cNvPr>
-          <p:cNvCxnSpPr>
-            <a:cxnSpLocks/>
-            <a:stCxn id="332" idx="1"/>
-            <a:endCxn id="324" idx="3"/>
-          </p:cNvCxnSpPr>
-          <p:nvPr/>
-        </p:nvCxnSpPr>
-        <p:spPr>
-          <a:xfrm rot="10800000" flipV="1">
-            <a:off x="36940678" y="16265123"/>
-            <a:ext cx="1323858" cy="636549"/>
-          </a:xfrm>
-          <a:prstGeom prst="curvedConnector3">
-            <a:avLst/>
-          </a:prstGeom>
-          <a:ln>
-            <a:tailEnd type="triangle"/>
-          </a:ln>
-        </p:spPr>
-        <p:style>
-          <a:lnRef idx="1">
-            <a:schemeClr val="dk1"/>
-          </a:lnRef>
-          <a:fillRef idx="0">
-            <a:schemeClr val="dk1"/>
-          </a:fillRef>
-          <a:effectRef idx="0">
-            <a:schemeClr val="dk1"/>
-          </a:effectRef>
-          <a:fontRef idx="minor">
-            <a:schemeClr val="tx1"/>
-          </a:fontRef>
-        </p:style>
-      </p:cxnSp>
-      <p:cxnSp>
-        <p:nvCxnSpPr>
-          <p:cNvPr id="222" name="Connecteur : en arc 221">
-            <a:extLst>
-              <a:ext uri="{FF2B5EF4-FFF2-40B4-BE49-F238E27FC236}">
-                <a16:creationId xmlns:a16="http://schemas.microsoft.com/office/drawing/2014/main" id="{19688826-CB43-477F-8087-D5A50BDA6BBF}"/>
-              </a:ext>
-            </a:extLst>
-          </p:cNvPr>
-          <p:cNvCxnSpPr>
-            <a:cxnSpLocks/>
-            <a:stCxn id="333" idx="1"/>
-            <a:endCxn id="324" idx="3"/>
-          </p:cNvCxnSpPr>
-          <p:nvPr/>
-        </p:nvCxnSpPr>
-        <p:spPr>
-          <a:xfrm rot="10800000">
-            <a:off x="36940679" y="16901674"/>
-            <a:ext cx="1331775" cy="585945"/>
-          </a:xfrm>
-          <a:prstGeom prst="curvedConnector3">
-            <a:avLst/>
-          </a:prstGeom>
-          <a:ln>
-            <a:tailEnd type="triangle"/>
-          </a:ln>
-        </p:spPr>
-        <p:style>
-          <a:lnRef idx="1">
-            <a:schemeClr val="dk1"/>
-          </a:lnRef>
-          <a:fillRef idx="0">
-            <a:schemeClr val="dk1"/>
-          </a:fillRef>
-          <a:effectRef idx="0">
-            <a:schemeClr val="dk1"/>
-          </a:effectRef>
-          <a:fontRef idx="minor">
-            <a:schemeClr val="tx1"/>
-          </a:fontRef>
-        </p:style>
-      </p:cxnSp>
-      <p:sp>
-        <p:nvSpPr>
-          <p:cNvPr id="339" name="ZoneTexte 338">
-            <a:extLst>
-              <a:ext uri="{FF2B5EF4-FFF2-40B4-BE49-F238E27FC236}">
-                <a16:creationId xmlns:a16="http://schemas.microsoft.com/office/drawing/2014/main" id="{8EE97E95-33C7-4A50-B013-4E8B6EDC1E9C}"/>
-              </a:ext>
-            </a:extLst>
-          </p:cNvPr>
-          <p:cNvSpPr txBox="1"/>
-          <p:nvPr/>
-        </p:nvSpPr>
-        <p:spPr>
-          <a:xfrm>
-            <a:off x="37554391" y="16614310"/>
-            <a:ext cx="685869" cy="553998"/>
-          </a:xfrm>
-          <a:prstGeom prst="rect">
-            <a:avLst/>
-          </a:prstGeom>
-          <a:noFill/>
-        </p:spPr>
-        <p:txBody>
-          <a:bodyPr wrap="square" rtlCol="0">
-            <a:spAutoFit/>
-          </a:bodyPr>
-          <a:lstStyle/>
-          <a:p>
-            <a:pPr algn="ctr"/>
+              <a:t>E89 </a:t>
+            </a:r>
+            <a:r>
+              <a:rPr lang="fr-FR" sz="1000" dirty="0" err="1">
+                <a:solidFill>
+                  <a:schemeClr val="tx1"/>
+                </a:solidFill>
+                <a:latin typeface="Gill Sans Nova" panose="020B0602020104020203" pitchFamily="34" charset="0"/>
+              </a:rPr>
+              <a:t>Propositional</a:t>
+            </a:r>
+            <a:r>
+              <a:rPr lang="fr-FR" sz="1000" dirty="0">
+                <a:solidFill>
+                  <a:schemeClr val="tx1"/>
+                </a:solidFill>
+                <a:latin typeface="Gill Sans Nova" panose="020B0602020104020203" pitchFamily="34" charset="0"/>
+              </a:rPr>
+              <a:t> Object</a:t>
+            </a:r>
+          </a:p>
+          <a:p>
+            <a:pPr algn="ctr"/>
+            <a:r>
+              <a:rPr lang="fr-FR" sz="1000" dirty="0">
+                <a:solidFill>
+                  <a:schemeClr val="tx1"/>
+                </a:solidFill>
+                <a:latin typeface="Gill Sans Nova" panose="020B0602020104020203" pitchFamily="34" charset="0"/>
+              </a:rPr>
+              <a:t>« </a:t>
+            </a:r>
             <a:r>
               <a:rPr lang="fr-FR" sz="1000" i="1" dirty="0">
-                <a:latin typeface="Gill Sans Nova" panose="020B0602020104020203" pitchFamily="34" charset="0"/>
-              </a:rPr>
-              <a:t>P20 </a:t>
-            </a:r>
-            <a:r>
-              <a:rPr lang="fr-FR" sz="1000" i="1" dirty="0" err="1">
-                <a:latin typeface="Gill Sans Nova" panose="020B0602020104020203" pitchFamily="34" charset="0"/>
-              </a:rPr>
-              <a:t>had</a:t>
-            </a:r>
-            <a:r>
-              <a:rPr lang="fr-FR" sz="1000" i="1" dirty="0">
-                <a:latin typeface="Gill Sans Nova" panose="020B0602020104020203" pitchFamily="34" charset="0"/>
-              </a:rPr>
-              <a:t> </a:t>
-            </a:r>
-            <a:r>
-              <a:rPr lang="fr-FR" sz="1000" i="1" dirty="0" err="1">
-                <a:latin typeface="Gill Sans Nova" panose="020B0602020104020203" pitchFamily="34" charset="0"/>
-              </a:rPr>
-              <a:t>specific</a:t>
-            </a:r>
-            <a:r>
-              <a:rPr lang="fr-FR" sz="1000" i="1" dirty="0">
-                <a:latin typeface="Gill Sans Nova" panose="020B0602020104020203" pitchFamily="34" charset="0"/>
-              </a:rPr>
-              <a:t> </a:t>
-            </a:r>
-            <a:r>
-              <a:rPr lang="fr-FR" sz="1000" i="1" dirty="0" err="1">
-                <a:latin typeface="Gill Sans Nova" panose="020B0602020104020203" pitchFamily="34" charset="0"/>
-              </a:rPr>
-              <a:t>purpose</a:t>
-            </a:r>
-            <a:endParaRPr lang="fr-FR" sz="1000" i="1" dirty="0">
-              <a:latin typeface="Gill Sans Nova" panose="020B0602020104020203" pitchFamily="34" charset="0"/>
-            </a:endParaRPr>
-          </a:p>
-        </p:txBody>
-      </p:sp>
-      <p:cxnSp>
-        <p:nvCxnSpPr>
-          <p:cNvPr id="234" name="Connecteur droit avec flèche 233">
-            <a:extLst>
-              <a:ext uri="{FF2B5EF4-FFF2-40B4-BE49-F238E27FC236}">
-                <a16:creationId xmlns:a16="http://schemas.microsoft.com/office/drawing/2014/main" id="{CAAA2C34-F034-42FD-905E-F6D54E1F73F1}"/>
-              </a:ext>
-            </a:extLst>
-          </p:cNvPr>
-          <p:cNvCxnSpPr>
-            <a:stCxn id="332" idx="3"/>
-            <a:endCxn id="331" idx="1"/>
-          </p:cNvCxnSpPr>
-          <p:nvPr/>
-        </p:nvCxnSpPr>
-        <p:spPr>
-          <a:xfrm flipV="1">
-            <a:off x="39327287" y="16258624"/>
-            <a:ext cx="1306684" cy="6500"/>
-          </a:xfrm>
-          <a:prstGeom prst="straightConnector1">
-            <a:avLst/>
-          </a:prstGeom>
-          <a:ln>
-            <a:tailEnd type="triangle"/>
-          </a:ln>
-        </p:spPr>
-        <p:style>
-          <a:lnRef idx="1">
-            <a:schemeClr val="dk1"/>
-          </a:lnRef>
-          <a:fillRef idx="0">
-            <a:schemeClr val="dk1"/>
-          </a:fillRef>
-          <a:effectRef idx="0">
-            <a:schemeClr val="dk1"/>
-          </a:effectRef>
-          <a:fontRef idx="minor">
-            <a:schemeClr val="tx1"/>
-          </a:fontRef>
-        </p:style>
-      </p:cxnSp>
-      <p:cxnSp>
-        <p:nvCxnSpPr>
-          <p:cNvPr id="238" name="Connecteur droit avec flèche 237">
-            <a:extLst>
-              <a:ext uri="{FF2B5EF4-FFF2-40B4-BE49-F238E27FC236}">
-                <a16:creationId xmlns:a16="http://schemas.microsoft.com/office/drawing/2014/main" id="{BE37FFCE-E92A-4E41-B691-50D7A0BC0374}"/>
-              </a:ext>
-            </a:extLst>
-          </p:cNvPr>
-          <p:cNvCxnSpPr>
-            <a:cxnSpLocks/>
-            <a:stCxn id="333" idx="3"/>
-            <a:endCxn id="334" idx="1"/>
-          </p:cNvCxnSpPr>
-          <p:nvPr/>
-        </p:nvCxnSpPr>
-        <p:spPr>
-          <a:xfrm flipV="1">
-            <a:off x="39404845" y="17467733"/>
-            <a:ext cx="1229125" cy="19885"/>
-          </a:xfrm>
-          <a:prstGeom prst="straightConnector1">
-            <a:avLst/>
-          </a:prstGeom>
-          <a:ln>
-            <a:tailEnd type="triangle"/>
-          </a:ln>
-        </p:spPr>
-        <p:style>
-          <a:lnRef idx="1">
-            <a:schemeClr val="dk1"/>
-          </a:lnRef>
-          <a:fillRef idx="0">
-            <a:schemeClr val="dk1"/>
-          </a:fillRef>
-          <a:effectRef idx="0">
-            <a:schemeClr val="dk1"/>
-          </a:effectRef>
-          <a:fontRef idx="minor">
-            <a:schemeClr val="tx1"/>
-          </a:fontRef>
-        </p:style>
-      </p:cxnSp>
-      <p:sp>
-        <p:nvSpPr>
-          <p:cNvPr id="356" name="ZoneTexte 355">
-            <a:extLst>
-              <a:ext uri="{FF2B5EF4-FFF2-40B4-BE49-F238E27FC236}">
-                <a16:creationId xmlns:a16="http://schemas.microsoft.com/office/drawing/2014/main" id="{003F5E6E-6732-4C7B-B872-CA5FBC273CF4}"/>
-              </a:ext>
-            </a:extLst>
-          </p:cNvPr>
-          <p:cNvSpPr txBox="1"/>
-          <p:nvPr/>
-        </p:nvSpPr>
-        <p:spPr>
-          <a:xfrm>
-            <a:off x="39521084" y="16012200"/>
-            <a:ext cx="868954" cy="246221"/>
-          </a:xfrm>
-          <a:prstGeom prst="rect">
-            <a:avLst/>
-          </a:prstGeom>
-          <a:noFill/>
-        </p:spPr>
-        <p:txBody>
-          <a:bodyPr wrap="square" rtlCol="0">
-            <a:spAutoFit/>
-          </a:bodyPr>
-          <a:lstStyle/>
-          <a:p>
-            <a:pPr algn="ctr"/>
-            <a:r>
-              <a:rPr lang="fr-FR" sz="1000" i="1" dirty="0">
-                <a:latin typeface="Gill Sans Nova" panose="020B0602020104020203" pitchFamily="34" charset="0"/>
-              </a:rPr>
-              <a:t>P14</a:t>
-            </a:r>
-          </a:p>
-        </p:txBody>
-      </p:sp>
-      <p:sp>
-        <p:nvSpPr>
-          <p:cNvPr id="357" name="ZoneTexte 356">
-            <a:extLst>
-              <a:ext uri="{FF2B5EF4-FFF2-40B4-BE49-F238E27FC236}">
-                <a16:creationId xmlns:a16="http://schemas.microsoft.com/office/drawing/2014/main" id="{AA8F24A0-9520-4C25-81AF-48D5EDB8106B}"/>
-              </a:ext>
-            </a:extLst>
-          </p:cNvPr>
-          <p:cNvSpPr txBox="1"/>
-          <p:nvPr/>
-        </p:nvSpPr>
-        <p:spPr>
-          <a:xfrm>
-            <a:off x="39546152" y="17231454"/>
-            <a:ext cx="868954" cy="246221"/>
-          </a:xfrm>
-          <a:prstGeom prst="rect">
-            <a:avLst/>
-          </a:prstGeom>
-          <a:noFill/>
-        </p:spPr>
-        <p:txBody>
-          <a:bodyPr wrap="square" rtlCol="0">
-            <a:spAutoFit/>
-          </a:bodyPr>
-          <a:lstStyle/>
-          <a:p>
-            <a:pPr algn="ctr"/>
-            <a:r>
-              <a:rPr lang="fr-FR" sz="1000" i="1" dirty="0">
-                <a:latin typeface="Gill Sans Nova" panose="020B0602020104020203" pitchFamily="34" charset="0"/>
-              </a:rPr>
-              <a:t>P14</a:t>
-            </a:r>
-          </a:p>
-        </p:txBody>
-      </p:sp>
-      <p:cxnSp>
-        <p:nvCxnSpPr>
-          <p:cNvPr id="248" name="Connecteur : en arc 247">
-            <a:extLst>
-              <a:ext uri="{FF2B5EF4-FFF2-40B4-BE49-F238E27FC236}">
-                <a16:creationId xmlns:a16="http://schemas.microsoft.com/office/drawing/2014/main" id="{9778386B-8D99-4E05-A041-BA60CAFADDB7}"/>
-              </a:ext>
-            </a:extLst>
-          </p:cNvPr>
-          <p:cNvCxnSpPr>
-            <a:stCxn id="258" idx="1"/>
-            <a:endCxn id="317" idx="3"/>
-          </p:cNvCxnSpPr>
-          <p:nvPr/>
-        </p:nvCxnSpPr>
-        <p:spPr>
-          <a:xfrm rot="10800000">
-            <a:off x="30594525" y="15406694"/>
-            <a:ext cx="1997020" cy="528012"/>
-          </a:xfrm>
-          <a:prstGeom prst="curvedConnector3">
-            <a:avLst/>
-          </a:prstGeom>
-          <a:ln>
-            <a:tailEnd type="triangle"/>
-          </a:ln>
-        </p:spPr>
-        <p:style>
-          <a:lnRef idx="1">
-            <a:schemeClr val="dk1"/>
-          </a:lnRef>
-          <a:fillRef idx="0">
-            <a:schemeClr val="dk1"/>
-          </a:fillRef>
-          <a:effectRef idx="0">
-            <a:schemeClr val="dk1"/>
-          </a:effectRef>
-          <a:fontRef idx="minor">
-            <a:schemeClr val="tx1"/>
-          </a:fontRef>
-        </p:style>
-      </p:cxnSp>
-      <p:sp>
-        <p:nvSpPr>
-          <p:cNvPr id="360" name="ZoneTexte 359">
-            <a:extLst>
-              <a:ext uri="{FF2B5EF4-FFF2-40B4-BE49-F238E27FC236}">
-                <a16:creationId xmlns:a16="http://schemas.microsoft.com/office/drawing/2014/main" id="{70ECB3E1-5227-4432-8F89-CCD34C22FE7D}"/>
-              </a:ext>
-            </a:extLst>
-          </p:cNvPr>
-          <p:cNvSpPr txBox="1"/>
-          <p:nvPr/>
-        </p:nvSpPr>
-        <p:spPr>
-          <a:xfrm>
-            <a:off x="29110038" y="16418190"/>
-            <a:ext cx="1484487" cy="246221"/>
-          </a:xfrm>
-          <a:prstGeom prst="rect">
-            <a:avLst/>
-          </a:prstGeom>
-          <a:noFill/>
-        </p:spPr>
-        <p:txBody>
-          <a:bodyPr wrap="square" rtlCol="0">
-            <a:spAutoFit/>
-          </a:bodyPr>
-          <a:lstStyle/>
-          <a:p>
-            <a:pPr algn="ctr"/>
-            <a:r>
-              <a:rPr lang="fr-FR" sz="1000" i="1" dirty="0">
-                <a:latin typeface="Gill Sans Nova" panose="020B0602020104020203" pitchFamily="34" charset="0"/>
-              </a:rPr>
-              <a:t>« https://www.data.bnf.... »</a:t>
-            </a:r>
-          </a:p>
-        </p:txBody>
-      </p:sp>
-      <p:cxnSp>
-        <p:nvCxnSpPr>
-          <p:cNvPr id="251" name="Connecteur : en arc 250">
-            <a:extLst>
-              <a:ext uri="{FF2B5EF4-FFF2-40B4-BE49-F238E27FC236}">
-                <a16:creationId xmlns:a16="http://schemas.microsoft.com/office/drawing/2014/main" id="{66449F7D-306C-49B2-B871-6A694CABD718}"/>
-              </a:ext>
-            </a:extLst>
-          </p:cNvPr>
-          <p:cNvCxnSpPr>
-            <a:cxnSpLocks/>
-            <a:stCxn id="258" idx="1"/>
-            <a:endCxn id="360" idx="3"/>
-          </p:cNvCxnSpPr>
-          <p:nvPr/>
-        </p:nvCxnSpPr>
-        <p:spPr>
-          <a:xfrm rot="10800000" flipV="1">
-            <a:off x="30594525" y="15934705"/>
-            <a:ext cx="1997020" cy="606595"/>
-          </a:xfrm>
-          <a:prstGeom prst="curvedConnector3">
-            <a:avLst/>
-          </a:prstGeom>
-          <a:ln>
-            <a:tailEnd type="triangle"/>
-          </a:ln>
-        </p:spPr>
-        <p:style>
-          <a:lnRef idx="1">
-            <a:schemeClr val="dk1"/>
-          </a:lnRef>
-          <a:fillRef idx="0">
-            <a:schemeClr val="dk1"/>
-          </a:fillRef>
-          <a:effectRef idx="0">
-            <a:schemeClr val="dk1"/>
-          </a:effectRef>
-          <a:fontRef idx="minor">
-            <a:schemeClr val="tx1"/>
-          </a:fontRef>
-        </p:style>
-      </p:cxnSp>
-      <p:sp>
-        <p:nvSpPr>
-          <p:cNvPr id="364" name="ZoneTexte 363">
-            <a:extLst>
-              <a:ext uri="{FF2B5EF4-FFF2-40B4-BE49-F238E27FC236}">
-                <a16:creationId xmlns:a16="http://schemas.microsoft.com/office/drawing/2014/main" id="{712BDB20-8AE7-498A-A967-3B6827510030}"/>
-              </a:ext>
-            </a:extLst>
-          </p:cNvPr>
-          <p:cNvSpPr txBox="1"/>
-          <p:nvPr/>
-        </p:nvSpPr>
-        <p:spPr>
-          <a:xfrm>
-            <a:off x="31247394" y="16258421"/>
-            <a:ext cx="1398356" cy="253916"/>
-          </a:xfrm>
-          <a:prstGeom prst="rect">
-            <a:avLst/>
-          </a:prstGeom>
-          <a:noFill/>
-        </p:spPr>
-        <p:txBody>
-          <a:bodyPr wrap="square" rtlCol="0">
-            <a:spAutoFit/>
-          </a:bodyPr>
-          <a:lstStyle/>
-          <a:p>
-            <a:pPr algn="ctr"/>
-            <a:r>
-              <a:rPr lang="fr-FR" sz="1000" i="1" dirty="0" err="1">
-                <a:latin typeface="Gill Sans Nova" panose="020B0602020104020203" pitchFamily="34" charset="0"/>
-              </a:rPr>
-              <a:t>rdf:seeAlso</a:t>
-            </a:r>
-            <a:endParaRPr lang="fr-FR" sz="1000" i="1" dirty="0">
-              <a:latin typeface="Gill Sans Nova" panose="020B0602020104020203" pitchFamily="34" charset="0"/>
-            </a:endParaRPr>
-          </a:p>
-        </p:txBody>
-      </p:sp>
-      <p:sp>
-        <p:nvSpPr>
-          <p:cNvPr id="369" name="ZoneTexte 368">
-            <a:extLst>
-              <a:ext uri="{FF2B5EF4-FFF2-40B4-BE49-F238E27FC236}">
-                <a16:creationId xmlns:a16="http://schemas.microsoft.com/office/drawing/2014/main" id="{AE57A962-E375-44A3-8D5F-C1C16810E94B}"/>
-              </a:ext>
-            </a:extLst>
-          </p:cNvPr>
-          <p:cNvSpPr txBox="1"/>
-          <p:nvPr/>
-        </p:nvSpPr>
-        <p:spPr>
-          <a:xfrm>
-            <a:off x="28211426" y="13597949"/>
-            <a:ext cx="3879337" cy="338554"/>
-          </a:xfrm>
-          <a:prstGeom prst="rect">
-            <a:avLst/>
-          </a:prstGeom>
-          <a:noFill/>
-        </p:spPr>
-        <p:txBody>
-          <a:bodyPr wrap="square" rtlCol="0">
-            <a:spAutoFit/>
-          </a:bodyPr>
-          <a:lstStyle/>
-          <a:p>
-            <a:pPr algn="ctr"/>
-            <a:r>
-              <a:rPr lang="fr-FR" sz="1600" dirty="0">
-                <a:latin typeface="Gill Sans Nova" panose="020B0602020104020203" pitchFamily="34" charset="0"/>
-              </a:rPr>
-              <a:t>GRAVURES DU MERCURE GALANT</a:t>
-            </a:r>
-          </a:p>
-        </p:txBody>
-      </p:sp>
-      <p:cxnSp>
-        <p:nvCxnSpPr>
-          <p:cNvPr id="284" name="Connecteur : en arc 283">
-            <a:extLst>
-              <a:ext uri="{FF2B5EF4-FFF2-40B4-BE49-F238E27FC236}">
-                <a16:creationId xmlns:a16="http://schemas.microsoft.com/office/drawing/2014/main" id="{C0FF7B69-D2C4-4855-9A49-CD96B76324A5}"/>
-              </a:ext>
-            </a:extLst>
-          </p:cNvPr>
-          <p:cNvCxnSpPr>
-            <a:stCxn id="947" idx="2"/>
-            <a:endCxn id="950" idx="0"/>
-          </p:cNvCxnSpPr>
-          <p:nvPr/>
-        </p:nvCxnSpPr>
-        <p:spPr>
-          <a:xfrm rot="16200000" flipH="1">
-            <a:off x="38677329" y="9913969"/>
-            <a:ext cx="876164" cy="1706192"/>
-          </a:xfrm>
-          <a:prstGeom prst="curvedConnector3">
-            <a:avLst/>
-          </a:prstGeom>
-          <a:ln>
-            <a:tailEnd type="triangle"/>
-          </a:ln>
-        </p:spPr>
-        <p:style>
-          <a:lnRef idx="1">
-            <a:schemeClr val="dk1"/>
-          </a:lnRef>
-          <a:fillRef idx="0">
-            <a:schemeClr val="dk1"/>
-          </a:fillRef>
-          <a:effectRef idx="0">
-            <a:schemeClr val="dk1"/>
-          </a:effectRef>
-          <a:fontRef idx="minor">
-            <a:schemeClr val="tx1"/>
-          </a:fontRef>
-        </p:style>
-      </p:cxnSp>
+                <a:solidFill>
+                  <a:schemeClr val="tx1"/>
+                </a:solidFill>
+                <a:latin typeface="Gill Sans Nova" panose="020B0602020104020203" pitchFamily="34" charset="0"/>
+              </a:rPr>
+              <a:t>Enigme </a:t>
+            </a:r>
+            <a:r>
+              <a:rPr lang="fr-FR" sz="1000" dirty="0">
+                <a:solidFill>
+                  <a:schemeClr val="tx1"/>
+                </a:solidFill>
+                <a:latin typeface="Gill Sans Nova" panose="020B0602020104020203" pitchFamily="34" charset="0"/>
+              </a:rPr>
+              <a:t>»</a:t>
+            </a:r>
+          </a:p>
+        </p:txBody>
+      </p:sp>
     </p:spTree>
     <p:extLst>
       <p:ext uri="{BB962C8B-B14F-4D97-AF65-F5344CB8AC3E}">

</xml_diff>